<commit_message>
Fixed bug with interfaces. Added parameters to get by id in controller
</commit_message>
<xml_diff>
--- a/freeCodeCampCKVL-NovemberMeetup-ServerSideProgramming.pptx
+++ b/freeCodeCampCKVL-NovemberMeetup-ServerSideProgramming.pptx
@@ -1,37 +1,37 @@
 
 <file path=ppt/presentation.xml><?xml version="1.0" encoding="utf-8"?>
-<p:presentation xmlns:a="http://schemas.openxmlformats.org/drawingml/2006/main" xmlns:r="http://schemas.openxmlformats.org/officeDocument/2006/relationships" xmlns:mc="http://schemas.openxmlformats.org/markup-compatibility/2006" xmlns:mv="urn:schemas-microsoft-com:mac:vml" xmlns:p="http://schemas.openxmlformats.org/presentationml/2006/main" xmlns:c="http://schemas.openxmlformats.org/drawingml/2006/chart" xmlns:dgm="http://schemas.openxmlformats.org/drawingml/2006/diagram" xmlns:o="urn:schemas-microsoft-com:office:office" xmlns:v="urn:schemas-microsoft-com:vml" xmlns:pvml="urn:schemas-microsoft-com:office:powerpoint" xmlns:com="http://schemas.openxmlformats.org/drawingml/2006/compatibility" xmlns:p14="http://schemas.microsoft.com/office/powerpoint/2010/main" xmlns:p15="http://schemas.microsoft.com/office/powerpoint/2012/main" autoCompressPictures="0" embedTrueTypeFonts="1" strictFirstAndLastChars="0" saveSubsetFonts="1">
+<p:presentation xmlns:a="http://schemas.openxmlformats.org/drawingml/2006/main" xmlns:r="http://schemas.openxmlformats.org/officeDocument/2006/relationships" xmlns:p="http://schemas.openxmlformats.org/presentationml/2006/main" strictFirstAndLastChars="0" embedTrueTypeFonts="1" saveSubsetFonts="1" autoCompressPictures="0">
   <p:sldMasterIdLst>
-    <p:sldMasterId id="2147483659" r:id="rId4"/>
+    <p:sldMasterId id="2147483659" r:id="rId1"/>
   </p:sldMasterIdLst>
   <p:notesMasterIdLst>
-    <p:notesMasterId r:id="rId5"/>
+    <p:notesMasterId r:id="rId10"/>
   </p:notesMasterIdLst>
   <p:sldIdLst>
-    <p:sldId id="256" r:id="rId6"/>
-    <p:sldId id="257" r:id="rId7"/>
-    <p:sldId id="258" r:id="rId8"/>
-    <p:sldId id="259" r:id="rId9"/>
-    <p:sldId id="260" r:id="rId10"/>
-    <p:sldId id="261" r:id="rId11"/>
-    <p:sldId id="262" r:id="rId12"/>
-    <p:sldId id="263" r:id="rId13"/>
+    <p:sldId id="256" r:id="rId2"/>
+    <p:sldId id="257" r:id="rId3"/>
+    <p:sldId id="258" r:id="rId4"/>
+    <p:sldId id="259" r:id="rId5"/>
+    <p:sldId id="260" r:id="rId6"/>
+    <p:sldId id="261" r:id="rId7"/>
+    <p:sldId id="262" r:id="rId8"/>
+    <p:sldId id="263" r:id="rId9"/>
   </p:sldIdLst>
-  <p:sldSz cy="5143500" cx="9144000"/>
+  <p:sldSz cx="9144000" cy="5143500" type="screen16x9"/>
   <p:notesSz cx="6858000" cy="9144000"/>
   <p:embeddedFontLst>
     <p:embeddedFont>
-      <p:font typeface="Average"/>
-      <p:regular r:id="rId14"/>
+      <p:font typeface="Oswald" panose="020B0604020202020204" charset="0"/>
+      <p:regular r:id="rId11"/>
+      <p:bold r:id="rId12"/>
     </p:embeddedFont>
     <p:embeddedFont>
-      <p:font typeface="Oswald"/>
-      <p:regular r:id="rId15"/>
-      <p:bold r:id="rId16"/>
+      <p:font typeface="Average" panose="020B0604020202020204" charset="0"/>
+      <p:regular r:id="rId13"/>
     </p:embeddedFont>
   </p:embeddedFontLst>
   <p:defaultTextStyle>
-    <a:defPPr lvl="0" marR="0" rtl="0" algn="l">
+    <a:defPPr marR="0" lvl="0" algn="l" rtl="0">
       <a:lnSpc>
         <a:spcPct val="100000"/>
       </a:lnSpc>
@@ -42,7 +42,7 @@
         <a:spcPts val="0"/>
       </a:spcAft>
     </a:defPPr>
-    <a:lvl1pPr lvl="0" marR="0" rtl="0" algn="l">
+    <a:lvl1pPr marR="0" lvl="0" algn="l" rtl="0">
       <a:lnSpc>
         <a:spcPct val="100000"/>
       </a:lnSpc>
@@ -56,7 +56,7 @@
         <a:srgbClr val="000000"/>
       </a:buClr>
       <a:buFont typeface="Arial"/>
-      <a:defRPr b="0" i="0" sz="1400" u="none" cap="none" strike="noStrike">
+      <a:defRPr sz="1400" b="0" i="0" u="none" strike="noStrike" cap="none">
         <a:solidFill>
           <a:srgbClr val="000000"/>
         </a:solidFill>
@@ -66,7 +66,7 @@
         <a:sym typeface="Arial"/>
       </a:defRPr>
     </a:lvl1pPr>
-    <a:lvl2pPr lvl="1" marR="0" rtl="0" algn="l">
+    <a:lvl2pPr marR="0" lvl="1" algn="l" rtl="0">
       <a:lnSpc>
         <a:spcPct val="100000"/>
       </a:lnSpc>
@@ -80,7 +80,7 @@
         <a:srgbClr val="000000"/>
       </a:buClr>
       <a:buFont typeface="Arial"/>
-      <a:defRPr b="0" i="0" sz="1400" u="none" cap="none" strike="noStrike">
+      <a:defRPr sz="1400" b="0" i="0" u="none" strike="noStrike" cap="none">
         <a:solidFill>
           <a:srgbClr val="000000"/>
         </a:solidFill>
@@ -90,7 +90,7 @@
         <a:sym typeface="Arial"/>
       </a:defRPr>
     </a:lvl2pPr>
-    <a:lvl3pPr lvl="2" marR="0" rtl="0" algn="l">
+    <a:lvl3pPr marR="0" lvl="2" algn="l" rtl="0">
       <a:lnSpc>
         <a:spcPct val="100000"/>
       </a:lnSpc>
@@ -104,7 +104,7 @@
         <a:srgbClr val="000000"/>
       </a:buClr>
       <a:buFont typeface="Arial"/>
-      <a:defRPr b="0" i="0" sz="1400" u="none" cap="none" strike="noStrike">
+      <a:defRPr sz="1400" b="0" i="0" u="none" strike="noStrike" cap="none">
         <a:solidFill>
           <a:srgbClr val="000000"/>
         </a:solidFill>
@@ -114,7 +114,7 @@
         <a:sym typeface="Arial"/>
       </a:defRPr>
     </a:lvl3pPr>
-    <a:lvl4pPr lvl="3" marR="0" rtl="0" algn="l">
+    <a:lvl4pPr marR="0" lvl="3" algn="l" rtl="0">
       <a:lnSpc>
         <a:spcPct val="100000"/>
       </a:lnSpc>
@@ -128,7 +128,7 @@
         <a:srgbClr val="000000"/>
       </a:buClr>
       <a:buFont typeface="Arial"/>
-      <a:defRPr b="0" i="0" sz="1400" u="none" cap="none" strike="noStrike">
+      <a:defRPr sz="1400" b="0" i="0" u="none" strike="noStrike" cap="none">
         <a:solidFill>
           <a:srgbClr val="000000"/>
         </a:solidFill>
@@ -138,7 +138,7 @@
         <a:sym typeface="Arial"/>
       </a:defRPr>
     </a:lvl4pPr>
-    <a:lvl5pPr lvl="4" marR="0" rtl="0" algn="l">
+    <a:lvl5pPr marR="0" lvl="4" algn="l" rtl="0">
       <a:lnSpc>
         <a:spcPct val="100000"/>
       </a:lnSpc>
@@ -152,7 +152,7 @@
         <a:srgbClr val="000000"/>
       </a:buClr>
       <a:buFont typeface="Arial"/>
-      <a:defRPr b="0" i="0" sz="1400" u="none" cap="none" strike="noStrike">
+      <a:defRPr sz="1400" b="0" i="0" u="none" strike="noStrike" cap="none">
         <a:solidFill>
           <a:srgbClr val="000000"/>
         </a:solidFill>
@@ -162,7 +162,7 @@
         <a:sym typeface="Arial"/>
       </a:defRPr>
     </a:lvl5pPr>
-    <a:lvl6pPr lvl="5" marR="0" rtl="0" algn="l">
+    <a:lvl6pPr marR="0" lvl="5" algn="l" rtl="0">
       <a:lnSpc>
         <a:spcPct val="100000"/>
       </a:lnSpc>
@@ -176,7 +176,7 @@
         <a:srgbClr val="000000"/>
       </a:buClr>
       <a:buFont typeface="Arial"/>
-      <a:defRPr b="0" i="0" sz="1400" u="none" cap="none" strike="noStrike">
+      <a:defRPr sz="1400" b="0" i="0" u="none" strike="noStrike" cap="none">
         <a:solidFill>
           <a:srgbClr val="000000"/>
         </a:solidFill>
@@ -186,7 +186,7 @@
         <a:sym typeface="Arial"/>
       </a:defRPr>
     </a:lvl6pPr>
-    <a:lvl7pPr lvl="6" marR="0" rtl="0" algn="l">
+    <a:lvl7pPr marR="0" lvl="6" algn="l" rtl="0">
       <a:lnSpc>
         <a:spcPct val="100000"/>
       </a:lnSpc>
@@ -200,7 +200,7 @@
         <a:srgbClr val="000000"/>
       </a:buClr>
       <a:buFont typeface="Arial"/>
-      <a:defRPr b="0" i="0" sz="1400" u="none" cap="none" strike="noStrike">
+      <a:defRPr sz="1400" b="0" i="0" u="none" strike="noStrike" cap="none">
         <a:solidFill>
           <a:srgbClr val="000000"/>
         </a:solidFill>
@@ -210,7 +210,7 @@
         <a:sym typeface="Arial"/>
       </a:defRPr>
     </a:lvl7pPr>
-    <a:lvl8pPr lvl="7" marR="0" rtl="0" algn="l">
+    <a:lvl8pPr marR="0" lvl="7" algn="l" rtl="0">
       <a:lnSpc>
         <a:spcPct val="100000"/>
       </a:lnSpc>
@@ -224,7 +224,7 @@
         <a:srgbClr val="000000"/>
       </a:buClr>
       <a:buFont typeface="Arial"/>
-      <a:defRPr b="0" i="0" sz="1400" u="none" cap="none" strike="noStrike">
+      <a:defRPr sz="1400" b="0" i="0" u="none" strike="noStrike" cap="none">
         <a:solidFill>
           <a:srgbClr val="000000"/>
         </a:solidFill>
@@ -234,7 +234,7 @@
         <a:sym typeface="Arial"/>
       </a:defRPr>
     </a:lvl8pPr>
-    <a:lvl9pPr lvl="8" marR="0" rtl="0" algn="l">
+    <a:lvl9pPr marR="0" lvl="8" algn="l" rtl="0">
       <a:lnSpc>
         <a:spcPct val="100000"/>
       </a:lnSpc>
@@ -248,7 +248,7 @@
         <a:srgbClr val="000000"/>
       </a:buClr>
       <a:buFont typeface="Arial"/>
-      <a:defRPr b="0" i="0" sz="1400" u="none" cap="none" strike="noStrike">
+      <a:defRPr sz="1400" b="0" i="0" u="none" strike="noStrike" cap="none">
         <a:solidFill>
           <a:srgbClr val="000000"/>
         </a:solidFill>
@@ -261,7 +261,7 @@
   </p:defaultTextStyle>
   <p:extLst>
     <p:ext uri="{EFAFB233-063F-42B5-8137-9DF3F51BA10A}">
-      <p15:sldGuideLst>
+      <p15:sldGuideLst xmlns:p15="http://schemas.microsoft.com/office/powerpoint/2012/main">
         <p15:guide id="1" orient="horz" pos="1620">
           <p15:clr>
             <a:srgbClr val="A4A3A4"/>
@@ -279,11 +279,16 @@
 </file>
 
 <file path=ppt/notesMasters/notesMaster1.xml><?xml version="1.0" encoding="utf-8"?>
-<p:notesMaster xmlns:a="http://schemas.openxmlformats.org/drawingml/2006/main" xmlns:r="http://schemas.openxmlformats.org/officeDocument/2006/relationships" xmlns:mc="http://schemas.openxmlformats.org/markup-compatibility/2006" xmlns:mv="urn:schemas-microsoft-com:mac:vml" xmlns:p="http://schemas.openxmlformats.org/presentationml/2006/main" xmlns:c="http://schemas.openxmlformats.org/drawingml/2006/chart" xmlns:dgm="http://schemas.openxmlformats.org/drawingml/2006/diagram" xmlns:o="urn:schemas-microsoft-com:office:office" xmlns:v="urn:schemas-microsoft-com:vml" xmlns:pvml="urn:schemas-microsoft-com:office:powerpoint" xmlns:com="http://schemas.openxmlformats.org/drawingml/2006/compatibility" xmlns:p14="http://schemas.microsoft.com/office/powerpoint/2010/main" xmlns:p15="http://schemas.microsoft.com/office/powerpoint/2012/main">
+<p:notesMaster xmlns:a="http://schemas.openxmlformats.org/drawingml/2006/main" xmlns:r="http://schemas.openxmlformats.org/officeDocument/2006/relationships" xmlns:p="http://schemas.openxmlformats.org/presentationml/2006/main">
   <p:cSld>
+    <p:bg>
+      <p:bgRef idx="1001">
+        <a:schemeClr val="bg1"/>
+      </p:bgRef>
+    </p:bg>
     <p:spTree>
       <p:nvGrpSpPr>
-        <p:cNvPr id="2" name="Shape 2"/>
+        <p:cNvPr id="1" name="Shape 2"/>
         <p:cNvGrpSpPr/>
         <p:nvPr/>
       </p:nvGrpSpPr>
@@ -298,9 +303,11 @@
       <p:sp>
         <p:nvSpPr>
           <p:cNvPr id="3" name="Google Shape;3;n"/>
-          <p:cNvSpPr/>
+          <p:cNvSpPr>
+            <a:spLocks noGrp="1" noRot="1" noChangeAspect="1"/>
+          </p:cNvSpPr>
           <p:nvPr>
-            <p:ph idx="2" type="sldImg"/>
+            <p:ph type="sldImg" idx="2"/>
           </p:nvPr>
         </p:nvSpPr>
         <p:spPr>
@@ -309,9 +316,13 @@
             <a:ext cx="6096075" cy="3429000"/>
           </a:xfrm>
           <a:custGeom>
-            <a:rect b="b" l="l" r="r" t="t"/>
+            <a:avLst/>
+            <a:gdLst/>
+            <a:ahLst/>
+            <a:cxnLst/>
+            <a:rect l="l" t="t" r="r" b="b"/>
             <a:pathLst>
-              <a:path extrusionOk="0" h="120000" w="120000">
+              <a:path w="120000" h="120000" extrusionOk="0">
                 <a:moveTo>
                   <a:pt x="0" y="0"/>
                 </a:moveTo>
@@ -329,23 +340,25 @@
             </a:pathLst>
           </a:custGeom>
           <a:noFill/>
-          <a:ln cap="flat" cmpd="sng" w="9525">
+          <a:ln w="9525" cap="flat" cmpd="sng">
             <a:solidFill>
               <a:srgbClr val="000000"/>
             </a:solidFill>
             <a:prstDash val="solid"/>
             <a:round/>
-            <a:headEnd len="sm" w="sm" type="none"/>
-            <a:tailEnd len="sm" w="sm" type="none"/>
+            <a:headEnd type="none" w="sm" len="sm"/>
+            <a:tailEnd type="none" w="sm" len="sm"/>
           </a:ln>
         </p:spPr>
       </p:sp>
       <p:sp>
         <p:nvSpPr>
           <p:cNvPr id="4" name="Google Shape;4;n"/>
-          <p:cNvSpPr txBox="1"/>
+          <p:cNvSpPr txBox="1">
+            <a:spLocks noGrp="1"/>
+          </p:cNvSpPr>
           <p:nvPr>
-            <p:ph idx="1" type="body"/>
+            <p:ph type="body" idx="1"/>
           </p:nvPr>
         </p:nvSpPr>
         <p:spPr>
@@ -362,9 +375,9 @@
           </a:ln>
         </p:spPr>
         <p:txBody>
-          <a:bodyPr anchorCtr="0" anchor="t" bIns="91425" lIns="91425" spcFirstLastPara="1" rIns="91425" wrap="square" tIns="91425"/>
+          <a:bodyPr spcFirstLastPara="1" wrap="square" lIns="91425" tIns="91425" rIns="91425" bIns="91425" anchor="t" anchorCtr="0"/>
           <a:lstStyle>
-            <a:lvl1pPr indent="-317500" lvl="0" marL="457200">
+            <a:lvl1pPr marL="457200" lvl="0" indent="-317500">
               <a:spcBef>
                 <a:spcPts val="0"/>
               </a:spcBef>
@@ -375,7 +388,7 @@
               <a:buChar char="●"/>
               <a:defRPr sz="1100"/>
             </a:lvl1pPr>
-            <a:lvl2pPr indent="-317500" lvl="1" marL="914400">
+            <a:lvl2pPr marL="914400" lvl="1" indent="-317500">
               <a:spcBef>
                 <a:spcPts val="0"/>
               </a:spcBef>
@@ -386,7 +399,7 @@
               <a:buChar char="○"/>
               <a:defRPr sz="1100"/>
             </a:lvl2pPr>
-            <a:lvl3pPr indent="-317500" lvl="2" marL="1371600">
+            <a:lvl3pPr marL="1371600" lvl="2" indent="-317500">
               <a:spcBef>
                 <a:spcPts val="0"/>
               </a:spcBef>
@@ -397,7 +410,7 @@
               <a:buChar char="■"/>
               <a:defRPr sz="1100"/>
             </a:lvl3pPr>
-            <a:lvl4pPr indent="-317500" lvl="3" marL="1828800">
+            <a:lvl4pPr marL="1828800" lvl="3" indent="-317500">
               <a:spcBef>
                 <a:spcPts val="0"/>
               </a:spcBef>
@@ -408,7 +421,7 @@
               <a:buChar char="●"/>
               <a:defRPr sz="1100"/>
             </a:lvl4pPr>
-            <a:lvl5pPr indent="-317500" lvl="4" marL="2286000">
+            <a:lvl5pPr marL="2286000" lvl="4" indent="-317500">
               <a:spcBef>
                 <a:spcPts val="0"/>
               </a:spcBef>
@@ -419,7 +432,7 @@
               <a:buChar char="○"/>
               <a:defRPr sz="1100"/>
             </a:lvl5pPr>
-            <a:lvl6pPr indent="-317500" lvl="5" marL="2743200">
+            <a:lvl6pPr marL="2743200" lvl="5" indent="-317500">
               <a:spcBef>
                 <a:spcPts val="0"/>
               </a:spcBef>
@@ -430,7 +443,7 @@
               <a:buChar char="■"/>
               <a:defRPr sz="1100"/>
             </a:lvl6pPr>
-            <a:lvl7pPr indent="-317500" lvl="6" marL="3200400">
+            <a:lvl7pPr marL="3200400" lvl="6" indent="-317500">
               <a:spcBef>
                 <a:spcPts val="0"/>
               </a:spcBef>
@@ -441,7 +454,7 @@
               <a:buChar char="●"/>
               <a:defRPr sz="1100"/>
             </a:lvl7pPr>
-            <a:lvl8pPr indent="-317500" lvl="7" marL="3657600">
+            <a:lvl8pPr marL="3657600" lvl="7" indent="-317500">
               <a:spcBef>
                 <a:spcPts val="0"/>
               </a:spcBef>
@@ -452,7 +465,7 @@
               <a:buChar char="○"/>
               <a:defRPr sz="1100"/>
             </a:lvl8pPr>
-            <a:lvl9pPr indent="-317500" lvl="8" marL="4114800">
+            <a:lvl9pPr marL="4114800" lvl="8" indent="-317500">
               <a:spcBef>
                 <a:spcPts val="0"/>
               </a:spcBef>
@@ -464,14 +477,16 @@
               <a:defRPr sz="1100"/>
             </a:lvl9pPr>
           </a:lstStyle>
-          <a:p/>
+          <a:p>
+            <a:endParaRPr/>
+          </a:p>
         </p:txBody>
       </p:sp>
     </p:spTree>
   </p:cSld>
-  <p:clrMap accent1="accent1" accent2="accent2" accent3="accent3" accent4="accent4" accent5="accent5" accent6="accent6" bg1="lt1" bg2="dk2" tx1="dk1" tx2="lt2" folHlink="folHlink" hlink="hlink"/>
+  <p:clrMap bg1="lt1" tx1="dk1" bg2="dk2" tx2="lt2" accent1="accent1" accent2="accent2" accent3="accent3" accent4="accent4" accent5="accent5" accent6="accent6" hlink="hlink" folHlink="folHlink"/>
   <p:notesStyle>
-    <a:defPPr lvl="0" marR="0" rtl="0" algn="l">
+    <a:defPPr marR="0" lvl="0" algn="l" rtl="0">
       <a:lnSpc>
         <a:spcPct val="100000"/>
       </a:lnSpc>
@@ -482,7 +497,7 @@
         <a:spcPts val="0"/>
       </a:spcAft>
     </a:defPPr>
-    <a:lvl1pPr lvl="0" marR="0" rtl="0" algn="l">
+    <a:lvl1pPr marR="0" lvl="0" algn="l" rtl="0">
       <a:lnSpc>
         <a:spcPct val="100000"/>
       </a:lnSpc>
@@ -496,7 +511,7 @@
         <a:srgbClr val="000000"/>
       </a:buClr>
       <a:buFont typeface="Arial"/>
-      <a:defRPr b="0" i="0" sz="1400" u="none" cap="none" strike="noStrike">
+      <a:defRPr sz="1400" b="0" i="0" u="none" strike="noStrike" cap="none">
         <a:solidFill>
           <a:srgbClr val="000000"/>
         </a:solidFill>
@@ -506,7 +521,7 @@
         <a:sym typeface="Arial"/>
       </a:defRPr>
     </a:lvl1pPr>
-    <a:lvl2pPr lvl="1" marR="0" rtl="0" algn="l">
+    <a:lvl2pPr marR="0" lvl="1" algn="l" rtl="0">
       <a:lnSpc>
         <a:spcPct val="100000"/>
       </a:lnSpc>
@@ -520,7 +535,7 @@
         <a:srgbClr val="000000"/>
       </a:buClr>
       <a:buFont typeface="Arial"/>
-      <a:defRPr b="0" i="0" sz="1400" u="none" cap="none" strike="noStrike">
+      <a:defRPr sz="1400" b="0" i="0" u="none" strike="noStrike" cap="none">
         <a:solidFill>
           <a:srgbClr val="000000"/>
         </a:solidFill>
@@ -530,7 +545,7 @@
         <a:sym typeface="Arial"/>
       </a:defRPr>
     </a:lvl2pPr>
-    <a:lvl3pPr lvl="2" marR="0" rtl="0" algn="l">
+    <a:lvl3pPr marR="0" lvl="2" algn="l" rtl="0">
       <a:lnSpc>
         <a:spcPct val="100000"/>
       </a:lnSpc>
@@ -544,7 +559,7 @@
         <a:srgbClr val="000000"/>
       </a:buClr>
       <a:buFont typeface="Arial"/>
-      <a:defRPr b="0" i="0" sz="1400" u="none" cap="none" strike="noStrike">
+      <a:defRPr sz="1400" b="0" i="0" u="none" strike="noStrike" cap="none">
         <a:solidFill>
           <a:srgbClr val="000000"/>
         </a:solidFill>
@@ -554,7 +569,7 @@
         <a:sym typeface="Arial"/>
       </a:defRPr>
     </a:lvl3pPr>
-    <a:lvl4pPr lvl="3" marR="0" rtl="0" algn="l">
+    <a:lvl4pPr marR="0" lvl="3" algn="l" rtl="0">
       <a:lnSpc>
         <a:spcPct val="100000"/>
       </a:lnSpc>
@@ -568,7 +583,7 @@
         <a:srgbClr val="000000"/>
       </a:buClr>
       <a:buFont typeface="Arial"/>
-      <a:defRPr b="0" i="0" sz="1400" u="none" cap="none" strike="noStrike">
+      <a:defRPr sz="1400" b="0" i="0" u="none" strike="noStrike" cap="none">
         <a:solidFill>
           <a:srgbClr val="000000"/>
         </a:solidFill>
@@ -578,7 +593,7 @@
         <a:sym typeface="Arial"/>
       </a:defRPr>
     </a:lvl4pPr>
-    <a:lvl5pPr lvl="4" marR="0" rtl="0" algn="l">
+    <a:lvl5pPr marR="0" lvl="4" algn="l" rtl="0">
       <a:lnSpc>
         <a:spcPct val="100000"/>
       </a:lnSpc>
@@ -592,7 +607,7 @@
         <a:srgbClr val="000000"/>
       </a:buClr>
       <a:buFont typeface="Arial"/>
-      <a:defRPr b="0" i="0" sz="1400" u="none" cap="none" strike="noStrike">
+      <a:defRPr sz="1400" b="0" i="0" u="none" strike="noStrike" cap="none">
         <a:solidFill>
           <a:srgbClr val="000000"/>
         </a:solidFill>
@@ -602,7 +617,7 @@
         <a:sym typeface="Arial"/>
       </a:defRPr>
     </a:lvl5pPr>
-    <a:lvl6pPr lvl="5" marR="0" rtl="0" algn="l">
+    <a:lvl6pPr marR="0" lvl="5" algn="l" rtl="0">
       <a:lnSpc>
         <a:spcPct val="100000"/>
       </a:lnSpc>
@@ -616,7 +631,7 @@
         <a:srgbClr val="000000"/>
       </a:buClr>
       <a:buFont typeface="Arial"/>
-      <a:defRPr b="0" i="0" sz="1400" u="none" cap="none" strike="noStrike">
+      <a:defRPr sz="1400" b="0" i="0" u="none" strike="noStrike" cap="none">
         <a:solidFill>
           <a:srgbClr val="000000"/>
         </a:solidFill>
@@ -626,7 +641,7 @@
         <a:sym typeface="Arial"/>
       </a:defRPr>
     </a:lvl6pPr>
-    <a:lvl7pPr lvl="6" marR="0" rtl="0" algn="l">
+    <a:lvl7pPr marR="0" lvl="6" algn="l" rtl="0">
       <a:lnSpc>
         <a:spcPct val="100000"/>
       </a:lnSpc>
@@ -640,7 +655,7 @@
         <a:srgbClr val="000000"/>
       </a:buClr>
       <a:buFont typeface="Arial"/>
-      <a:defRPr b="0" i="0" sz="1400" u="none" cap="none" strike="noStrike">
+      <a:defRPr sz="1400" b="0" i="0" u="none" strike="noStrike" cap="none">
         <a:solidFill>
           <a:srgbClr val="000000"/>
         </a:solidFill>
@@ -650,7 +665,7 @@
         <a:sym typeface="Arial"/>
       </a:defRPr>
     </a:lvl7pPr>
-    <a:lvl8pPr lvl="7" marR="0" rtl="0" algn="l">
+    <a:lvl8pPr marR="0" lvl="7" algn="l" rtl="0">
       <a:lnSpc>
         <a:spcPct val="100000"/>
       </a:lnSpc>
@@ -664,7 +679,7 @@
         <a:srgbClr val="000000"/>
       </a:buClr>
       <a:buFont typeface="Arial"/>
-      <a:defRPr b="0" i="0" sz="1400" u="none" cap="none" strike="noStrike">
+      <a:defRPr sz="1400" b="0" i="0" u="none" strike="noStrike" cap="none">
         <a:solidFill>
           <a:srgbClr val="000000"/>
         </a:solidFill>
@@ -674,7 +689,7 @@
         <a:sym typeface="Arial"/>
       </a:defRPr>
     </a:lvl8pPr>
-    <a:lvl9pPr lvl="8" marR="0" rtl="0" algn="l">
+    <a:lvl9pPr marR="0" lvl="8" algn="l" rtl="0">
       <a:lnSpc>
         <a:spcPct val="100000"/>
       </a:lnSpc>
@@ -688,7 +703,7 @@
         <a:srgbClr val="000000"/>
       </a:buClr>
       <a:buFont typeface="Arial"/>
-      <a:defRPr b="0" i="0" sz="1400" u="none" cap="none" strike="noStrike">
+      <a:defRPr sz="1400" b="0" i="0" u="none" strike="noStrike" cap="none">
         <a:solidFill>
           <a:srgbClr val="000000"/>
         </a:solidFill>
@@ -703,11 +718,11 @@
 </file>
 
 <file path=ppt/notesSlides/notesSlide1.xml><?xml version="1.0" encoding="utf-8"?>
-<p:notes xmlns:a="http://schemas.openxmlformats.org/drawingml/2006/main" xmlns:r="http://schemas.openxmlformats.org/officeDocument/2006/relationships" xmlns:mc="http://schemas.openxmlformats.org/markup-compatibility/2006" xmlns:mv="urn:schemas-microsoft-com:mac:vml" xmlns:p="http://schemas.openxmlformats.org/presentationml/2006/main" xmlns:c="http://schemas.openxmlformats.org/drawingml/2006/chart" xmlns:dgm="http://schemas.openxmlformats.org/drawingml/2006/diagram" xmlns:o="urn:schemas-microsoft-com:office:office" xmlns:v="urn:schemas-microsoft-com:vml" xmlns:pvml="urn:schemas-microsoft-com:office:powerpoint" xmlns:com="http://schemas.openxmlformats.org/drawingml/2006/compatibility" xmlns:p14="http://schemas.microsoft.com/office/powerpoint/2010/main" xmlns:p15="http://schemas.microsoft.com/office/powerpoint/2012/main" showMasterPhAnim="0" showMasterSp="0">
+<p:notes xmlns:a="http://schemas.openxmlformats.org/drawingml/2006/main" xmlns:r="http://schemas.openxmlformats.org/officeDocument/2006/relationships" xmlns:p="http://schemas.openxmlformats.org/presentationml/2006/main" showMasterSp="0" showMasterPhAnim="0">
   <p:cSld>
     <p:spTree>
       <p:nvGrpSpPr>
-        <p:cNvPr id="55" name="Shape 55"/>
+        <p:cNvPr id="1" name="Shape 55"/>
         <p:cNvGrpSpPr/>
         <p:nvPr/>
       </p:nvGrpSpPr>
@@ -722,9 +737,11 @@
       <p:sp>
         <p:nvSpPr>
           <p:cNvPr id="56" name="Google Shape;56;gc6f90357f_0_0:notes"/>
-          <p:cNvSpPr/>
+          <p:cNvSpPr>
+            <a:spLocks noGrp="1" noRot="1" noChangeAspect="1"/>
+          </p:cNvSpPr>
           <p:nvPr>
-            <p:ph idx="2" type="sldImg"/>
+            <p:ph type="sldImg" idx="2"/>
           </p:nvPr>
         </p:nvSpPr>
         <p:spPr>
@@ -733,9 +750,13 @@
             <a:ext cx="6096300" cy="3429000"/>
           </a:xfrm>
           <a:custGeom>
-            <a:rect b="b" l="l" r="r" t="t"/>
+            <a:avLst/>
+            <a:gdLst/>
+            <a:ahLst/>
+            <a:cxnLst/>
+            <a:rect l="l" t="t" r="r" b="b"/>
             <a:pathLst>
-              <a:path extrusionOk="0" h="120000" w="120000">
+              <a:path w="120000" h="120000" extrusionOk="0">
                 <a:moveTo>
                   <a:pt x="0" y="0"/>
                 </a:moveTo>
@@ -757,9 +778,11 @@
       <p:sp>
         <p:nvSpPr>
           <p:cNvPr id="57" name="Google Shape;57;gc6f90357f_0_0:notes"/>
-          <p:cNvSpPr txBox="1"/>
+          <p:cNvSpPr txBox="1">
+            <a:spLocks noGrp="1"/>
+          </p:cNvSpPr>
           <p:nvPr>
-            <p:ph idx="1" type="body"/>
+            <p:ph type="body" idx="1"/>
           </p:nvPr>
         </p:nvSpPr>
         <p:spPr>
@@ -772,12 +795,12 @@
           </a:prstGeom>
         </p:spPr>
         <p:txBody>
-          <a:bodyPr anchorCtr="0" anchor="t" bIns="91425" lIns="91425" spcFirstLastPara="1" rIns="91425" wrap="square" tIns="91425">
+          <a:bodyPr spcFirstLastPara="1" wrap="square" lIns="91425" tIns="91425" rIns="91425" bIns="91425" anchor="t" anchorCtr="0">
             <a:noAutofit/>
           </a:bodyPr>
           <a:lstStyle/>
           <a:p>
-            <a:pPr indent="0" lvl="0" marL="0" rtl="0" algn="l">
+            <a:pPr marL="0" lvl="0" indent="0" algn="l" rtl="0">
               <a:spcBef>
                 <a:spcPts val="0"/>
               </a:spcBef>
@@ -786,9 +809,6 @@
               </a:spcAft>
               <a:buNone/>
             </a:pPr>
-            <a:r>
-              <a:t/>
-            </a:r>
             <a:endParaRPr/>
           </a:p>
         </p:txBody>
@@ -802,11 +822,11 @@
 </file>
 
 <file path=ppt/notesSlides/notesSlide2.xml><?xml version="1.0" encoding="utf-8"?>
-<p:notes xmlns:a="http://schemas.openxmlformats.org/drawingml/2006/main" xmlns:r="http://schemas.openxmlformats.org/officeDocument/2006/relationships" xmlns:mc="http://schemas.openxmlformats.org/markup-compatibility/2006" xmlns:mv="urn:schemas-microsoft-com:mac:vml" xmlns:p="http://schemas.openxmlformats.org/presentationml/2006/main" xmlns:c="http://schemas.openxmlformats.org/drawingml/2006/chart" xmlns:dgm="http://schemas.openxmlformats.org/drawingml/2006/diagram" xmlns:o="urn:schemas-microsoft-com:office:office" xmlns:v="urn:schemas-microsoft-com:vml" xmlns:pvml="urn:schemas-microsoft-com:office:powerpoint" xmlns:com="http://schemas.openxmlformats.org/drawingml/2006/compatibility" xmlns:p14="http://schemas.microsoft.com/office/powerpoint/2010/main" xmlns:p15="http://schemas.microsoft.com/office/powerpoint/2012/main" showMasterPhAnim="0" showMasterSp="0">
+<p:notes xmlns:a="http://schemas.openxmlformats.org/drawingml/2006/main" xmlns:r="http://schemas.openxmlformats.org/officeDocument/2006/relationships" xmlns:p="http://schemas.openxmlformats.org/presentationml/2006/main" showMasterSp="0" showMasterPhAnim="0">
   <p:cSld>
     <p:spTree>
       <p:nvGrpSpPr>
-        <p:cNvPr id="61" name="Shape 61"/>
+        <p:cNvPr id="1" name="Shape 61"/>
         <p:cNvGrpSpPr/>
         <p:nvPr/>
       </p:nvGrpSpPr>
@@ -821,9 +841,11 @@
       <p:sp>
         <p:nvSpPr>
           <p:cNvPr id="62" name="Google Shape;62;gc6f90357f_0_9:notes"/>
-          <p:cNvSpPr/>
+          <p:cNvSpPr>
+            <a:spLocks noGrp="1" noRot="1" noChangeAspect="1"/>
+          </p:cNvSpPr>
           <p:nvPr>
-            <p:ph idx="2" type="sldImg"/>
+            <p:ph type="sldImg" idx="2"/>
           </p:nvPr>
         </p:nvSpPr>
         <p:spPr>
@@ -832,9 +854,13 @@
             <a:ext cx="6096300" cy="3429000"/>
           </a:xfrm>
           <a:custGeom>
-            <a:rect b="b" l="l" r="r" t="t"/>
+            <a:avLst/>
+            <a:gdLst/>
+            <a:ahLst/>
+            <a:cxnLst/>
+            <a:rect l="l" t="t" r="r" b="b"/>
             <a:pathLst>
-              <a:path extrusionOk="0" h="120000" w="120000">
+              <a:path w="120000" h="120000" extrusionOk="0">
                 <a:moveTo>
                   <a:pt x="0" y="0"/>
                 </a:moveTo>
@@ -856,9 +882,11 @@
       <p:sp>
         <p:nvSpPr>
           <p:cNvPr id="63" name="Google Shape;63;gc6f90357f_0_9:notes"/>
-          <p:cNvSpPr txBox="1"/>
+          <p:cNvSpPr txBox="1">
+            <a:spLocks noGrp="1"/>
+          </p:cNvSpPr>
           <p:nvPr>
-            <p:ph idx="1" type="body"/>
+            <p:ph type="body" idx="1"/>
           </p:nvPr>
         </p:nvSpPr>
         <p:spPr>
@@ -871,12 +899,12 @@
           </a:prstGeom>
         </p:spPr>
         <p:txBody>
-          <a:bodyPr anchorCtr="0" anchor="t" bIns="91425" lIns="91425" spcFirstLastPara="1" rIns="91425" wrap="square" tIns="91425">
+          <a:bodyPr spcFirstLastPara="1" wrap="square" lIns="91425" tIns="91425" rIns="91425" bIns="91425" anchor="t" anchorCtr="0">
             <a:noAutofit/>
           </a:bodyPr>
           <a:lstStyle/>
           <a:p>
-            <a:pPr indent="0" lvl="0" marL="0" rtl="0" algn="l">
+            <a:pPr marL="0" lvl="0" indent="0" algn="l" rtl="0">
               <a:spcBef>
                 <a:spcPts val="0"/>
               </a:spcBef>
@@ -885,9 +913,6 @@
               </a:spcAft>
               <a:buNone/>
             </a:pPr>
-            <a:r>
-              <a:t/>
-            </a:r>
             <a:endParaRPr/>
           </a:p>
         </p:txBody>
@@ -901,11 +926,11 @@
 </file>
 
 <file path=ppt/notesSlides/notesSlide3.xml><?xml version="1.0" encoding="utf-8"?>
-<p:notes xmlns:a="http://schemas.openxmlformats.org/drawingml/2006/main" xmlns:r="http://schemas.openxmlformats.org/officeDocument/2006/relationships" xmlns:mc="http://schemas.openxmlformats.org/markup-compatibility/2006" xmlns:mv="urn:schemas-microsoft-com:mac:vml" xmlns:p="http://schemas.openxmlformats.org/presentationml/2006/main" xmlns:c="http://schemas.openxmlformats.org/drawingml/2006/chart" xmlns:dgm="http://schemas.openxmlformats.org/drawingml/2006/diagram" xmlns:o="urn:schemas-microsoft-com:office:office" xmlns:v="urn:schemas-microsoft-com:vml" xmlns:pvml="urn:schemas-microsoft-com:office:powerpoint" xmlns:com="http://schemas.openxmlformats.org/drawingml/2006/compatibility" xmlns:p14="http://schemas.microsoft.com/office/powerpoint/2010/main" xmlns:p15="http://schemas.microsoft.com/office/powerpoint/2012/main" showMasterPhAnim="0" showMasterSp="0">
+<p:notes xmlns:a="http://schemas.openxmlformats.org/drawingml/2006/main" xmlns:r="http://schemas.openxmlformats.org/officeDocument/2006/relationships" xmlns:p="http://schemas.openxmlformats.org/presentationml/2006/main" showMasterSp="0" showMasterPhAnim="0">
   <p:cSld>
     <p:spTree>
       <p:nvGrpSpPr>
-        <p:cNvPr id="67" name="Shape 67"/>
+        <p:cNvPr id="1" name="Shape 67"/>
         <p:cNvGrpSpPr/>
         <p:nvPr/>
       </p:nvGrpSpPr>
@@ -920,9 +945,11 @@
       <p:sp>
         <p:nvSpPr>
           <p:cNvPr id="68" name="Google Shape;68;gc6f90357f_0_13:notes"/>
-          <p:cNvSpPr/>
+          <p:cNvSpPr>
+            <a:spLocks noGrp="1" noRot="1" noChangeAspect="1"/>
+          </p:cNvSpPr>
           <p:nvPr>
-            <p:ph idx="2" type="sldImg"/>
+            <p:ph type="sldImg" idx="2"/>
           </p:nvPr>
         </p:nvSpPr>
         <p:spPr>
@@ -931,9 +958,13 @@
             <a:ext cx="6096300" cy="3429000"/>
           </a:xfrm>
           <a:custGeom>
-            <a:rect b="b" l="l" r="r" t="t"/>
+            <a:avLst/>
+            <a:gdLst/>
+            <a:ahLst/>
+            <a:cxnLst/>
+            <a:rect l="l" t="t" r="r" b="b"/>
             <a:pathLst>
-              <a:path extrusionOk="0" h="120000" w="120000">
+              <a:path w="120000" h="120000" extrusionOk="0">
                 <a:moveTo>
                   <a:pt x="0" y="0"/>
                 </a:moveTo>
@@ -955,9 +986,11 @@
       <p:sp>
         <p:nvSpPr>
           <p:cNvPr id="69" name="Google Shape;69;gc6f90357f_0_13:notes"/>
-          <p:cNvSpPr txBox="1"/>
+          <p:cNvSpPr txBox="1">
+            <a:spLocks noGrp="1"/>
+          </p:cNvSpPr>
           <p:nvPr>
-            <p:ph idx="1" type="body"/>
+            <p:ph type="body" idx="1"/>
           </p:nvPr>
         </p:nvSpPr>
         <p:spPr>
@@ -970,12 +1003,12 @@
           </a:prstGeom>
         </p:spPr>
         <p:txBody>
-          <a:bodyPr anchorCtr="0" anchor="t" bIns="91425" lIns="91425" spcFirstLastPara="1" rIns="91425" wrap="square" tIns="91425">
+          <a:bodyPr spcFirstLastPara="1" wrap="square" lIns="91425" tIns="91425" rIns="91425" bIns="91425" anchor="t" anchorCtr="0">
             <a:noAutofit/>
           </a:bodyPr>
           <a:lstStyle/>
           <a:p>
-            <a:pPr indent="0" lvl="0" marL="0" rtl="0" algn="l">
+            <a:pPr marL="0" lvl="0" indent="0" algn="l" rtl="0">
               <a:spcBef>
                 <a:spcPts val="0"/>
               </a:spcBef>
@@ -984,9 +1017,6 @@
               </a:spcAft>
               <a:buNone/>
             </a:pPr>
-            <a:r>
-              <a:t/>
-            </a:r>
             <a:endParaRPr/>
           </a:p>
         </p:txBody>
@@ -1000,11 +1030,11 @@
 </file>
 
 <file path=ppt/notesSlides/notesSlide4.xml><?xml version="1.0" encoding="utf-8"?>
-<p:notes xmlns:a="http://schemas.openxmlformats.org/drawingml/2006/main" xmlns:r="http://schemas.openxmlformats.org/officeDocument/2006/relationships" xmlns:mc="http://schemas.openxmlformats.org/markup-compatibility/2006" xmlns:mv="urn:schemas-microsoft-com:mac:vml" xmlns:p="http://schemas.openxmlformats.org/presentationml/2006/main" xmlns:c="http://schemas.openxmlformats.org/drawingml/2006/chart" xmlns:dgm="http://schemas.openxmlformats.org/drawingml/2006/diagram" xmlns:o="urn:schemas-microsoft-com:office:office" xmlns:v="urn:schemas-microsoft-com:vml" xmlns:pvml="urn:schemas-microsoft-com:office:powerpoint" xmlns:com="http://schemas.openxmlformats.org/drawingml/2006/compatibility" xmlns:p14="http://schemas.microsoft.com/office/powerpoint/2010/main" xmlns:p15="http://schemas.microsoft.com/office/powerpoint/2012/main" showMasterPhAnim="0" showMasterSp="0">
+<p:notes xmlns:a="http://schemas.openxmlformats.org/drawingml/2006/main" xmlns:r="http://schemas.openxmlformats.org/officeDocument/2006/relationships" xmlns:p="http://schemas.openxmlformats.org/presentationml/2006/main" showMasterSp="0" showMasterPhAnim="0">
   <p:cSld>
     <p:spTree>
       <p:nvGrpSpPr>
-        <p:cNvPr id="73" name="Shape 73"/>
+        <p:cNvPr id="1" name="Shape 73"/>
         <p:cNvGrpSpPr/>
         <p:nvPr/>
       </p:nvGrpSpPr>
@@ -1019,9 +1049,11 @@
       <p:sp>
         <p:nvSpPr>
           <p:cNvPr id="74" name="Google Shape;74;gc6f90357f_0_19:notes"/>
-          <p:cNvSpPr/>
+          <p:cNvSpPr>
+            <a:spLocks noGrp="1" noRot="1" noChangeAspect="1"/>
+          </p:cNvSpPr>
           <p:nvPr>
-            <p:ph idx="2" type="sldImg"/>
+            <p:ph type="sldImg" idx="2"/>
           </p:nvPr>
         </p:nvSpPr>
         <p:spPr>
@@ -1030,9 +1062,13 @@
             <a:ext cx="6096300" cy="3429000"/>
           </a:xfrm>
           <a:custGeom>
-            <a:rect b="b" l="l" r="r" t="t"/>
+            <a:avLst/>
+            <a:gdLst/>
+            <a:ahLst/>
+            <a:cxnLst/>
+            <a:rect l="l" t="t" r="r" b="b"/>
             <a:pathLst>
-              <a:path extrusionOk="0" h="120000" w="120000">
+              <a:path w="120000" h="120000" extrusionOk="0">
                 <a:moveTo>
                   <a:pt x="0" y="0"/>
                 </a:moveTo>
@@ -1054,9 +1090,11 @@
       <p:sp>
         <p:nvSpPr>
           <p:cNvPr id="75" name="Google Shape;75;gc6f90357f_0_19:notes"/>
-          <p:cNvSpPr txBox="1"/>
+          <p:cNvSpPr txBox="1">
+            <a:spLocks noGrp="1"/>
+          </p:cNvSpPr>
           <p:nvPr>
-            <p:ph idx="1" type="body"/>
+            <p:ph type="body" idx="1"/>
           </p:nvPr>
         </p:nvSpPr>
         <p:spPr>
@@ -1069,12 +1107,12 @@
           </a:prstGeom>
         </p:spPr>
         <p:txBody>
-          <a:bodyPr anchorCtr="0" anchor="t" bIns="91425" lIns="91425" spcFirstLastPara="1" rIns="91425" wrap="square" tIns="91425">
+          <a:bodyPr spcFirstLastPara="1" wrap="square" lIns="91425" tIns="91425" rIns="91425" bIns="91425" anchor="t" anchorCtr="0">
             <a:noAutofit/>
           </a:bodyPr>
           <a:lstStyle/>
           <a:p>
-            <a:pPr indent="0" lvl="0" marL="0" rtl="0" algn="l">
+            <a:pPr marL="0" lvl="0" indent="0" algn="l" rtl="0">
               <a:spcBef>
                 <a:spcPts val="0"/>
               </a:spcBef>
@@ -1083,9 +1121,6 @@
               </a:spcAft>
               <a:buNone/>
             </a:pPr>
-            <a:r>
-              <a:t/>
-            </a:r>
             <a:endParaRPr/>
           </a:p>
         </p:txBody>
@@ -1099,11 +1134,11 @@
 </file>
 
 <file path=ppt/notesSlides/notesSlide5.xml><?xml version="1.0" encoding="utf-8"?>
-<p:notes xmlns:a="http://schemas.openxmlformats.org/drawingml/2006/main" xmlns:r="http://schemas.openxmlformats.org/officeDocument/2006/relationships" xmlns:mc="http://schemas.openxmlformats.org/markup-compatibility/2006" xmlns:mv="urn:schemas-microsoft-com:mac:vml" xmlns:p="http://schemas.openxmlformats.org/presentationml/2006/main" xmlns:c="http://schemas.openxmlformats.org/drawingml/2006/chart" xmlns:dgm="http://schemas.openxmlformats.org/drawingml/2006/diagram" xmlns:o="urn:schemas-microsoft-com:office:office" xmlns:v="urn:schemas-microsoft-com:vml" xmlns:pvml="urn:schemas-microsoft-com:office:powerpoint" xmlns:com="http://schemas.openxmlformats.org/drawingml/2006/compatibility" xmlns:p14="http://schemas.microsoft.com/office/powerpoint/2010/main" xmlns:p15="http://schemas.microsoft.com/office/powerpoint/2012/main" showMasterPhAnim="0" showMasterSp="0">
+<p:notes xmlns:a="http://schemas.openxmlformats.org/drawingml/2006/main" xmlns:r="http://schemas.openxmlformats.org/officeDocument/2006/relationships" xmlns:p="http://schemas.openxmlformats.org/presentationml/2006/main" showMasterSp="0" showMasterPhAnim="0">
   <p:cSld>
     <p:spTree>
       <p:nvGrpSpPr>
-        <p:cNvPr id="81" name="Shape 81"/>
+        <p:cNvPr id="1" name="Shape 81"/>
         <p:cNvGrpSpPr/>
         <p:nvPr/>
       </p:nvGrpSpPr>
@@ -1118,9 +1153,11 @@
       <p:sp>
         <p:nvSpPr>
           <p:cNvPr id="82" name="Google Shape;82;gc6f90357f_0_27:notes"/>
-          <p:cNvSpPr/>
+          <p:cNvSpPr>
+            <a:spLocks noGrp="1" noRot="1" noChangeAspect="1"/>
+          </p:cNvSpPr>
           <p:nvPr>
-            <p:ph idx="2" type="sldImg"/>
+            <p:ph type="sldImg" idx="2"/>
           </p:nvPr>
         </p:nvSpPr>
         <p:spPr>
@@ -1129,9 +1166,13 @@
             <a:ext cx="6096300" cy="3429000"/>
           </a:xfrm>
           <a:custGeom>
-            <a:rect b="b" l="l" r="r" t="t"/>
+            <a:avLst/>
+            <a:gdLst/>
+            <a:ahLst/>
+            <a:cxnLst/>
+            <a:rect l="l" t="t" r="r" b="b"/>
             <a:pathLst>
-              <a:path extrusionOk="0" h="120000" w="120000">
+              <a:path w="120000" h="120000" extrusionOk="0">
                 <a:moveTo>
                   <a:pt x="0" y="0"/>
                 </a:moveTo>
@@ -1153,9 +1194,11 @@
       <p:sp>
         <p:nvSpPr>
           <p:cNvPr id="83" name="Google Shape;83;gc6f90357f_0_27:notes"/>
-          <p:cNvSpPr txBox="1"/>
+          <p:cNvSpPr txBox="1">
+            <a:spLocks noGrp="1"/>
+          </p:cNvSpPr>
           <p:nvPr>
-            <p:ph idx="1" type="body"/>
+            <p:ph type="body" idx="1"/>
           </p:nvPr>
         </p:nvSpPr>
         <p:spPr>
@@ -1168,12 +1211,12 @@
           </a:prstGeom>
         </p:spPr>
         <p:txBody>
-          <a:bodyPr anchorCtr="0" anchor="t" bIns="91425" lIns="91425" spcFirstLastPara="1" rIns="91425" wrap="square" tIns="91425">
+          <a:bodyPr spcFirstLastPara="1" wrap="square" lIns="91425" tIns="91425" rIns="91425" bIns="91425" anchor="t" anchorCtr="0">
             <a:noAutofit/>
           </a:bodyPr>
           <a:lstStyle/>
           <a:p>
-            <a:pPr indent="0" lvl="0" marL="0" rtl="0" algn="l">
+            <a:pPr marL="0" lvl="0" indent="0" algn="l" rtl="0">
               <a:spcBef>
                 <a:spcPts val="0"/>
               </a:spcBef>
@@ -1182,9 +1225,6 @@
               </a:spcAft>
               <a:buNone/>
             </a:pPr>
-            <a:r>
-              <a:t/>
-            </a:r>
             <a:endParaRPr/>
           </a:p>
         </p:txBody>
@@ -1198,11 +1238,11 @@
 </file>
 
 <file path=ppt/notesSlides/notesSlide6.xml><?xml version="1.0" encoding="utf-8"?>
-<p:notes xmlns:a="http://schemas.openxmlformats.org/drawingml/2006/main" xmlns:r="http://schemas.openxmlformats.org/officeDocument/2006/relationships" xmlns:mc="http://schemas.openxmlformats.org/markup-compatibility/2006" xmlns:mv="urn:schemas-microsoft-com:mac:vml" xmlns:p="http://schemas.openxmlformats.org/presentationml/2006/main" xmlns:c="http://schemas.openxmlformats.org/drawingml/2006/chart" xmlns:dgm="http://schemas.openxmlformats.org/drawingml/2006/diagram" xmlns:o="urn:schemas-microsoft-com:office:office" xmlns:v="urn:schemas-microsoft-com:vml" xmlns:pvml="urn:schemas-microsoft-com:office:powerpoint" xmlns:com="http://schemas.openxmlformats.org/drawingml/2006/compatibility" xmlns:p14="http://schemas.microsoft.com/office/powerpoint/2010/main" xmlns:p15="http://schemas.microsoft.com/office/powerpoint/2012/main" showMasterPhAnim="0" showMasterSp="0">
+<p:notes xmlns:a="http://schemas.openxmlformats.org/drawingml/2006/main" xmlns:r="http://schemas.openxmlformats.org/officeDocument/2006/relationships" xmlns:p="http://schemas.openxmlformats.org/presentationml/2006/main" showMasterSp="0" showMasterPhAnim="0">
   <p:cSld>
     <p:spTree>
       <p:nvGrpSpPr>
-        <p:cNvPr id="86" name="Shape 86"/>
+        <p:cNvPr id="1" name="Shape 86"/>
         <p:cNvGrpSpPr/>
         <p:nvPr/>
       </p:nvGrpSpPr>
@@ -1217,9 +1257,11 @@
       <p:sp>
         <p:nvSpPr>
           <p:cNvPr id="87" name="Google Shape;87;gc6f90357f_0_35:notes"/>
-          <p:cNvSpPr/>
+          <p:cNvSpPr>
+            <a:spLocks noGrp="1" noRot="1" noChangeAspect="1"/>
+          </p:cNvSpPr>
           <p:nvPr>
-            <p:ph idx="2" type="sldImg"/>
+            <p:ph type="sldImg" idx="2"/>
           </p:nvPr>
         </p:nvSpPr>
         <p:spPr>
@@ -1228,9 +1270,13 @@
             <a:ext cx="6096300" cy="3429000"/>
           </a:xfrm>
           <a:custGeom>
-            <a:rect b="b" l="l" r="r" t="t"/>
+            <a:avLst/>
+            <a:gdLst/>
+            <a:ahLst/>
+            <a:cxnLst/>
+            <a:rect l="l" t="t" r="r" b="b"/>
             <a:pathLst>
-              <a:path extrusionOk="0" h="120000" w="120000">
+              <a:path w="120000" h="120000" extrusionOk="0">
                 <a:moveTo>
                   <a:pt x="0" y="0"/>
                 </a:moveTo>
@@ -1252,9 +1298,11 @@
       <p:sp>
         <p:nvSpPr>
           <p:cNvPr id="88" name="Google Shape;88;gc6f90357f_0_35:notes"/>
-          <p:cNvSpPr txBox="1"/>
+          <p:cNvSpPr txBox="1">
+            <a:spLocks noGrp="1"/>
+          </p:cNvSpPr>
           <p:nvPr>
-            <p:ph idx="1" type="body"/>
+            <p:ph type="body" idx="1"/>
           </p:nvPr>
         </p:nvSpPr>
         <p:spPr>
@@ -1267,12 +1315,12 @@
           </a:prstGeom>
         </p:spPr>
         <p:txBody>
-          <a:bodyPr anchorCtr="0" anchor="t" bIns="91425" lIns="91425" spcFirstLastPara="1" rIns="91425" wrap="square" tIns="91425">
+          <a:bodyPr spcFirstLastPara="1" wrap="square" lIns="91425" tIns="91425" rIns="91425" bIns="91425" anchor="t" anchorCtr="0">
             <a:noAutofit/>
           </a:bodyPr>
           <a:lstStyle/>
           <a:p>
-            <a:pPr indent="0" lvl="0" marL="0" rtl="0" algn="l">
+            <a:pPr marL="0" lvl="0" indent="0" algn="l" rtl="0">
               <a:spcBef>
                 <a:spcPts val="0"/>
               </a:spcBef>
@@ -1281,9 +1329,6 @@
               </a:spcAft>
               <a:buNone/>
             </a:pPr>
-            <a:r>
-              <a:t/>
-            </a:r>
             <a:endParaRPr/>
           </a:p>
         </p:txBody>
@@ -1297,11 +1342,11 @@
 </file>
 
 <file path=ppt/notesSlides/notesSlide7.xml><?xml version="1.0" encoding="utf-8"?>
-<p:notes xmlns:a="http://schemas.openxmlformats.org/drawingml/2006/main" xmlns:r="http://schemas.openxmlformats.org/officeDocument/2006/relationships" xmlns:mc="http://schemas.openxmlformats.org/markup-compatibility/2006" xmlns:mv="urn:schemas-microsoft-com:mac:vml" xmlns:p="http://schemas.openxmlformats.org/presentationml/2006/main" xmlns:c="http://schemas.openxmlformats.org/drawingml/2006/chart" xmlns:dgm="http://schemas.openxmlformats.org/drawingml/2006/diagram" xmlns:o="urn:schemas-microsoft-com:office:office" xmlns:v="urn:schemas-microsoft-com:vml" xmlns:pvml="urn:schemas-microsoft-com:office:powerpoint" xmlns:com="http://schemas.openxmlformats.org/drawingml/2006/compatibility" xmlns:p14="http://schemas.microsoft.com/office/powerpoint/2010/main" xmlns:p15="http://schemas.microsoft.com/office/powerpoint/2012/main" showMasterPhAnim="0" showMasterSp="0">
+<p:notes xmlns:a="http://schemas.openxmlformats.org/drawingml/2006/main" xmlns:r="http://schemas.openxmlformats.org/officeDocument/2006/relationships" xmlns:p="http://schemas.openxmlformats.org/presentationml/2006/main" showMasterSp="0" showMasterPhAnim="0">
   <p:cSld>
     <p:spTree>
       <p:nvGrpSpPr>
-        <p:cNvPr id="92" name="Shape 92"/>
+        <p:cNvPr id="1" name="Shape 92"/>
         <p:cNvGrpSpPr/>
         <p:nvPr/>
       </p:nvGrpSpPr>
@@ -1316,9 +1361,11 @@
       <p:sp>
         <p:nvSpPr>
           <p:cNvPr id="93" name="Google Shape;93;gc6f90357f_0_41:notes"/>
-          <p:cNvSpPr/>
+          <p:cNvSpPr>
+            <a:spLocks noGrp="1" noRot="1" noChangeAspect="1"/>
+          </p:cNvSpPr>
           <p:nvPr>
-            <p:ph idx="2" type="sldImg"/>
+            <p:ph type="sldImg" idx="2"/>
           </p:nvPr>
         </p:nvSpPr>
         <p:spPr>
@@ -1327,9 +1374,13 @@
             <a:ext cx="6096300" cy="3429000"/>
           </a:xfrm>
           <a:custGeom>
-            <a:rect b="b" l="l" r="r" t="t"/>
+            <a:avLst/>
+            <a:gdLst/>
+            <a:ahLst/>
+            <a:cxnLst/>
+            <a:rect l="l" t="t" r="r" b="b"/>
             <a:pathLst>
-              <a:path extrusionOk="0" h="120000" w="120000">
+              <a:path w="120000" h="120000" extrusionOk="0">
                 <a:moveTo>
                   <a:pt x="0" y="0"/>
                 </a:moveTo>
@@ -1351,9 +1402,11 @@
       <p:sp>
         <p:nvSpPr>
           <p:cNvPr id="94" name="Google Shape;94;gc6f90357f_0_41:notes"/>
-          <p:cNvSpPr txBox="1"/>
+          <p:cNvSpPr txBox="1">
+            <a:spLocks noGrp="1"/>
+          </p:cNvSpPr>
           <p:nvPr>
-            <p:ph idx="1" type="body"/>
+            <p:ph type="body" idx="1"/>
           </p:nvPr>
         </p:nvSpPr>
         <p:spPr>
@@ -1366,12 +1419,12 @@
           </a:prstGeom>
         </p:spPr>
         <p:txBody>
-          <a:bodyPr anchorCtr="0" anchor="t" bIns="91425" lIns="91425" spcFirstLastPara="1" rIns="91425" wrap="square" tIns="91425">
+          <a:bodyPr spcFirstLastPara="1" wrap="square" lIns="91425" tIns="91425" rIns="91425" bIns="91425" anchor="t" anchorCtr="0">
             <a:noAutofit/>
           </a:bodyPr>
           <a:lstStyle/>
           <a:p>
-            <a:pPr indent="0" lvl="0" marL="0" rtl="0" algn="l">
+            <a:pPr marL="0" lvl="0" indent="0" algn="l" rtl="0">
               <a:spcBef>
                 <a:spcPts val="0"/>
               </a:spcBef>
@@ -1380,9 +1433,6 @@
               </a:spcAft>
               <a:buNone/>
             </a:pPr>
-            <a:r>
-              <a:t/>
-            </a:r>
             <a:endParaRPr/>
           </a:p>
         </p:txBody>
@@ -1396,11 +1446,11 @@
 </file>
 
 <file path=ppt/notesSlides/notesSlide8.xml><?xml version="1.0" encoding="utf-8"?>
-<p:notes xmlns:a="http://schemas.openxmlformats.org/drawingml/2006/main" xmlns:r="http://schemas.openxmlformats.org/officeDocument/2006/relationships" xmlns:mc="http://schemas.openxmlformats.org/markup-compatibility/2006" xmlns:mv="urn:schemas-microsoft-com:mac:vml" xmlns:p="http://schemas.openxmlformats.org/presentationml/2006/main" xmlns:c="http://schemas.openxmlformats.org/drawingml/2006/chart" xmlns:dgm="http://schemas.openxmlformats.org/drawingml/2006/diagram" xmlns:o="urn:schemas-microsoft-com:office:office" xmlns:v="urn:schemas-microsoft-com:vml" xmlns:pvml="urn:schemas-microsoft-com:office:powerpoint" xmlns:com="http://schemas.openxmlformats.org/drawingml/2006/compatibility" xmlns:p14="http://schemas.microsoft.com/office/powerpoint/2010/main" xmlns:p15="http://schemas.microsoft.com/office/powerpoint/2012/main" showMasterPhAnim="0" showMasterSp="0">
+<p:notes xmlns:a="http://schemas.openxmlformats.org/drawingml/2006/main" xmlns:r="http://schemas.openxmlformats.org/officeDocument/2006/relationships" xmlns:p="http://schemas.openxmlformats.org/presentationml/2006/main" showMasterSp="0" showMasterPhAnim="0">
   <p:cSld>
     <p:spTree>
       <p:nvGrpSpPr>
-        <p:cNvPr id="98" name="Shape 98"/>
+        <p:cNvPr id="1" name="Shape 98"/>
         <p:cNvGrpSpPr/>
         <p:nvPr/>
       </p:nvGrpSpPr>
@@ -1415,20 +1465,26 @@
       <p:sp>
         <p:nvSpPr>
           <p:cNvPr id="99" name="Google Shape;99;gc6f90357f_0_47:notes"/>
-          <p:cNvSpPr/>
+          <p:cNvSpPr>
+            <a:spLocks noGrp="1" noRot="1" noChangeAspect="1"/>
+          </p:cNvSpPr>
           <p:nvPr>
-            <p:ph idx="2" type="sldImg"/>
+            <p:ph type="sldImg" idx="2"/>
           </p:nvPr>
         </p:nvSpPr>
         <p:spPr>
           <a:xfrm>
-            <a:off x="381188" y="685800"/>
-            <a:ext cx="6096300" cy="3429000"/>
+            <a:off x="381000" y="685800"/>
+            <a:ext cx="6096000" cy="3429000"/>
           </a:xfrm>
           <a:custGeom>
-            <a:rect b="b" l="l" r="r" t="t"/>
+            <a:avLst/>
+            <a:gdLst/>
+            <a:ahLst/>
+            <a:cxnLst/>
+            <a:rect l="l" t="t" r="r" b="b"/>
             <a:pathLst>
-              <a:path extrusionOk="0" h="120000" w="120000">
+              <a:path w="120000" h="120000" extrusionOk="0">
                 <a:moveTo>
                   <a:pt x="0" y="0"/>
                 </a:moveTo>
@@ -1450,9 +1506,11 @@
       <p:sp>
         <p:nvSpPr>
           <p:cNvPr id="100" name="Google Shape;100;gc6f90357f_0_47:notes"/>
-          <p:cNvSpPr txBox="1"/>
+          <p:cNvSpPr txBox="1">
+            <a:spLocks noGrp="1"/>
+          </p:cNvSpPr>
           <p:nvPr>
-            <p:ph idx="1" type="body"/>
+            <p:ph type="body" idx="1"/>
           </p:nvPr>
         </p:nvSpPr>
         <p:spPr>
@@ -1465,12 +1523,12 @@
           </a:prstGeom>
         </p:spPr>
         <p:txBody>
-          <a:bodyPr anchorCtr="0" anchor="t" bIns="91425" lIns="91425" spcFirstLastPara="1" rIns="91425" wrap="square" tIns="91425">
+          <a:bodyPr spcFirstLastPara="1" wrap="square" lIns="91425" tIns="91425" rIns="91425" bIns="91425" anchor="t" anchorCtr="0">
             <a:noAutofit/>
           </a:bodyPr>
           <a:lstStyle/>
           <a:p>
-            <a:pPr indent="0" lvl="0" marL="0" rtl="0" algn="l">
+            <a:pPr marL="0" lvl="0" indent="0" algn="l" rtl="0">
               <a:spcBef>
                 <a:spcPts val="0"/>
               </a:spcBef>
@@ -1479,9 +1537,6 @@
               </a:spcAft>
               <a:buNone/>
             </a:pPr>
-            <a:r>
-              <a:t/>
-            </a:r>
             <a:endParaRPr/>
           </a:p>
         </p:txBody>
@@ -1495,11 +1550,11 @@
 </file>
 
 <file path=ppt/slideLayouts/slideLayout1.xml><?xml version="1.0" encoding="utf-8"?>
-<p:sldLayout xmlns:a="http://schemas.openxmlformats.org/drawingml/2006/main" xmlns:r="http://schemas.openxmlformats.org/officeDocument/2006/relationships" xmlns:mc="http://schemas.openxmlformats.org/markup-compatibility/2006" xmlns:mv="urn:schemas-microsoft-com:mac:vml" xmlns:p="http://schemas.openxmlformats.org/presentationml/2006/main" xmlns:c="http://schemas.openxmlformats.org/drawingml/2006/chart" xmlns:dgm="http://schemas.openxmlformats.org/drawingml/2006/diagram" xmlns:o="urn:schemas-microsoft-com:office:office" xmlns:v="urn:schemas-microsoft-com:vml" xmlns:pvml="urn:schemas-microsoft-com:office:powerpoint" xmlns:com="http://schemas.openxmlformats.org/drawingml/2006/compatibility" xmlns:p14="http://schemas.microsoft.com/office/powerpoint/2010/main" xmlns:p15="http://schemas.microsoft.com/office/powerpoint/2012/main" matchingName="Title slide" type="title">
+<p:sldLayout xmlns:a="http://schemas.openxmlformats.org/drawingml/2006/main" xmlns:r="http://schemas.openxmlformats.org/officeDocument/2006/relationships" xmlns:p="http://schemas.openxmlformats.org/presentationml/2006/main" matchingName="Title slide" type="title">
   <p:cSld name="TITLE">
     <p:spTree>
       <p:nvGrpSpPr>
-        <p:cNvPr id="9" name="Shape 9"/>
+        <p:cNvPr id="1" name="Shape 9"/>
         <p:cNvGrpSpPr/>
         <p:nvPr/>
       </p:nvGrpSpPr>
@@ -1547,12 +1602,12 @@
             </a:ln>
           </p:spPr>
           <p:txBody>
-            <a:bodyPr anchorCtr="0" anchor="ctr" bIns="91425" lIns="91425" spcFirstLastPara="1" rIns="91425" wrap="square" tIns="91425">
+            <a:bodyPr spcFirstLastPara="1" wrap="square" lIns="91425" tIns="91425" rIns="91425" bIns="91425" anchor="ctr" anchorCtr="0">
               <a:noAutofit/>
             </a:bodyPr>
             <a:lstStyle/>
             <a:p>
-              <a:pPr indent="0" lvl="0" marL="0" rtl="0" algn="l">
+              <a:pPr marL="0" lvl="0" indent="0" algn="l" rtl="0">
                 <a:spcBef>
                   <a:spcPts val="0"/>
                 </a:spcBef>
@@ -1561,9 +1616,6 @@
                 </a:spcAft>
                 <a:buNone/>
               </a:pPr>
-              <a:r>
-                <a:t/>
-              </a:r>
               <a:endParaRPr/>
             </a:p>
           </p:txBody>
@@ -1590,12 +1642,12 @@
             </a:ln>
           </p:spPr>
           <p:txBody>
-            <a:bodyPr anchorCtr="0" anchor="ctr" bIns="91425" lIns="91425" spcFirstLastPara="1" rIns="91425" wrap="square" tIns="91425">
+            <a:bodyPr spcFirstLastPara="1" wrap="square" lIns="91425" tIns="91425" rIns="91425" bIns="91425" anchor="ctr" anchorCtr="0">
               <a:noAutofit/>
             </a:bodyPr>
             <a:lstStyle/>
             <a:p>
-              <a:pPr indent="0" lvl="0" marL="0" rtl="0" algn="l">
+              <a:pPr marL="0" lvl="0" indent="0" algn="l" rtl="0">
                 <a:spcBef>
                   <a:spcPts val="0"/>
                 </a:spcBef>
@@ -1604,9 +1656,6 @@
                 </a:spcAft>
                 <a:buNone/>
               </a:pPr>
-              <a:r>
-                <a:t/>
-              </a:r>
               <a:endParaRPr/>
             </a:p>
           </p:txBody>
@@ -1633,12 +1682,12 @@
             </a:ln>
           </p:spPr>
           <p:txBody>
-            <a:bodyPr anchorCtr="0" anchor="ctr" bIns="91425" lIns="91425" spcFirstLastPara="1" rIns="91425" wrap="square" tIns="91425">
+            <a:bodyPr spcFirstLastPara="1" wrap="square" lIns="91425" tIns="91425" rIns="91425" bIns="91425" anchor="ctr" anchorCtr="0">
               <a:noAutofit/>
             </a:bodyPr>
             <a:lstStyle/>
             <a:p>
-              <a:pPr indent="0" lvl="0" marL="0" rtl="0" algn="l">
+              <a:pPr marL="0" lvl="0" indent="0" algn="l" rtl="0">
                 <a:spcBef>
                   <a:spcPts val="0"/>
                 </a:spcBef>
@@ -1647,9 +1696,6 @@
                 </a:spcAft>
                 <a:buNone/>
               </a:pPr>
-              <a:r>
-                <a:t/>
-              </a:r>
               <a:endParaRPr/>
             </a:p>
           </p:txBody>
@@ -1658,7 +1704,9 @@
       <p:sp>
         <p:nvSpPr>
           <p:cNvPr id="14" name="Google Shape;14;p2"/>
-          <p:cNvSpPr txBox="1"/>
+          <p:cNvSpPr txBox="1">
+            <a:spLocks noGrp="1"/>
+          </p:cNvSpPr>
           <p:nvPr>
             <p:ph type="ctrTitle"/>
           </p:nvPr>
@@ -1673,7 +1721,7 @@
           </a:prstGeom>
         </p:spPr>
         <p:txBody>
-          <a:bodyPr anchorCtr="0" anchor="b" bIns="91425" lIns="91425" spcFirstLastPara="1" rIns="91425" wrap="square" tIns="91425"/>
+          <a:bodyPr spcFirstLastPara="1" wrap="square" lIns="91425" tIns="91425" rIns="91425" bIns="91425" anchor="b" anchorCtr="0"/>
           <a:lstStyle>
             <a:lvl1pPr lvl="0" algn="ctr">
               <a:spcBef>
@@ -1775,15 +1823,19 @@
               <a:defRPr sz="4800"/>
             </a:lvl9pPr>
           </a:lstStyle>
-          <a:p/>
+          <a:p>
+            <a:endParaRPr/>
+          </a:p>
         </p:txBody>
       </p:sp>
       <p:sp>
         <p:nvSpPr>
           <p:cNvPr id="15" name="Google Shape;15;p2"/>
-          <p:cNvSpPr txBox="1"/>
+          <p:cNvSpPr txBox="1">
+            <a:spLocks noGrp="1"/>
+          </p:cNvSpPr>
           <p:nvPr>
-            <p:ph idx="1" type="subTitle"/>
+            <p:ph type="subTitle" idx="1"/>
           </p:nvPr>
         </p:nvSpPr>
         <p:spPr>
@@ -1796,7 +1848,7 @@
           </a:prstGeom>
         </p:spPr>
         <p:txBody>
-          <a:bodyPr anchorCtr="0" anchor="t" bIns="91425" lIns="91425" spcFirstLastPara="1" rIns="91425" wrap="square" tIns="91425"/>
+          <a:bodyPr spcFirstLastPara="1" wrap="square" lIns="91425" tIns="91425" rIns="91425" bIns="91425" anchor="t" anchorCtr="0"/>
           <a:lstStyle>
             <a:lvl1pPr lvl="0" algn="ctr">
               <a:lnSpc>
@@ -1925,15 +1977,19 @@
               <a:defRPr sz="2100"/>
             </a:lvl9pPr>
           </a:lstStyle>
-          <a:p/>
+          <a:p>
+            <a:endParaRPr/>
+          </a:p>
         </p:txBody>
       </p:sp>
       <p:sp>
         <p:nvSpPr>
           <p:cNvPr id="16" name="Google Shape;16;p2"/>
-          <p:cNvSpPr txBox="1"/>
+          <p:cNvSpPr txBox="1">
+            <a:spLocks noGrp="1"/>
+          </p:cNvSpPr>
           <p:nvPr>
-            <p:ph idx="12" type="sldNum"/>
+            <p:ph type="sldNum" idx="12"/>
           </p:nvPr>
         </p:nvSpPr>
         <p:spPr>
@@ -1946,7 +2002,7 @@
           </a:prstGeom>
         </p:spPr>
         <p:txBody>
-          <a:bodyPr anchorCtr="0" anchor="ctr" bIns="91425" lIns="91425" spcFirstLastPara="1" rIns="91425" wrap="square" tIns="91425">
+          <a:bodyPr spcFirstLastPara="1" wrap="square" lIns="91425" tIns="91425" rIns="91425" bIns="91425" anchor="ctr" anchorCtr="0">
             <a:noAutofit/>
           </a:bodyPr>
           <a:lstStyle>
@@ -1988,7 +2044,7 @@
             </a:lvl9pPr>
           </a:lstStyle>
           <a:p>
-            <a:pPr indent="0" lvl="0" marL="0" rtl="0" algn="r">
+            <a:pPr marL="0" lvl="0" indent="0" algn="r" rtl="0">
               <a:spcBef>
                 <a:spcPts val="0"/>
               </a:spcBef>
@@ -2014,11 +2070,11 @@
 </file>
 
 <file path=ppt/slideLayouts/slideLayout10.xml><?xml version="1.0" encoding="utf-8"?>
-<p:sldLayout xmlns:a="http://schemas.openxmlformats.org/drawingml/2006/main" xmlns:r="http://schemas.openxmlformats.org/officeDocument/2006/relationships" xmlns:mc="http://schemas.openxmlformats.org/markup-compatibility/2006" xmlns:mv="urn:schemas-microsoft-com:mac:vml" xmlns:p="http://schemas.openxmlformats.org/presentationml/2006/main" xmlns:c="http://schemas.openxmlformats.org/drawingml/2006/chart" xmlns:dgm="http://schemas.openxmlformats.org/drawingml/2006/diagram" xmlns:o="urn:schemas-microsoft-com:office:office" xmlns:v="urn:schemas-microsoft-com:vml" xmlns:pvml="urn:schemas-microsoft-com:office:powerpoint" xmlns:com="http://schemas.openxmlformats.org/drawingml/2006/compatibility" xmlns:p14="http://schemas.microsoft.com/office/powerpoint/2010/main" xmlns:p15="http://schemas.microsoft.com/office/powerpoint/2012/main" matchingName="Big number">
+<p:sldLayout xmlns:a="http://schemas.openxmlformats.org/drawingml/2006/main" xmlns:r="http://schemas.openxmlformats.org/officeDocument/2006/relationships" xmlns:p="http://schemas.openxmlformats.org/presentationml/2006/main" matchingName="Big number">
   <p:cSld name="BIG_NUMBER">
     <p:spTree>
       <p:nvGrpSpPr>
-        <p:cNvPr id="49" name="Shape 49"/>
+        <p:cNvPr id="1" name="Shape 49"/>
         <p:cNvGrpSpPr/>
         <p:nvPr/>
       </p:nvGrpSpPr>
@@ -2033,9 +2089,11 @@
       <p:sp>
         <p:nvSpPr>
           <p:cNvPr id="50" name="Google Shape;50;p11"/>
-          <p:cNvSpPr txBox="1"/>
+          <p:cNvSpPr txBox="1">
+            <a:spLocks noGrp="1"/>
+          </p:cNvSpPr>
           <p:nvPr>
-            <p:ph hasCustomPrompt="1" type="title"/>
+            <p:ph type="title" hasCustomPrompt="1"/>
           </p:nvPr>
         </p:nvSpPr>
         <p:spPr>
@@ -2048,7 +2106,7 @@
           </a:prstGeom>
         </p:spPr>
         <p:txBody>
-          <a:bodyPr anchorCtr="0" anchor="b" bIns="91425" lIns="91425" spcFirstLastPara="1" rIns="91425" wrap="square" tIns="91425"/>
+          <a:bodyPr spcFirstLastPara="1" wrap="square" lIns="91425" tIns="91425" rIns="91425" bIns="91425" anchor="b" anchorCtr="0"/>
           <a:lstStyle>
             <a:lvl1pPr lvl="0" algn="ctr">
               <a:spcBef>
@@ -2160,9 +2218,11 @@
       <p:sp>
         <p:nvSpPr>
           <p:cNvPr id="51" name="Google Shape;51;p11"/>
-          <p:cNvSpPr txBox="1"/>
+          <p:cNvSpPr txBox="1">
+            <a:spLocks noGrp="1"/>
+          </p:cNvSpPr>
           <p:nvPr>
-            <p:ph idx="1" type="body"/>
+            <p:ph type="body" idx="1"/>
           </p:nvPr>
         </p:nvSpPr>
         <p:spPr>
@@ -2175,9 +2235,9 @@
           </a:prstGeom>
         </p:spPr>
         <p:txBody>
-          <a:bodyPr anchorCtr="0" anchor="t" bIns="91425" lIns="91425" spcFirstLastPara="1" rIns="91425" wrap="square" tIns="91425"/>
+          <a:bodyPr spcFirstLastPara="1" wrap="square" lIns="91425" tIns="91425" rIns="91425" bIns="91425" anchor="t" anchorCtr="0"/>
           <a:lstStyle>
-            <a:lvl1pPr indent="-342900" lvl="0" marL="457200" algn="ctr">
+            <a:lvl1pPr marL="457200" lvl="0" indent="-342900" algn="ctr">
               <a:spcBef>
                 <a:spcPts val="0"/>
               </a:spcBef>
@@ -2188,7 +2248,7 @@
               <a:buChar char="●"/>
               <a:defRPr/>
             </a:lvl1pPr>
-            <a:lvl2pPr indent="-317500" lvl="1" marL="914400" algn="ctr">
+            <a:lvl2pPr marL="914400" lvl="1" indent="-317500" algn="ctr">
               <a:spcBef>
                 <a:spcPts val="1600"/>
               </a:spcBef>
@@ -2199,7 +2259,7 @@
               <a:buChar char="○"/>
               <a:defRPr/>
             </a:lvl2pPr>
-            <a:lvl3pPr indent="-317500" lvl="2" marL="1371600" algn="ctr">
+            <a:lvl3pPr marL="1371600" lvl="2" indent="-317500" algn="ctr">
               <a:spcBef>
                 <a:spcPts val="1600"/>
               </a:spcBef>
@@ -2210,7 +2270,7 @@
               <a:buChar char="■"/>
               <a:defRPr/>
             </a:lvl3pPr>
-            <a:lvl4pPr indent="-317500" lvl="3" marL="1828800" algn="ctr">
+            <a:lvl4pPr marL="1828800" lvl="3" indent="-317500" algn="ctr">
               <a:spcBef>
                 <a:spcPts val="1600"/>
               </a:spcBef>
@@ -2221,7 +2281,7 @@
               <a:buChar char="●"/>
               <a:defRPr/>
             </a:lvl4pPr>
-            <a:lvl5pPr indent="-317500" lvl="4" marL="2286000" algn="ctr">
+            <a:lvl5pPr marL="2286000" lvl="4" indent="-317500" algn="ctr">
               <a:spcBef>
                 <a:spcPts val="1600"/>
               </a:spcBef>
@@ -2232,7 +2292,7 @@
               <a:buChar char="○"/>
               <a:defRPr/>
             </a:lvl5pPr>
-            <a:lvl6pPr indent="-317500" lvl="5" marL="2743200" algn="ctr">
+            <a:lvl6pPr marL="2743200" lvl="5" indent="-317500" algn="ctr">
               <a:spcBef>
                 <a:spcPts val="1600"/>
               </a:spcBef>
@@ -2243,7 +2303,7 @@
               <a:buChar char="■"/>
               <a:defRPr/>
             </a:lvl6pPr>
-            <a:lvl7pPr indent="-317500" lvl="6" marL="3200400" algn="ctr">
+            <a:lvl7pPr marL="3200400" lvl="6" indent="-317500" algn="ctr">
               <a:spcBef>
                 <a:spcPts val="1600"/>
               </a:spcBef>
@@ -2254,7 +2314,7 @@
               <a:buChar char="●"/>
               <a:defRPr/>
             </a:lvl7pPr>
-            <a:lvl8pPr indent="-317500" lvl="7" marL="3657600" algn="ctr">
+            <a:lvl8pPr marL="3657600" lvl="7" indent="-317500" algn="ctr">
               <a:spcBef>
                 <a:spcPts val="1600"/>
               </a:spcBef>
@@ -2265,7 +2325,7 @@
               <a:buChar char="○"/>
               <a:defRPr/>
             </a:lvl8pPr>
-            <a:lvl9pPr indent="-317500" lvl="8" marL="4114800" algn="ctr">
+            <a:lvl9pPr marL="4114800" lvl="8" indent="-317500" algn="ctr">
               <a:spcBef>
                 <a:spcPts val="1600"/>
               </a:spcBef>
@@ -2277,15 +2337,19 @@
               <a:defRPr/>
             </a:lvl9pPr>
           </a:lstStyle>
-          <a:p/>
+          <a:p>
+            <a:endParaRPr/>
+          </a:p>
         </p:txBody>
       </p:sp>
       <p:sp>
         <p:nvSpPr>
           <p:cNvPr id="52" name="Google Shape;52;p11"/>
-          <p:cNvSpPr txBox="1"/>
+          <p:cNvSpPr txBox="1">
+            <a:spLocks noGrp="1"/>
+          </p:cNvSpPr>
           <p:nvPr>
-            <p:ph idx="12" type="sldNum"/>
+            <p:ph type="sldNum" idx="12"/>
           </p:nvPr>
         </p:nvSpPr>
         <p:spPr>
@@ -2298,7 +2362,7 @@
           </a:prstGeom>
         </p:spPr>
         <p:txBody>
-          <a:bodyPr anchorCtr="0" anchor="ctr" bIns="91425" lIns="91425" spcFirstLastPara="1" rIns="91425" wrap="square" tIns="91425">
+          <a:bodyPr spcFirstLastPara="1" wrap="square" lIns="91425" tIns="91425" rIns="91425" bIns="91425" anchor="ctr" anchorCtr="0">
             <a:noAutofit/>
           </a:bodyPr>
           <a:lstStyle>
@@ -2340,7 +2404,7 @@
             </a:lvl9pPr>
           </a:lstStyle>
           <a:p>
-            <a:pPr indent="0" lvl="0" marL="0" rtl="0" algn="r">
+            <a:pPr marL="0" lvl="0" indent="0" algn="r" rtl="0">
               <a:spcBef>
                 <a:spcPts val="0"/>
               </a:spcBef>
@@ -2366,11 +2430,11 @@
 </file>
 
 <file path=ppt/slideLayouts/slideLayout11.xml><?xml version="1.0" encoding="utf-8"?>
-<p:sldLayout xmlns:a="http://schemas.openxmlformats.org/drawingml/2006/main" xmlns:r="http://schemas.openxmlformats.org/officeDocument/2006/relationships" xmlns:mc="http://schemas.openxmlformats.org/markup-compatibility/2006" xmlns:mv="urn:schemas-microsoft-com:mac:vml" xmlns:p="http://schemas.openxmlformats.org/presentationml/2006/main" xmlns:c="http://schemas.openxmlformats.org/drawingml/2006/chart" xmlns:dgm="http://schemas.openxmlformats.org/drawingml/2006/diagram" xmlns:o="urn:schemas-microsoft-com:office:office" xmlns:v="urn:schemas-microsoft-com:vml" xmlns:pvml="urn:schemas-microsoft-com:office:powerpoint" xmlns:com="http://schemas.openxmlformats.org/drawingml/2006/compatibility" xmlns:p14="http://schemas.microsoft.com/office/powerpoint/2010/main" xmlns:p15="http://schemas.microsoft.com/office/powerpoint/2012/main" matchingName="Blank" type="blank">
+<p:sldLayout xmlns:a="http://schemas.openxmlformats.org/drawingml/2006/main" xmlns:r="http://schemas.openxmlformats.org/officeDocument/2006/relationships" xmlns:p="http://schemas.openxmlformats.org/presentationml/2006/main" matchingName="Blank" type="blank">
   <p:cSld name="BLANK">
     <p:spTree>
       <p:nvGrpSpPr>
-        <p:cNvPr id="53" name="Shape 53"/>
+        <p:cNvPr id="1" name="Shape 53"/>
         <p:cNvGrpSpPr/>
         <p:nvPr/>
       </p:nvGrpSpPr>
@@ -2385,9 +2449,11 @@
       <p:sp>
         <p:nvSpPr>
           <p:cNvPr id="54" name="Google Shape;54;p12"/>
-          <p:cNvSpPr txBox="1"/>
+          <p:cNvSpPr txBox="1">
+            <a:spLocks noGrp="1"/>
+          </p:cNvSpPr>
           <p:nvPr>
-            <p:ph idx="12" type="sldNum"/>
+            <p:ph type="sldNum" idx="12"/>
           </p:nvPr>
         </p:nvSpPr>
         <p:spPr>
@@ -2400,7 +2466,7 @@
           </a:prstGeom>
         </p:spPr>
         <p:txBody>
-          <a:bodyPr anchorCtr="0" anchor="ctr" bIns="91425" lIns="91425" spcFirstLastPara="1" rIns="91425" wrap="square" tIns="91425">
+          <a:bodyPr spcFirstLastPara="1" wrap="square" lIns="91425" tIns="91425" rIns="91425" bIns="91425" anchor="ctr" anchorCtr="0">
             <a:noAutofit/>
           </a:bodyPr>
           <a:lstStyle>
@@ -2442,7 +2508,7 @@
             </a:lvl9pPr>
           </a:lstStyle>
           <a:p>
-            <a:pPr indent="0" lvl="0" marL="0" rtl="0" algn="r">
+            <a:pPr marL="0" lvl="0" indent="0" algn="r" rtl="0">
               <a:spcBef>
                 <a:spcPts val="0"/>
               </a:spcBef>
@@ -2468,11 +2534,11 @@
 </file>
 
 <file path=ppt/slideLayouts/slideLayout2.xml><?xml version="1.0" encoding="utf-8"?>
-<p:sldLayout xmlns:a="http://schemas.openxmlformats.org/drawingml/2006/main" xmlns:r="http://schemas.openxmlformats.org/officeDocument/2006/relationships" xmlns:mc="http://schemas.openxmlformats.org/markup-compatibility/2006" xmlns:mv="urn:schemas-microsoft-com:mac:vml" xmlns:p="http://schemas.openxmlformats.org/presentationml/2006/main" xmlns:c="http://schemas.openxmlformats.org/drawingml/2006/chart" xmlns:dgm="http://schemas.openxmlformats.org/drawingml/2006/diagram" xmlns:o="urn:schemas-microsoft-com:office:office" xmlns:v="urn:schemas-microsoft-com:vml" xmlns:pvml="urn:schemas-microsoft-com:office:powerpoint" xmlns:com="http://schemas.openxmlformats.org/drawingml/2006/compatibility" xmlns:p14="http://schemas.microsoft.com/office/powerpoint/2010/main" xmlns:p15="http://schemas.microsoft.com/office/powerpoint/2012/main" matchingName="Section header" type="secHead">
+<p:sldLayout xmlns:a="http://schemas.openxmlformats.org/drawingml/2006/main" xmlns:r="http://schemas.openxmlformats.org/officeDocument/2006/relationships" xmlns:p="http://schemas.openxmlformats.org/presentationml/2006/main" matchingName="Section header" type="secHead">
   <p:cSld name="SECTION_HEADER">
     <p:spTree>
       <p:nvGrpSpPr>
-        <p:cNvPr id="17" name="Shape 17"/>
+        <p:cNvPr id="1" name="Shape 17"/>
         <p:cNvGrpSpPr/>
         <p:nvPr/>
       </p:nvGrpSpPr>
@@ -2487,7 +2553,9 @@
       <p:sp>
         <p:nvSpPr>
           <p:cNvPr id="18" name="Google Shape;18;p3"/>
-          <p:cNvSpPr txBox="1"/>
+          <p:cNvSpPr txBox="1">
+            <a:spLocks noGrp="1"/>
+          </p:cNvSpPr>
           <p:nvPr>
             <p:ph type="title"/>
           </p:nvPr>
@@ -2502,7 +2570,7 @@
           </a:prstGeom>
         </p:spPr>
         <p:txBody>
-          <a:bodyPr anchorCtr="0" anchor="ctr" bIns="91425" lIns="91425" spcFirstLastPara="1" rIns="91425" wrap="square" tIns="91425"/>
+          <a:bodyPr spcFirstLastPara="1" wrap="square" lIns="91425" tIns="91425" rIns="91425" bIns="91425" anchor="ctr" anchorCtr="0"/>
           <a:lstStyle>
             <a:lvl1pPr lvl="0" algn="ctr">
               <a:spcBef>
@@ -2604,15 +2672,19 @@
               <a:defRPr sz="3600"/>
             </a:lvl9pPr>
           </a:lstStyle>
-          <a:p/>
+          <a:p>
+            <a:endParaRPr/>
+          </a:p>
         </p:txBody>
       </p:sp>
       <p:sp>
         <p:nvSpPr>
           <p:cNvPr id="19" name="Google Shape;19;p3"/>
-          <p:cNvSpPr txBox="1"/>
+          <p:cNvSpPr txBox="1">
+            <a:spLocks noGrp="1"/>
+          </p:cNvSpPr>
           <p:nvPr>
-            <p:ph idx="12" type="sldNum"/>
+            <p:ph type="sldNum" idx="12"/>
           </p:nvPr>
         </p:nvSpPr>
         <p:spPr>
@@ -2625,7 +2697,7 @@
           </a:prstGeom>
         </p:spPr>
         <p:txBody>
-          <a:bodyPr anchorCtr="0" anchor="ctr" bIns="91425" lIns="91425" spcFirstLastPara="1" rIns="91425" wrap="square" tIns="91425">
+          <a:bodyPr spcFirstLastPara="1" wrap="square" lIns="91425" tIns="91425" rIns="91425" bIns="91425" anchor="ctr" anchorCtr="0">
             <a:noAutofit/>
           </a:bodyPr>
           <a:lstStyle>
@@ -2667,7 +2739,7 @@
             </a:lvl9pPr>
           </a:lstStyle>
           <a:p>
-            <a:pPr indent="0" lvl="0" marL="0" rtl="0" algn="r">
+            <a:pPr marL="0" lvl="0" indent="0" algn="r" rtl="0">
               <a:spcBef>
                 <a:spcPts val="0"/>
               </a:spcBef>
@@ -2693,11 +2765,11 @@
 </file>
 
 <file path=ppt/slideLayouts/slideLayout3.xml><?xml version="1.0" encoding="utf-8"?>
-<p:sldLayout xmlns:a="http://schemas.openxmlformats.org/drawingml/2006/main" xmlns:r="http://schemas.openxmlformats.org/officeDocument/2006/relationships" xmlns:mc="http://schemas.openxmlformats.org/markup-compatibility/2006" xmlns:mv="urn:schemas-microsoft-com:mac:vml" xmlns:p="http://schemas.openxmlformats.org/presentationml/2006/main" xmlns:c="http://schemas.openxmlformats.org/drawingml/2006/chart" xmlns:dgm="http://schemas.openxmlformats.org/drawingml/2006/diagram" xmlns:o="urn:schemas-microsoft-com:office:office" xmlns:v="urn:schemas-microsoft-com:vml" xmlns:pvml="urn:schemas-microsoft-com:office:powerpoint" xmlns:com="http://schemas.openxmlformats.org/drawingml/2006/compatibility" xmlns:p14="http://schemas.microsoft.com/office/powerpoint/2010/main" xmlns:p15="http://schemas.microsoft.com/office/powerpoint/2012/main" matchingName="Title and body" type="tx">
+<p:sldLayout xmlns:a="http://schemas.openxmlformats.org/drawingml/2006/main" xmlns:r="http://schemas.openxmlformats.org/officeDocument/2006/relationships" xmlns:p="http://schemas.openxmlformats.org/presentationml/2006/main" matchingName="Title and body" type="tx">
   <p:cSld name="TITLE_AND_BODY">
     <p:spTree>
       <p:nvGrpSpPr>
-        <p:cNvPr id="20" name="Shape 20"/>
+        <p:cNvPr id="1" name="Shape 20"/>
         <p:cNvGrpSpPr/>
         <p:nvPr/>
       </p:nvGrpSpPr>
@@ -2712,7 +2784,9 @@
       <p:sp>
         <p:nvSpPr>
           <p:cNvPr id="21" name="Google Shape;21;p4"/>
-          <p:cNvSpPr txBox="1"/>
+          <p:cNvSpPr txBox="1">
+            <a:spLocks noGrp="1"/>
+          </p:cNvSpPr>
           <p:nvPr>
             <p:ph type="title"/>
           </p:nvPr>
@@ -2727,7 +2801,7 @@
           </a:prstGeom>
         </p:spPr>
         <p:txBody>
-          <a:bodyPr anchorCtr="0" anchor="t" bIns="91425" lIns="91425" spcFirstLastPara="1" rIns="91425" wrap="square" tIns="91425"/>
+          <a:bodyPr spcFirstLastPara="1" wrap="square" lIns="91425" tIns="91425" rIns="91425" bIns="91425" anchor="t" anchorCtr="0"/>
           <a:lstStyle>
             <a:lvl1pPr lvl="0">
               <a:spcBef>
@@ -2829,15 +2903,19 @@
               <a:defRPr/>
             </a:lvl9pPr>
           </a:lstStyle>
-          <a:p/>
+          <a:p>
+            <a:endParaRPr/>
+          </a:p>
         </p:txBody>
       </p:sp>
       <p:sp>
         <p:nvSpPr>
           <p:cNvPr id="22" name="Google Shape;22;p4"/>
-          <p:cNvSpPr txBox="1"/>
+          <p:cNvSpPr txBox="1">
+            <a:spLocks noGrp="1"/>
+          </p:cNvSpPr>
           <p:nvPr>
-            <p:ph idx="1" type="body"/>
+            <p:ph type="body" idx="1"/>
           </p:nvPr>
         </p:nvSpPr>
         <p:spPr>
@@ -2850,9 +2928,9 @@
           </a:prstGeom>
         </p:spPr>
         <p:txBody>
-          <a:bodyPr anchorCtr="0" anchor="t" bIns="91425" lIns="91425" spcFirstLastPara="1" rIns="91425" wrap="square" tIns="91425"/>
+          <a:bodyPr spcFirstLastPara="1" wrap="square" lIns="91425" tIns="91425" rIns="91425" bIns="91425" anchor="t" anchorCtr="0"/>
           <a:lstStyle>
-            <a:lvl1pPr indent="-342900" lvl="0" marL="457200">
+            <a:lvl1pPr marL="457200" lvl="0" indent="-342900">
               <a:spcBef>
                 <a:spcPts val="0"/>
               </a:spcBef>
@@ -2863,7 +2941,7 @@
               <a:buChar char="●"/>
               <a:defRPr/>
             </a:lvl1pPr>
-            <a:lvl2pPr indent="-317500" lvl="1" marL="914400">
+            <a:lvl2pPr marL="914400" lvl="1" indent="-317500">
               <a:spcBef>
                 <a:spcPts val="1600"/>
               </a:spcBef>
@@ -2874,7 +2952,7 @@
               <a:buChar char="○"/>
               <a:defRPr/>
             </a:lvl2pPr>
-            <a:lvl3pPr indent="-317500" lvl="2" marL="1371600">
+            <a:lvl3pPr marL="1371600" lvl="2" indent="-317500">
               <a:spcBef>
                 <a:spcPts val="1600"/>
               </a:spcBef>
@@ -2885,7 +2963,7 @@
               <a:buChar char="■"/>
               <a:defRPr/>
             </a:lvl3pPr>
-            <a:lvl4pPr indent="-317500" lvl="3" marL="1828800">
+            <a:lvl4pPr marL="1828800" lvl="3" indent="-317500">
               <a:spcBef>
                 <a:spcPts val="1600"/>
               </a:spcBef>
@@ -2896,7 +2974,7 @@
               <a:buChar char="●"/>
               <a:defRPr/>
             </a:lvl4pPr>
-            <a:lvl5pPr indent="-317500" lvl="4" marL="2286000">
+            <a:lvl5pPr marL="2286000" lvl="4" indent="-317500">
               <a:spcBef>
                 <a:spcPts val="1600"/>
               </a:spcBef>
@@ -2907,7 +2985,7 @@
               <a:buChar char="○"/>
               <a:defRPr/>
             </a:lvl5pPr>
-            <a:lvl6pPr indent="-317500" lvl="5" marL="2743200">
+            <a:lvl6pPr marL="2743200" lvl="5" indent="-317500">
               <a:spcBef>
                 <a:spcPts val="1600"/>
               </a:spcBef>
@@ -2918,7 +2996,7 @@
               <a:buChar char="■"/>
               <a:defRPr/>
             </a:lvl6pPr>
-            <a:lvl7pPr indent="-317500" lvl="6" marL="3200400">
+            <a:lvl7pPr marL="3200400" lvl="6" indent="-317500">
               <a:spcBef>
                 <a:spcPts val="1600"/>
               </a:spcBef>
@@ -2929,7 +3007,7 @@
               <a:buChar char="●"/>
               <a:defRPr/>
             </a:lvl7pPr>
-            <a:lvl8pPr indent="-317500" lvl="7" marL="3657600">
+            <a:lvl8pPr marL="3657600" lvl="7" indent="-317500">
               <a:spcBef>
                 <a:spcPts val="1600"/>
               </a:spcBef>
@@ -2940,7 +3018,7 @@
               <a:buChar char="○"/>
               <a:defRPr/>
             </a:lvl8pPr>
-            <a:lvl9pPr indent="-317500" lvl="8" marL="4114800">
+            <a:lvl9pPr marL="4114800" lvl="8" indent="-317500">
               <a:spcBef>
                 <a:spcPts val="1600"/>
               </a:spcBef>
@@ -2952,15 +3030,19 @@
               <a:defRPr/>
             </a:lvl9pPr>
           </a:lstStyle>
-          <a:p/>
+          <a:p>
+            <a:endParaRPr/>
+          </a:p>
         </p:txBody>
       </p:sp>
       <p:sp>
         <p:nvSpPr>
           <p:cNvPr id="23" name="Google Shape;23;p4"/>
-          <p:cNvSpPr txBox="1"/>
+          <p:cNvSpPr txBox="1">
+            <a:spLocks noGrp="1"/>
+          </p:cNvSpPr>
           <p:nvPr>
-            <p:ph idx="12" type="sldNum"/>
+            <p:ph type="sldNum" idx="12"/>
           </p:nvPr>
         </p:nvSpPr>
         <p:spPr>
@@ -2973,7 +3055,7 @@
           </a:prstGeom>
         </p:spPr>
         <p:txBody>
-          <a:bodyPr anchorCtr="0" anchor="ctr" bIns="91425" lIns="91425" spcFirstLastPara="1" rIns="91425" wrap="square" tIns="91425">
+          <a:bodyPr spcFirstLastPara="1" wrap="square" lIns="91425" tIns="91425" rIns="91425" bIns="91425" anchor="ctr" anchorCtr="0">
             <a:noAutofit/>
           </a:bodyPr>
           <a:lstStyle>
@@ -3015,7 +3097,7 @@
             </a:lvl9pPr>
           </a:lstStyle>
           <a:p>
-            <a:pPr indent="0" lvl="0" marL="0" rtl="0" algn="r">
+            <a:pPr marL="0" lvl="0" indent="0" algn="r" rtl="0">
               <a:spcBef>
                 <a:spcPts val="0"/>
               </a:spcBef>
@@ -3041,11 +3123,11 @@
 </file>
 
 <file path=ppt/slideLayouts/slideLayout4.xml><?xml version="1.0" encoding="utf-8"?>
-<p:sldLayout xmlns:a="http://schemas.openxmlformats.org/drawingml/2006/main" xmlns:r="http://schemas.openxmlformats.org/officeDocument/2006/relationships" xmlns:mc="http://schemas.openxmlformats.org/markup-compatibility/2006" xmlns:mv="urn:schemas-microsoft-com:mac:vml" xmlns:p="http://schemas.openxmlformats.org/presentationml/2006/main" xmlns:c="http://schemas.openxmlformats.org/drawingml/2006/chart" xmlns:dgm="http://schemas.openxmlformats.org/drawingml/2006/diagram" xmlns:o="urn:schemas-microsoft-com:office:office" xmlns:v="urn:schemas-microsoft-com:vml" xmlns:pvml="urn:schemas-microsoft-com:office:powerpoint" xmlns:com="http://schemas.openxmlformats.org/drawingml/2006/compatibility" xmlns:p14="http://schemas.microsoft.com/office/powerpoint/2010/main" xmlns:p15="http://schemas.microsoft.com/office/powerpoint/2012/main" matchingName="Title and two columns" type="twoColTx">
+<p:sldLayout xmlns:a="http://schemas.openxmlformats.org/drawingml/2006/main" xmlns:r="http://schemas.openxmlformats.org/officeDocument/2006/relationships" xmlns:p="http://schemas.openxmlformats.org/presentationml/2006/main" matchingName="Title and two columns" type="twoColTx">
   <p:cSld name="TITLE_AND_TWO_COLUMNS">
     <p:spTree>
       <p:nvGrpSpPr>
-        <p:cNvPr id="24" name="Shape 24"/>
+        <p:cNvPr id="1" name="Shape 24"/>
         <p:cNvGrpSpPr/>
         <p:nvPr/>
       </p:nvGrpSpPr>
@@ -3060,7 +3142,9 @@
       <p:sp>
         <p:nvSpPr>
           <p:cNvPr id="25" name="Google Shape;25;p5"/>
-          <p:cNvSpPr txBox="1"/>
+          <p:cNvSpPr txBox="1">
+            <a:spLocks noGrp="1"/>
+          </p:cNvSpPr>
           <p:nvPr>
             <p:ph type="title"/>
           </p:nvPr>
@@ -3075,7 +3159,7 @@
           </a:prstGeom>
         </p:spPr>
         <p:txBody>
-          <a:bodyPr anchorCtr="0" anchor="t" bIns="91425" lIns="91425" spcFirstLastPara="1" rIns="91425" wrap="square" tIns="91425"/>
+          <a:bodyPr spcFirstLastPara="1" wrap="square" lIns="91425" tIns="91425" rIns="91425" bIns="91425" anchor="t" anchorCtr="0"/>
           <a:lstStyle>
             <a:lvl1pPr lvl="0">
               <a:spcBef>
@@ -3177,15 +3261,19 @@
               <a:defRPr/>
             </a:lvl9pPr>
           </a:lstStyle>
-          <a:p/>
+          <a:p>
+            <a:endParaRPr/>
+          </a:p>
         </p:txBody>
       </p:sp>
       <p:sp>
         <p:nvSpPr>
           <p:cNvPr id="26" name="Google Shape;26;p5"/>
-          <p:cNvSpPr txBox="1"/>
+          <p:cNvSpPr txBox="1">
+            <a:spLocks noGrp="1"/>
+          </p:cNvSpPr>
           <p:nvPr>
-            <p:ph idx="1" type="body"/>
+            <p:ph type="body" idx="1"/>
           </p:nvPr>
         </p:nvSpPr>
         <p:spPr>
@@ -3198,9 +3286,9 @@
           </a:prstGeom>
         </p:spPr>
         <p:txBody>
-          <a:bodyPr anchorCtr="0" anchor="t" bIns="91425" lIns="91425" spcFirstLastPara="1" rIns="91425" wrap="square" tIns="91425"/>
+          <a:bodyPr spcFirstLastPara="1" wrap="square" lIns="91425" tIns="91425" rIns="91425" bIns="91425" anchor="t" anchorCtr="0"/>
           <a:lstStyle>
-            <a:lvl1pPr indent="-317500" lvl="0" marL="457200">
+            <a:lvl1pPr marL="457200" lvl="0" indent="-317500">
               <a:spcBef>
                 <a:spcPts val="0"/>
               </a:spcBef>
@@ -3211,7 +3299,7 @@
               <a:buChar char="●"/>
               <a:defRPr sz="1400"/>
             </a:lvl1pPr>
-            <a:lvl2pPr indent="-304800" lvl="1" marL="914400">
+            <a:lvl2pPr marL="914400" lvl="1" indent="-304800">
               <a:spcBef>
                 <a:spcPts val="1600"/>
               </a:spcBef>
@@ -3222,7 +3310,7 @@
               <a:buChar char="○"/>
               <a:defRPr sz="1200"/>
             </a:lvl2pPr>
-            <a:lvl3pPr indent="-304800" lvl="2" marL="1371600">
+            <a:lvl3pPr marL="1371600" lvl="2" indent="-304800">
               <a:spcBef>
                 <a:spcPts val="1600"/>
               </a:spcBef>
@@ -3233,7 +3321,7 @@
               <a:buChar char="■"/>
               <a:defRPr sz="1200"/>
             </a:lvl3pPr>
-            <a:lvl4pPr indent="-304800" lvl="3" marL="1828800">
+            <a:lvl4pPr marL="1828800" lvl="3" indent="-304800">
               <a:spcBef>
                 <a:spcPts val="1600"/>
               </a:spcBef>
@@ -3244,7 +3332,7 @@
               <a:buChar char="●"/>
               <a:defRPr sz="1200"/>
             </a:lvl4pPr>
-            <a:lvl5pPr indent="-304800" lvl="4" marL="2286000">
+            <a:lvl5pPr marL="2286000" lvl="4" indent="-304800">
               <a:spcBef>
                 <a:spcPts val="1600"/>
               </a:spcBef>
@@ -3255,7 +3343,7 @@
               <a:buChar char="○"/>
               <a:defRPr sz="1200"/>
             </a:lvl5pPr>
-            <a:lvl6pPr indent="-304800" lvl="5" marL="2743200">
+            <a:lvl6pPr marL="2743200" lvl="5" indent="-304800">
               <a:spcBef>
                 <a:spcPts val="1600"/>
               </a:spcBef>
@@ -3266,7 +3354,7 @@
               <a:buChar char="■"/>
               <a:defRPr sz="1200"/>
             </a:lvl6pPr>
-            <a:lvl7pPr indent="-304800" lvl="6" marL="3200400">
+            <a:lvl7pPr marL="3200400" lvl="6" indent="-304800">
               <a:spcBef>
                 <a:spcPts val="1600"/>
               </a:spcBef>
@@ -3277,7 +3365,7 @@
               <a:buChar char="●"/>
               <a:defRPr sz="1200"/>
             </a:lvl7pPr>
-            <a:lvl8pPr indent="-304800" lvl="7" marL="3657600">
+            <a:lvl8pPr marL="3657600" lvl="7" indent="-304800">
               <a:spcBef>
                 <a:spcPts val="1600"/>
               </a:spcBef>
@@ -3288,7 +3376,7 @@
               <a:buChar char="○"/>
               <a:defRPr sz="1200"/>
             </a:lvl8pPr>
-            <a:lvl9pPr indent="-304800" lvl="8" marL="4114800">
+            <a:lvl9pPr marL="4114800" lvl="8" indent="-304800">
               <a:spcBef>
                 <a:spcPts val="1600"/>
               </a:spcBef>
@@ -3300,15 +3388,19 @@
               <a:defRPr sz="1200"/>
             </a:lvl9pPr>
           </a:lstStyle>
-          <a:p/>
+          <a:p>
+            <a:endParaRPr/>
+          </a:p>
         </p:txBody>
       </p:sp>
       <p:sp>
         <p:nvSpPr>
           <p:cNvPr id="27" name="Google Shape;27;p5"/>
-          <p:cNvSpPr txBox="1"/>
+          <p:cNvSpPr txBox="1">
+            <a:spLocks noGrp="1"/>
+          </p:cNvSpPr>
           <p:nvPr>
-            <p:ph idx="2" type="body"/>
+            <p:ph type="body" idx="2"/>
           </p:nvPr>
         </p:nvSpPr>
         <p:spPr>
@@ -3321,9 +3413,9 @@
           </a:prstGeom>
         </p:spPr>
         <p:txBody>
-          <a:bodyPr anchorCtr="0" anchor="t" bIns="91425" lIns="91425" spcFirstLastPara="1" rIns="91425" wrap="square" tIns="91425"/>
+          <a:bodyPr spcFirstLastPara="1" wrap="square" lIns="91425" tIns="91425" rIns="91425" bIns="91425" anchor="t" anchorCtr="0"/>
           <a:lstStyle>
-            <a:lvl1pPr indent="-317500" lvl="0" marL="457200">
+            <a:lvl1pPr marL="457200" lvl="0" indent="-317500">
               <a:spcBef>
                 <a:spcPts val="0"/>
               </a:spcBef>
@@ -3334,7 +3426,7 @@
               <a:buChar char="●"/>
               <a:defRPr sz="1400"/>
             </a:lvl1pPr>
-            <a:lvl2pPr indent="-304800" lvl="1" marL="914400">
+            <a:lvl2pPr marL="914400" lvl="1" indent="-304800">
               <a:spcBef>
                 <a:spcPts val="1600"/>
               </a:spcBef>
@@ -3345,7 +3437,7 @@
               <a:buChar char="○"/>
               <a:defRPr sz="1200"/>
             </a:lvl2pPr>
-            <a:lvl3pPr indent="-304800" lvl="2" marL="1371600">
+            <a:lvl3pPr marL="1371600" lvl="2" indent="-304800">
               <a:spcBef>
                 <a:spcPts val="1600"/>
               </a:spcBef>
@@ -3356,7 +3448,7 @@
               <a:buChar char="■"/>
               <a:defRPr sz="1200"/>
             </a:lvl3pPr>
-            <a:lvl4pPr indent="-304800" lvl="3" marL="1828800">
+            <a:lvl4pPr marL="1828800" lvl="3" indent="-304800">
               <a:spcBef>
                 <a:spcPts val="1600"/>
               </a:spcBef>
@@ -3367,7 +3459,7 @@
               <a:buChar char="●"/>
               <a:defRPr sz="1200"/>
             </a:lvl4pPr>
-            <a:lvl5pPr indent="-304800" lvl="4" marL="2286000">
+            <a:lvl5pPr marL="2286000" lvl="4" indent="-304800">
               <a:spcBef>
                 <a:spcPts val="1600"/>
               </a:spcBef>
@@ -3378,7 +3470,7 @@
               <a:buChar char="○"/>
               <a:defRPr sz="1200"/>
             </a:lvl5pPr>
-            <a:lvl6pPr indent="-304800" lvl="5" marL="2743200">
+            <a:lvl6pPr marL="2743200" lvl="5" indent="-304800">
               <a:spcBef>
                 <a:spcPts val="1600"/>
               </a:spcBef>
@@ -3389,7 +3481,7 @@
               <a:buChar char="■"/>
               <a:defRPr sz="1200"/>
             </a:lvl6pPr>
-            <a:lvl7pPr indent="-304800" lvl="6" marL="3200400">
+            <a:lvl7pPr marL="3200400" lvl="6" indent="-304800">
               <a:spcBef>
                 <a:spcPts val="1600"/>
               </a:spcBef>
@@ -3400,7 +3492,7 @@
               <a:buChar char="●"/>
               <a:defRPr sz="1200"/>
             </a:lvl7pPr>
-            <a:lvl8pPr indent="-304800" lvl="7" marL="3657600">
+            <a:lvl8pPr marL="3657600" lvl="7" indent="-304800">
               <a:spcBef>
                 <a:spcPts val="1600"/>
               </a:spcBef>
@@ -3411,7 +3503,7 @@
               <a:buChar char="○"/>
               <a:defRPr sz="1200"/>
             </a:lvl8pPr>
-            <a:lvl9pPr indent="-304800" lvl="8" marL="4114800">
+            <a:lvl9pPr marL="4114800" lvl="8" indent="-304800">
               <a:spcBef>
                 <a:spcPts val="1600"/>
               </a:spcBef>
@@ -3423,15 +3515,19 @@
               <a:defRPr sz="1200"/>
             </a:lvl9pPr>
           </a:lstStyle>
-          <a:p/>
+          <a:p>
+            <a:endParaRPr/>
+          </a:p>
         </p:txBody>
       </p:sp>
       <p:sp>
         <p:nvSpPr>
           <p:cNvPr id="28" name="Google Shape;28;p5"/>
-          <p:cNvSpPr txBox="1"/>
+          <p:cNvSpPr txBox="1">
+            <a:spLocks noGrp="1"/>
+          </p:cNvSpPr>
           <p:nvPr>
-            <p:ph idx="12" type="sldNum"/>
+            <p:ph type="sldNum" idx="12"/>
           </p:nvPr>
         </p:nvSpPr>
         <p:spPr>
@@ -3444,7 +3540,7 @@
           </a:prstGeom>
         </p:spPr>
         <p:txBody>
-          <a:bodyPr anchorCtr="0" anchor="ctr" bIns="91425" lIns="91425" spcFirstLastPara="1" rIns="91425" wrap="square" tIns="91425">
+          <a:bodyPr spcFirstLastPara="1" wrap="square" lIns="91425" tIns="91425" rIns="91425" bIns="91425" anchor="ctr" anchorCtr="0">
             <a:noAutofit/>
           </a:bodyPr>
           <a:lstStyle>
@@ -3486,7 +3582,7 @@
             </a:lvl9pPr>
           </a:lstStyle>
           <a:p>
-            <a:pPr indent="0" lvl="0" marL="0" rtl="0" algn="r">
+            <a:pPr marL="0" lvl="0" indent="0" algn="r" rtl="0">
               <a:spcBef>
                 <a:spcPts val="0"/>
               </a:spcBef>
@@ -3512,11 +3608,11 @@
 </file>
 
 <file path=ppt/slideLayouts/slideLayout5.xml><?xml version="1.0" encoding="utf-8"?>
-<p:sldLayout xmlns:a="http://schemas.openxmlformats.org/drawingml/2006/main" xmlns:r="http://schemas.openxmlformats.org/officeDocument/2006/relationships" xmlns:mc="http://schemas.openxmlformats.org/markup-compatibility/2006" xmlns:mv="urn:schemas-microsoft-com:mac:vml" xmlns:p="http://schemas.openxmlformats.org/presentationml/2006/main" xmlns:c="http://schemas.openxmlformats.org/drawingml/2006/chart" xmlns:dgm="http://schemas.openxmlformats.org/drawingml/2006/diagram" xmlns:o="urn:schemas-microsoft-com:office:office" xmlns:v="urn:schemas-microsoft-com:vml" xmlns:pvml="urn:schemas-microsoft-com:office:powerpoint" xmlns:com="http://schemas.openxmlformats.org/drawingml/2006/compatibility" xmlns:p14="http://schemas.microsoft.com/office/powerpoint/2010/main" xmlns:p15="http://schemas.microsoft.com/office/powerpoint/2012/main" matchingName="Title only" type="titleOnly">
+<p:sldLayout xmlns:a="http://schemas.openxmlformats.org/drawingml/2006/main" xmlns:r="http://schemas.openxmlformats.org/officeDocument/2006/relationships" xmlns:p="http://schemas.openxmlformats.org/presentationml/2006/main" matchingName="Title only" type="titleOnly">
   <p:cSld name="TITLE_ONLY">
     <p:spTree>
       <p:nvGrpSpPr>
-        <p:cNvPr id="29" name="Shape 29"/>
+        <p:cNvPr id="1" name="Shape 29"/>
         <p:cNvGrpSpPr/>
         <p:nvPr/>
       </p:nvGrpSpPr>
@@ -3531,7 +3627,9 @@
       <p:sp>
         <p:nvSpPr>
           <p:cNvPr id="30" name="Google Shape;30;p6"/>
-          <p:cNvSpPr txBox="1"/>
+          <p:cNvSpPr txBox="1">
+            <a:spLocks noGrp="1"/>
+          </p:cNvSpPr>
           <p:nvPr>
             <p:ph type="title"/>
           </p:nvPr>
@@ -3546,7 +3644,7 @@
           </a:prstGeom>
         </p:spPr>
         <p:txBody>
-          <a:bodyPr anchorCtr="0" anchor="t" bIns="91425" lIns="91425" spcFirstLastPara="1" rIns="91425" wrap="square" tIns="91425"/>
+          <a:bodyPr spcFirstLastPara="1" wrap="square" lIns="91425" tIns="91425" rIns="91425" bIns="91425" anchor="t" anchorCtr="0"/>
           <a:lstStyle>
             <a:lvl1pPr lvl="0">
               <a:spcBef>
@@ -3648,15 +3746,19 @@
               <a:defRPr/>
             </a:lvl9pPr>
           </a:lstStyle>
-          <a:p/>
+          <a:p>
+            <a:endParaRPr/>
+          </a:p>
         </p:txBody>
       </p:sp>
       <p:sp>
         <p:nvSpPr>
           <p:cNvPr id="31" name="Google Shape;31;p6"/>
-          <p:cNvSpPr txBox="1"/>
+          <p:cNvSpPr txBox="1">
+            <a:spLocks noGrp="1"/>
+          </p:cNvSpPr>
           <p:nvPr>
-            <p:ph idx="12" type="sldNum"/>
+            <p:ph type="sldNum" idx="12"/>
           </p:nvPr>
         </p:nvSpPr>
         <p:spPr>
@@ -3669,7 +3771,7 @@
           </a:prstGeom>
         </p:spPr>
         <p:txBody>
-          <a:bodyPr anchorCtr="0" anchor="ctr" bIns="91425" lIns="91425" spcFirstLastPara="1" rIns="91425" wrap="square" tIns="91425">
+          <a:bodyPr spcFirstLastPara="1" wrap="square" lIns="91425" tIns="91425" rIns="91425" bIns="91425" anchor="ctr" anchorCtr="0">
             <a:noAutofit/>
           </a:bodyPr>
           <a:lstStyle>
@@ -3711,7 +3813,7 @@
             </a:lvl9pPr>
           </a:lstStyle>
           <a:p>
-            <a:pPr indent="0" lvl="0" marL="0" rtl="0" algn="r">
+            <a:pPr marL="0" lvl="0" indent="0" algn="r" rtl="0">
               <a:spcBef>
                 <a:spcPts val="0"/>
               </a:spcBef>
@@ -3737,11 +3839,11 @@
 </file>
 
 <file path=ppt/slideLayouts/slideLayout6.xml><?xml version="1.0" encoding="utf-8"?>
-<p:sldLayout xmlns:a="http://schemas.openxmlformats.org/drawingml/2006/main" xmlns:r="http://schemas.openxmlformats.org/officeDocument/2006/relationships" xmlns:mc="http://schemas.openxmlformats.org/markup-compatibility/2006" xmlns:mv="urn:schemas-microsoft-com:mac:vml" xmlns:p="http://schemas.openxmlformats.org/presentationml/2006/main" xmlns:c="http://schemas.openxmlformats.org/drawingml/2006/chart" xmlns:dgm="http://schemas.openxmlformats.org/drawingml/2006/diagram" xmlns:o="urn:schemas-microsoft-com:office:office" xmlns:v="urn:schemas-microsoft-com:vml" xmlns:pvml="urn:schemas-microsoft-com:office:powerpoint" xmlns:com="http://schemas.openxmlformats.org/drawingml/2006/compatibility" xmlns:p14="http://schemas.microsoft.com/office/powerpoint/2010/main" xmlns:p15="http://schemas.microsoft.com/office/powerpoint/2012/main" matchingName="One column text">
+<p:sldLayout xmlns:a="http://schemas.openxmlformats.org/drawingml/2006/main" xmlns:r="http://schemas.openxmlformats.org/officeDocument/2006/relationships" xmlns:p="http://schemas.openxmlformats.org/presentationml/2006/main" matchingName="One column text">
   <p:cSld name="ONE_COLUMN_TEXT">
     <p:spTree>
       <p:nvGrpSpPr>
-        <p:cNvPr id="32" name="Shape 32"/>
+        <p:cNvPr id="1" name="Shape 32"/>
         <p:cNvGrpSpPr/>
         <p:nvPr/>
       </p:nvGrpSpPr>
@@ -3756,7 +3858,9 @@
       <p:sp>
         <p:nvSpPr>
           <p:cNvPr id="33" name="Google Shape;33;p7"/>
-          <p:cNvSpPr txBox="1"/>
+          <p:cNvSpPr txBox="1">
+            <a:spLocks noGrp="1"/>
+          </p:cNvSpPr>
           <p:nvPr>
             <p:ph type="title"/>
           </p:nvPr>
@@ -3771,7 +3875,7 @@
           </a:prstGeom>
         </p:spPr>
         <p:txBody>
-          <a:bodyPr anchorCtr="0" anchor="b" bIns="91425" lIns="91425" spcFirstLastPara="1" rIns="91425" wrap="square" tIns="91425"/>
+          <a:bodyPr spcFirstLastPara="1" wrap="square" lIns="91425" tIns="91425" rIns="91425" bIns="91425" anchor="b" anchorCtr="0"/>
           <a:lstStyle>
             <a:lvl1pPr lvl="0">
               <a:spcBef>
@@ -3873,15 +3977,19 @@
               <a:defRPr sz="2400"/>
             </a:lvl9pPr>
           </a:lstStyle>
-          <a:p/>
+          <a:p>
+            <a:endParaRPr/>
+          </a:p>
         </p:txBody>
       </p:sp>
       <p:sp>
         <p:nvSpPr>
           <p:cNvPr id="34" name="Google Shape;34;p7"/>
-          <p:cNvSpPr txBox="1"/>
+          <p:cNvSpPr txBox="1">
+            <a:spLocks noGrp="1"/>
+          </p:cNvSpPr>
           <p:nvPr>
-            <p:ph idx="1" type="body"/>
+            <p:ph type="body" idx="1"/>
           </p:nvPr>
         </p:nvSpPr>
         <p:spPr>
@@ -3894,9 +4002,9 @@
           </a:prstGeom>
         </p:spPr>
         <p:txBody>
-          <a:bodyPr anchorCtr="0" anchor="t" bIns="91425" lIns="91425" spcFirstLastPara="1" rIns="91425" wrap="square" tIns="91425"/>
+          <a:bodyPr spcFirstLastPara="1" wrap="square" lIns="91425" tIns="91425" rIns="91425" bIns="91425" anchor="t" anchorCtr="0"/>
           <a:lstStyle>
-            <a:lvl1pPr indent="-304800" lvl="0" marL="457200">
+            <a:lvl1pPr marL="457200" lvl="0" indent="-304800">
               <a:spcBef>
                 <a:spcPts val="0"/>
               </a:spcBef>
@@ -3907,7 +4015,7 @@
               <a:buChar char="●"/>
               <a:defRPr sz="1200"/>
             </a:lvl1pPr>
-            <a:lvl2pPr indent="-304800" lvl="1" marL="914400">
+            <a:lvl2pPr marL="914400" lvl="1" indent="-304800">
               <a:spcBef>
                 <a:spcPts val="1600"/>
               </a:spcBef>
@@ -3918,7 +4026,7 @@
               <a:buChar char="○"/>
               <a:defRPr sz="1200"/>
             </a:lvl2pPr>
-            <a:lvl3pPr indent="-304800" lvl="2" marL="1371600">
+            <a:lvl3pPr marL="1371600" lvl="2" indent="-304800">
               <a:spcBef>
                 <a:spcPts val="1600"/>
               </a:spcBef>
@@ -3929,7 +4037,7 @@
               <a:buChar char="■"/>
               <a:defRPr sz="1200"/>
             </a:lvl3pPr>
-            <a:lvl4pPr indent="-304800" lvl="3" marL="1828800">
+            <a:lvl4pPr marL="1828800" lvl="3" indent="-304800">
               <a:spcBef>
                 <a:spcPts val="1600"/>
               </a:spcBef>
@@ -3940,7 +4048,7 @@
               <a:buChar char="●"/>
               <a:defRPr sz="1200"/>
             </a:lvl4pPr>
-            <a:lvl5pPr indent="-304800" lvl="4" marL="2286000">
+            <a:lvl5pPr marL="2286000" lvl="4" indent="-304800">
               <a:spcBef>
                 <a:spcPts val="1600"/>
               </a:spcBef>
@@ -3951,7 +4059,7 @@
               <a:buChar char="○"/>
               <a:defRPr sz="1200"/>
             </a:lvl5pPr>
-            <a:lvl6pPr indent="-304800" lvl="5" marL="2743200">
+            <a:lvl6pPr marL="2743200" lvl="5" indent="-304800">
               <a:spcBef>
                 <a:spcPts val="1600"/>
               </a:spcBef>
@@ -3962,7 +4070,7 @@
               <a:buChar char="■"/>
               <a:defRPr sz="1200"/>
             </a:lvl6pPr>
-            <a:lvl7pPr indent="-304800" lvl="6" marL="3200400">
+            <a:lvl7pPr marL="3200400" lvl="6" indent="-304800">
               <a:spcBef>
                 <a:spcPts val="1600"/>
               </a:spcBef>
@@ -3973,7 +4081,7 @@
               <a:buChar char="●"/>
               <a:defRPr sz="1200"/>
             </a:lvl7pPr>
-            <a:lvl8pPr indent="-304800" lvl="7" marL="3657600">
+            <a:lvl8pPr marL="3657600" lvl="7" indent="-304800">
               <a:spcBef>
                 <a:spcPts val="1600"/>
               </a:spcBef>
@@ -3984,7 +4092,7 @@
               <a:buChar char="○"/>
               <a:defRPr sz="1200"/>
             </a:lvl8pPr>
-            <a:lvl9pPr indent="-304800" lvl="8" marL="4114800">
+            <a:lvl9pPr marL="4114800" lvl="8" indent="-304800">
               <a:spcBef>
                 <a:spcPts val="1600"/>
               </a:spcBef>
@@ -3996,15 +4104,19 @@
               <a:defRPr sz="1200"/>
             </a:lvl9pPr>
           </a:lstStyle>
-          <a:p/>
+          <a:p>
+            <a:endParaRPr/>
+          </a:p>
         </p:txBody>
       </p:sp>
       <p:sp>
         <p:nvSpPr>
           <p:cNvPr id="35" name="Google Shape;35;p7"/>
-          <p:cNvSpPr txBox="1"/>
+          <p:cNvSpPr txBox="1">
+            <a:spLocks noGrp="1"/>
+          </p:cNvSpPr>
           <p:nvPr>
-            <p:ph idx="12" type="sldNum"/>
+            <p:ph type="sldNum" idx="12"/>
           </p:nvPr>
         </p:nvSpPr>
         <p:spPr>
@@ -4017,7 +4129,7 @@
           </a:prstGeom>
         </p:spPr>
         <p:txBody>
-          <a:bodyPr anchorCtr="0" anchor="ctr" bIns="91425" lIns="91425" spcFirstLastPara="1" rIns="91425" wrap="square" tIns="91425">
+          <a:bodyPr spcFirstLastPara="1" wrap="square" lIns="91425" tIns="91425" rIns="91425" bIns="91425" anchor="ctr" anchorCtr="0">
             <a:noAutofit/>
           </a:bodyPr>
           <a:lstStyle>
@@ -4059,7 +4171,7 @@
             </a:lvl9pPr>
           </a:lstStyle>
           <a:p>
-            <a:pPr indent="0" lvl="0" marL="0" rtl="0" algn="r">
+            <a:pPr marL="0" lvl="0" indent="0" algn="r" rtl="0">
               <a:spcBef>
                 <a:spcPts val="0"/>
               </a:spcBef>
@@ -4085,18 +4197,19 @@
 </file>
 
 <file path=ppt/slideLayouts/slideLayout7.xml><?xml version="1.0" encoding="utf-8"?>
-<p:sldLayout xmlns:a="http://schemas.openxmlformats.org/drawingml/2006/main" xmlns:r="http://schemas.openxmlformats.org/officeDocument/2006/relationships" xmlns:mc="http://schemas.openxmlformats.org/markup-compatibility/2006" xmlns:mv="urn:schemas-microsoft-com:mac:vml" xmlns:p="http://schemas.openxmlformats.org/presentationml/2006/main" xmlns:c="http://schemas.openxmlformats.org/drawingml/2006/chart" xmlns:dgm="http://schemas.openxmlformats.org/drawingml/2006/diagram" xmlns:o="urn:schemas-microsoft-com:office:office" xmlns:v="urn:schemas-microsoft-com:vml" xmlns:pvml="urn:schemas-microsoft-com:office:powerpoint" xmlns:com="http://schemas.openxmlformats.org/drawingml/2006/compatibility" xmlns:p14="http://schemas.microsoft.com/office/powerpoint/2010/main" xmlns:p15="http://schemas.microsoft.com/office/powerpoint/2012/main" matchingName="Main point">
+<p:sldLayout xmlns:a="http://schemas.openxmlformats.org/drawingml/2006/main" xmlns:r="http://schemas.openxmlformats.org/officeDocument/2006/relationships" xmlns:p="http://schemas.openxmlformats.org/presentationml/2006/main" matchingName="Main point">
   <p:cSld name="MAIN_POINT">
     <p:bg>
       <p:bgPr>
         <a:solidFill>
           <a:schemeClr val="lt2"/>
         </a:solidFill>
+        <a:effectLst/>
       </p:bgPr>
     </p:bg>
     <p:spTree>
       <p:nvGrpSpPr>
-        <p:cNvPr id="36" name="Shape 36"/>
+        <p:cNvPr id="1" name="Shape 36"/>
         <p:cNvGrpSpPr/>
         <p:nvPr/>
       </p:nvGrpSpPr>
@@ -4111,7 +4224,9 @@
       <p:sp>
         <p:nvSpPr>
           <p:cNvPr id="37" name="Google Shape;37;p8"/>
-          <p:cNvSpPr txBox="1"/>
+          <p:cNvSpPr txBox="1">
+            <a:spLocks noGrp="1"/>
+          </p:cNvSpPr>
           <p:nvPr>
             <p:ph type="title"/>
           </p:nvPr>
@@ -4126,7 +4241,7 @@
           </a:prstGeom>
         </p:spPr>
         <p:txBody>
-          <a:bodyPr anchorCtr="0" anchor="ctr" bIns="91425" lIns="91425" spcFirstLastPara="1" rIns="91425" wrap="square" tIns="91425"/>
+          <a:bodyPr spcFirstLastPara="1" wrap="square" lIns="91425" tIns="91425" rIns="91425" bIns="91425" anchor="ctr" anchorCtr="0"/>
           <a:lstStyle>
             <a:lvl1pPr lvl="0">
               <a:spcBef>
@@ -4291,15 +4406,19 @@
               </a:defRPr>
             </a:lvl9pPr>
           </a:lstStyle>
-          <a:p/>
+          <a:p>
+            <a:endParaRPr/>
+          </a:p>
         </p:txBody>
       </p:sp>
       <p:sp>
         <p:nvSpPr>
           <p:cNvPr id="38" name="Google Shape;38;p8"/>
-          <p:cNvSpPr txBox="1"/>
+          <p:cNvSpPr txBox="1">
+            <a:spLocks noGrp="1"/>
+          </p:cNvSpPr>
           <p:nvPr>
-            <p:ph idx="12" type="sldNum"/>
+            <p:ph type="sldNum" idx="12"/>
           </p:nvPr>
         </p:nvSpPr>
         <p:spPr>
@@ -4312,7 +4431,7 @@
           </a:prstGeom>
         </p:spPr>
         <p:txBody>
-          <a:bodyPr anchorCtr="0" anchor="ctr" bIns="91425" lIns="91425" spcFirstLastPara="1" rIns="91425" wrap="square" tIns="91425">
+          <a:bodyPr spcFirstLastPara="1" wrap="square" lIns="91425" tIns="91425" rIns="91425" bIns="91425" anchor="ctr" anchorCtr="0">
             <a:noAutofit/>
           </a:bodyPr>
           <a:lstStyle>
@@ -4390,7 +4509,7 @@
             </a:lvl9pPr>
           </a:lstStyle>
           <a:p>
-            <a:pPr indent="0" lvl="0" marL="0" rtl="0" algn="r">
+            <a:pPr marL="0" lvl="0" indent="0" algn="r" rtl="0">
               <a:spcBef>
                 <a:spcPts val="0"/>
               </a:spcBef>
@@ -4416,11 +4535,11 @@
 </file>
 
 <file path=ppt/slideLayouts/slideLayout8.xml><?xml version="1.0" encoding="utf-8"?>
-<p:sldLayout xmlns:a="http://schemas.openxmlformats.org/drawingml/2006/main" xmlns:r="http://schemas.openxmlformats.org/officeDocument/2006/relationships" xmlns:mc="http://schemas.openxmlformats.org/markup-compatibility/2006" xmlns:mv="urn:schemas-microsoft-com:mac:vml" xmlns:p="http://schemas.openxmlformats.org/presentationml/2006/main" xmlns:c="http://schemas.openxmlformats.org/drawingml/2006/chart" xmlns:dgm="http://schemas.openxmlformats.org/drawingml/2006/diagram" xmlns:o="urn:schemas-microsoft-com:office:office" xmlns:v="urn:schemas-microsoft-com:vml" xmlns:pvml="urn:schemas-microsoft-com:office:powerpoint" xmlns:com="http://schemas.openxmlformats.org/drawingml/2006/compatibility" xmlns:p14="http://schemas.microsoft.com/office/powerpoint/2010/main" xmlns:p15="http://schemas.microsoft.com/office/powerpoint/2012/main" matchingName="Section title and description">
+<p:sldLayout xmlns:a="http://schemas.openxmlformats.org/drawingml/2006/main" xmlns:r="http://schemas.openxmlformats.org/officeDocument/2006/relationships" xmlns:p="http://schemas.openxmlformats.org/presentationml/2006/main" matchingName="Section title and description">
   <p:cSld name="SECTION_TITLE_AND_DESCRIPTION">
     <p:spTree>
       <p:nvGrpSpPr>
-        <p:cNvPr id="39" name="Shape 39"/>
+        <p:cNvPr id="1" name="Shape 39"/>
         <p:cNvGrpSpPr/>
         <p:nvPr/>
       </p:nvGrpSpPr>
@@ -4454,12 +4573,12 @@
           </a:ln>
         </p:spPr>
         <p:txBody>
-          <a:bodyPr anchorCtr="0" anchor="ctr" bIns="91425" lIns="91425" spcFirstLastPara="1" rIns="91425" wrap="square" tIns="91425">
+          <a:bodyPr spcFirstLastPara="1" wrap="square" lIns="91425" tIns="91425" rIns="91425" bIns="91425" anchor="ctr" anchorCtr="0">
             <a:noAutofit/>
           </a:bodyPr>
           <a:lstStyle/>
           <a:p>
-            <a:pPr indent="0" lvl="0" marL="0" rtl="0" algn="l">
+            <a:pPr marL="0" lvl="0" indent="0" algn="l" rtl="0">
               <a:spcBef>
                 <a:spcPts val="0"/>
               </a:spcBef>
@@ -4468,9 +4587,6 @@
               </a:spcAft>
               <a:buNone/>
             </a:pPr>
-            <a:r>
-              <a:t/>
-            </a:r>
             <a:endParaRPr/>
           </a:p>
         </p:txBody>
@@ -4490,21 +4606,23 @@
             <a:avLst/>
           </a:prstGeom>
           <a:noFill/>
-          <a:ln cap="flat" cmpd="sng" w="19050">
+          <a:ln w="19050" cap="flat" cmpd="sng">
             <a:solidFill>
               <a:schemeClr val="lt1"/>
             </a:solidFill>
             <a:prstDash val="solid"/>
             <a:round/>
-            <a:headEnd len="sm" w="sm" type="none"/>
-            <a:tailEnd len="sm" w="sm" type="none"/>
+            <a:headEnd type="none" w="sm" len="sm"/>
+            <a:tailEnd type="none" w="sm" len="sm"/>
           </a:ln>
         </p:spPr>
       </p:cxnSp>
       <p:sp>
         <p:nvSpPr>
           <p:cNvPr id="42" name="Google Shape;42;p9"/>
-          <p:cNvSpPr txBox="1"/>
+          <p:cNvSpPr txBox="1">
+            <a:spLocks noGrp="1"/>
+          </p:cNvSpPr>
           <p:nvPr>
             <p:ph type="title"/>
           </p:nvPr>
@@ -4519,7 +4637,7 @@
           </a:prstGeom>
         </p:spPr>
         <p:txBody>
-          <a:bodyPr anchorCtr="0" anchor="b" bIns="91425" lIns="91425" spcFirstLastPara="1" rIns="91425" wrap="square" tIns="91425"/>
+          <a:bodyPr spcFirstLastPara="1" wrap="square" lIns="91425" tIns="91425" rIns="91425" bIns="91425" anchor="b" anchorCtr="0"/>
           <a:lstStyle>
             <a:lvl1pPr lvl="0" algn="ctr">
               <a:spcBef>
@@ -4621,15 +4739,19 @@
               <a:defRPr sz="4200"/>
             </a:lvl9pPr>
           </a:lstStyle>
-          <a:p/>
+          <a:p>
+            <a:endParaRPr/>
+          </a:p>
         </p:txBody>
       </p:sp>
       <p:sp>
         <p:nvSpPr>
           <p:cNvPr id="43" name="Google Shape;43;p9"/>
-          <p:cNvSpPr txBox="1"/>
+          <p:cNvSpPr txBox="1">
+            <a:spLocks noGrp="1"/>
+          </p:cNvSpPr>
           <p:nvPr>
-            <p:ph idx="1" type="subTitle"/>
+            <p:ph type="subTitle" idx="1"/>
           </p:nvPr>
         </p:nvSpPr>
         <p:spPr>
@@ -4642,7 +4764,7 @@
           </a:prstGeom>
         </p:spPr>
         <p:txBody>
-          <a:bodyPr anchorCtr="0" anchor="t" bIns="91425" lIns="91425" spcFirstLastPara="1" rIns="91425" wrap="square" tIns="91425"/>
+          <a:bodyPr spcFirstLastPara="1" wrap="square" lIns="91425" tIns="91425" rIns="91425" bIns="91425" anchor="t" anchorCtr="0"/>
           <a:lstStyle>
             <a:lvl1pPr lvl="0" algn="ctr">
               <a:lnSpc>
@@ -4834,15 +4956,19 @@
               </a:defRPr>
             </a:lvl9pPr>
           </a:lstStyle>
-          <a:p/>
+          <a:p>
+            <a:endParaRPr/>
+          </a:p>
         </p:txBody>
       </p:sp>
       <p:sp>
         <p:nvSpPr>
           <p:cNvPr id="44" name="Google Shape;44;p9"/>
-          <p:cNvSpPr txBox="1"/>
+          <p:cNvSpPr txBox="1">
+            <a:spLocks noGrp="1"/>
+          </p:cNvSpPr>
           <p:nvPr>
-            <p:ph idx="2" type="body"/>
+            <p:ph type="body" idx="2"/>
           </p:nvPr>
         </p:nvSpPr>
         <p:spPr>
@@ -4855,9 +4981,9 @@
           </a:prstGeom>
         </p:spPr>
         <p:txBody>
-          <a:bodyPr anchorCtr="0" anchor="ctr" bIns="91425" lIns="91425" spcFirstLastPara="1" rIns="91425" wrap="square" tIns="91425"/>
+          <a:bodyPr spcFirstLastPara="1" wrap="square" lIns="91425" tIns="91425" rIns="91425" bIns="91425" anchor="ctr" anchorCtr="0"/>
           <a:lstStyle>
-            <a:lvl1pPr indent="-342900" lvl="0" marL="457200">
+            <a:lvl1pPr marL="457200" lvl="0" indent="-342900">
               <a:spcBef>
                 <a:spcPts val="0"/>
               </a:spcBef>
@@ -4875,7 +5001,7 @@
                 </a:solidFill>
               </a:defRPr>
             </a:lvl1pPr>
-            <a:lvl2pPr indent="-317500" lvl="1" marL="914400">
+            <a:lvl2pPr marL="914400" lvl="1" indent="-317500">
               <a:spcBef>
                 <a:spcPts val="1600"/>
               </a:spcBef>
@@ -4893,7 +5019,7 @@
                 </a:solidFill>
               </a:defRPr>
             </a:lvl2pPr>
-            <a:lvl3pPr indent="-317500" lvl="2" marL="1371600">
+            <a:lvl3pPr marL="1371600" lvl="2" indent="-317500">
               <a:spcBef>
                 <a:spcPts val="1600"/>
               </a:spcBef>
@@ -4911,7 +5037,7 @@
                 </a:solidFill>
               </a:defRPr>
             </a:lvl3pPr>
-            <a:lvl4pPr indent="-317500" lvl="3" marL="1828800">
+            <a:lvl4pPr marL="1828800" lvl="3" indent="-317500">
               <a:spcBef>
                 <a:spcPts val="1600"/>
               </a:spcBef>
@@ -4929,7 +5055,7 @@
                 </a:solidFill>
               </a:defRPr>
             </a:lvl4pPr>
-            <a:lvl5pPr indent="-317500" lvl="4" marL="2286000">
+            <a:lvl5pPr marL="2286000" lvl="4" indent="-317500">
               <a:spcBef>
                 <a:spcPts val="1600"/>
               </a:spcBef>
@@ -4947,7 +5073,7 @@
                 </a:solidFill>
               </a:defRPr>
             </a:lvl5pPr>
-            <a:lvl6pPr indent="-317500" lvl="5" marL="2743200">
+            <a:lvl6pPr marL="2743200" lvl="5" indent="-317500">
               <a:spcBef>
                 <a:spcPts val="1600"/>
               </a:spcBef>
@@ -4965,7 +5091,7 @@
                 </a:solidFill>
               </a:defRPr>
             </a:lvl6pPr>
-            <a:lvl7pPr indent="-317500" lvl="6" marL="3200400">
+            <a:lvl7pPr marL="3200400" lvl="6" indent="-317500">
               <a:spcBef>
                 <a:spcPts val="1600"/>
               </a:spcBef>
@@ -4983,7 +5109,7 @@
                 </a:solidFill>
               </a:defRPr>
             </a:lvl7pPr>
-            <a:lvl8pPr indent="-317500" lvl="7" marL="3657600">
+            <a:lvl8pPr marL="3657600" lvl="7" indent="-317500">
               <a:spcBef>
                 <a:spcPts val="1600"/>
               </a:spcBef>
@@ -5001,7 +5127,7 @@
                 </a:solidFill>
               </a:defRPr>
             </a:lvl8pPr>
-            <a:lvl9pPr indent="-317500" lvl="8" marL="4114800">
+            <a:lvl9pPr marL="4114800" lvl="8" indent="-317500">
               <a:spcBef>
                 <a:spcPts val="1600"/>
               </a:spcBef>
@@ -5020,15 +5146,19 @@
               </a:defRPr>
             </a:lvl9pPr>
           </a:lstStyle>
-          <a:p/>
+          <a:p>
+            <a:endParaRPr/>
+          </a:p>
         </p:txBody>
       </p:sp>
       <p:sp>
         <p:nvSpPr>
           <p:cNvPr id="45" name="Google Shape;45;p9"/>
-          <p:cNvSpPr txBox="1"/>
+          <p:cNvSpPr txBox="1">
+            <a:spLocks noGrp="1"/>
+          </p:cNvSpPr>
           <p:nvPr>
-            <p:ph idx="12" type="sldNum"/>
+            <p:ph type="sldNum" idx="12"/>
           </p:nvPr>
         </p:nvSpPr>
         <p:spPr>
@@ -5041,7 +5171,7 @@
           </a:prstGeom>
         </p:spPr>
         <p:txBody>
-          <a:bodyPr anchorCtr="0" anchor="ctr" bIns="91425" lIns="91425" spcFirstLastPara="1" rIns="91425" wrap="square" tIns="91425">
+          <a:bodyPr spcFirstLastPara="1" wrap="square" lIns="91425" tIns="91425" rIns="91425" bIns="91425" anchor="ctr" anchorCtr="0">
             <a:noAutofit/>
           </a:bodyPr>
           <a:lstStyle>
@@ -5119,7 +5249,7 @@
             </a:lvl9pPr>
           </a:lstStyle>
           <a:p>
-            <a:pPr indent="0" lvl="0" marL="0" rtl="0" algn="r">
+            <a:pPr marL="0" lvl="0" indent="0" algn="r" rtl="0">
               <a:spcBef>
                 <a:spcPts val="0"/>
               </a:spcBef>
@@ -5145,11 +5275,11 @@
 </file>
 
 <file path=ppt/slideLayouts/slideLayout9.xml><?xml version="1.0" encoding="utf-8"?>
-<p:sldLayout xmlns:a="http://schemas.openxmlformats.org/drawingml/2006/main" xmlns:r="http://schemas.openxmlformats.org/officeDocument/2006/relationships" xmlns:mc="http://schemas.openxmlformats.org/markup-compatibility/2006" xmlns:mv="urn:schemas-microsoft-com:mac:vml" xmlns:p="http://schemas.openxmlformats.org/presentationml/2006/main" xmlns:c="http://schemas.openxmlformats.org/drawingml/2006/chart" xmlns:dgm="http://schemas.openxmlformats.org/drawingml/2006/diagram" xmlns:o="urn:schemas-microsoft-com:office:office" xmlns:v="urn:schemas-microsoft-com:vml" xmlns:pvml="urn:schemas-microsoft-com:office:powerpoint" xmlns:com="http://schemas.openxmlformats.org/drawingml/2006/compatibility" xmlns:p14="http://schemas.microsoft.com/office/powerpoint/2010/main" xmlns:p15="http://schemas.microsoft.com/office/powerpoint/2012/main" matchingName="Caption">
+<p:sldLayout xmlns:a="http://schemas.openxmlformats.org/drawingml/2006/main" xmlns:r="http://schemas.openxmlformats.org/officeDocument/2006/relationships" xmlns:p="http://schemas.openxmlformats.org/presentationml/2006/main" matchingName="Caption">
   <p:cSld name="CAPTION_ONLY">
     <p:spTree>
       <p:nvGrpSpPr>
-        <p:cNvPr id="46" name="Shape 46"/>
+        <p:cNvPr id="1" name="Shape 46"/>
         <p:cNvGrpSpPr/>
         <p:nvPr/>
       </p:nvGrpSpPr>
@@ -5164,9 +5294,11 @@
       <p:sp>
         <p:nvSpPr>
           <p:cNvPr id="47" name="Google Shape;47;p10"/>
-          <p:cNvSpPr txBox="1"/>
+          <p:cNvSpPr txBox="1">
+            <a:spLocks noGrp="1"/>
+          </p:cNvSpPr>
           <p:nvPr>
-            <p:ph idx="1" type="body"/>
+            <p:ph type="body" idx="1"/>
           </p:nvPr>
         </p:nvSpPr>
         <p:spPr>
@@ -5179,9 +5311,9 @@
           </a:prstGeom>
         </p:spPr>
         <p:txBody>
-          <a:bodyPr anchorCtr="0" anchor="ctr" bIns="91425" lIns="91425" spcFirstLastPara="1" rIns="91425" wrap="square" tIns="91425"/>
+          <a:bodyPr spcFirstLastPara="1" wrap="square" lIns="91425" tIns="91425" rIns="91425" bIns="91425" anchor="ctr" anchorCtr="0"/>
           <a:lstStyle>
-            <a:lvl1pPr indent="-228600" lvl="0" marL="457200">
+            <a:lvl1pPr marL="457200" lvl="0" indent="-228600">
               <a:lnSpc>
                 <a:spcPct val="100000"/>
               </a:lnSpc>
@@ -5208,15 +5340,19 @@
               </a:defRPr>
             </a:lvl1pPr>
           </a:lstStyle>
-          <a:p/>
+          <a:p>
+            <a:endParaRPr/>
+          </a:p>
         </p:txBody>
       </p:sp>
       <p:sp>
         <p:nvSpPr>
           <p:cNvPr id="48" name="Google Shape;48;p10"/>
-          <p:cNvSpPr txBox="1"/>
+          <p:cNvSpPr txBox="1">
+            <a:spLocks noGrp="1"/>
+          </p:cNvSpPr>
           <p:nvPr>
-            <p:ph idx="12" type="sldNum"/>
+            <p:ph type="sldNum" idx="12"/>
           </p:nvPr>
         </p:nvSpPr>
         <p:spPr>
@@ -5229,7 +5365,7 @@
           </a:prstGeom>
         </p:spPr>
         <p:txBody>
-          <a:bodyPr anchorCtr="0" anchor="ctr" bIns="91425" lIns="91425" spcFirstLastPara="1" rIns="91425" wrap="square" tIns="91425">
+          <a:bodyPr spcFirstLastPara="1" wrap="square" lIns="91425" tIns="91425" rIns="91425" bIns="91425" anchor="ctr" anchorCtr="0">
             <a:noAutofit/>
           </a:bodyPr>
           <a:lstStyle>
@@ -5271,7 +5407,7 @@
             </a:lvl9pPr>
           </a:lstStyle>
           <a:p>
-            <a:pPr indent="0" lvl="0" marL="0" rtl="0" algn="r">
+            <a:pPr marL="0" lvl="0" indent="0" algn="r" rtl="0">
               <a:spcBef>
                 <a:spcPts val="0"/>
               </a:spcBef>
@@ -5297,18 +5433,19 @@
 </file>
 
 <file path=ppt/slideMasters/slideMaster1.xml><?xml version="1.0" encoding="utf-8"?>
-<p:sldMaster xmlns:a="http://schemas.openxmlformats.org/drawingml/2006/main" xmlns:r="http://schemas.openxmlformats.org/officeDocument/2006/relationships" xmlns:mc="http://schemas.openxmlformats.org/markup-compatibility/2006" xmlns:mv="urn:schemas-microsoft-com:mac:vml" xmlns:p="http://schemas.openxmlformats.org/presentationml/2006/main" xmlns:c="http://schemas.openxmlformats.org/drawingml/2006/chart" xmlns:dgm="http://schemas.openxmlformats.org/drawingml/2006/diagram" xmlns:o="urn:schemas-microsoft-com:office:office" xmlns:v="urn:schemas-microsoft-com:vml" xmlns:pvml="urn:schemas-microsoft-com:office:powerpoint" xmlns:com="http://schemas.openxmlformats.org/drawingml/2006/compatibility" xmlns:p14="http://schemas.microsoft.com/office/powerpoint/2010/main" xmlns:p15="http://schemas.microsoft.com/office/powerpoint/2012/main">
+<p:sldMaster xmlns:a="http://schemas.openxmlformats.org/drawingml/2006/main" xmlns:r="http://schemas.openxmlformats.org/officeDocument/2006/relationships" xmlns:p="http://schemas.openxmlformats.org/presentationml/2006/main">
   <p:cSld name="slate">
     <p:bg>
       <p:bgPr>
         <a:solidFill>
           <a:schemeClr val="lt1"/>
         </a:solidFill>
+        <a:effectLst/>
       </p:bgPr>
     </p:bg>
     <p:spTree>
       <p:nvGrpSpPr>
-        <p:cNvPr id="5" name="Shape 5"/>
+        <p:cNvPr id="1" name="Shape 5"/>
         <p:cNvGrpSpPr/>
         <p:nvPr/>
       </p:nvGrpSpPr>
@@ -5323,7 +5460,9 @@
       <p:sp>
         <p:nvSpPr>
           <p:cNvPr id="6" name="Google Shape;6;p1"/>
-          <p:cNvSpPr txBox="1"/>
+          <p:cNvSpPr txBox="1">
+            <a:spLocks noGrp="1"/>
+          </p:cNvSpPr>
           <p:nvPr>
             <p:ph type="title"/>
           </p:nvPr>
@@ -5342,7 +5481,7 @@
           </a:ln>
         </p:spPr>
         <p:txBody>
-          <a:bodyPr anchorCtr="0" anchor="t" bIns="91425" lIns="91425" spcFirstLastPara="1" rIns="91425" wrap="square" tIns="91425"/>
+          <a:bodyPr spcFirstLastPara="1" wrap="square" lIns="91425" tIns="91425" rIns="91425" bIns="91425" anchor="t" anchorCtr="0"/>
           <a:lstStyle>
             <a:lvl1pPr lvl="0">
               <a:spcBef>
@@ -5552,15 +5691,19 @@
               </a:defRPr>
             </a:lvl9pPr>
           </a:lstStyle>
-          <a:p/>
+          <a:p>
+            <a:endParaRPr/>
+          </a:p>
         </p:txBody>
       </p:sp>
       <p:sp>
         <p:nvSpPr>
           <p:cNvPr id="7" name="Google Shape;7;p1"/>
-          <p:cNvSpPr txBox="1"/>
+          <p:cNvSpPr txBox="1">
+            <a:spLocks noGrp="1"/>
+          </p:cNvSpPr>
           <p:nvPr>
-            <p:ph idx="1" type="body"/>
+            <p:ph type="body" idx="1"/>
           </p:nvPr>
         </p:nvSpPr>
         <p:spPr>
@@ -5577,9 +5720,9 @@
           </a:ln>
         </p:spPr>
         <p:txBody>
-          <a:bodyPr anchorCtr="0" anchor="t" bIns="91425" lIns="91425" spcFirstLastPara="1" rIns="91425" wrap="square" tIns="91425"/>
+          <a:bodyPr spcFirstLastPara="1" wrap="square" lIns="91425" tIns="91425" rIns="91425" bIns="91425" anchor="t" anchorCtr="0"/>
           <a:lstStyle>
-            <a:lvl1pPr indent="-342900" lvl="0" marL="457200">
+            <a:lvl1pPr marL="457200" lvl="0" indent="-342900">
               <a:lnSpc>
                 <a:spcPct val="115000"/>
               </a:lnSpc>
@@ -5605,7 +5748,7 @@
                 <a:sym typeface="Average"/>
               </a:defRPr>
             </a:lvl1pPr>
-            <a:lvl2pPr indent="-317500" lvl="1" marL="914400">
+            <a:lvl2pPr marL="914400" lvl="1" indent="-317500">
               <a:lnSpc>
                 <a:spcPct val="115000"/>
               </a:lnSpc>
@@ -5631,7 +5774,7 @@
                 <a:sym typeface="Average"/>
               </a:defRPr>
             </a:lvl2pPr>
-            <a:lvl3pPr indent="-317500" lvl="2" marL="1371600">
+            <a:lvl3pPr marL="1371600" lvl="2" indent="-317500">
               <a:lnSpc>
                 <a:spcPct val="115000"/>
               </a:lnSpc>
@@ -5657,7 +5800,7 @@
                 <a:sym typeface="Average"/>
               </a:defRPr>
             </a:lvl3pPr>
-            <a:lvl4pPr indent="-317500" lvl="3" marL="1828800">
+            <a:lvl4pPr marL="1828800" lvl="3" indent="-317500">
               <a:lnSpc>
                 <a:spcPct val="115000"/>
               </a:lnSpc>
@@ -5683,7 +5826,7 @@
                 <a:sym typeface="Average"/>
               </a:defRPr>
             </a:lvl4pPr>
-            <a:lvl5pPr indent="-317500" lvl="4" marL="2286000">
+            <a:lvl5pPr marL="2286000" lvl="4" indent="-317500">
               <a:lnSpc>
                 <a:spcPct val="115000"/>
               </a:lnSpc>
@@ -5709,7 +5852,7 @@
                 <a:sym typeface="Average"/>
               </a:defRPr>
             </a:lvl5pPr>
-            <a:lvl6pPr indent="-317500" lvl="5" marL="2743200">
+            <a:lvl6pPr marL="2743200" lvl="5" indent="-317500">
               <a:lnSpc>
                 <a:spcPct val="115000"/>
               </a:lnSpc>
@@ -5735,7 +5878,7 @@
                 <a:sym typeface="Average"/>
               </a:defRPr>
             </a:lvl6pPr>
-            <a:lvl7pPr indent="-317500" lvl="6" marL="3200400">
+            <a:lvl7pPr marL="3200400" lvl="6" indent="-317500">
               <a:lnSpc>
                 <a:spcPct val="115000"/>
               </a:lnSpc>
@@ -5761,7 +5904,7 @@
                 <a:sym typeface="Average"/>
               </a:defRPr>
             </a:lvl7pPr>
-            <a:lvl8pPr indent="-317500" lvl="7" marL="3657600">
+            <a:lvl8pPr marL="3657600" lvl="7" indent="-317500">
               <a:lnSpc>
                 <a:spcPct val="115000"/>
               </a:lnSpc>
@@ -5787,7 +5930,7 @@
                 <a:sym typeface="Average"/>
               </a:defRPr>
             </a:lvl8pPr>
-            <a:lvl9pPr indent="-317500" lvl="8" marL="4114800">
+            <a:lvl9pPr marL="4114800" lvl="8" indent="-317500">
               <a:lnSpc>
                 <a:spcPct val="115000"/>
               </a:lnSpc>
@@ -5814,15 +5957,19 @@
               </a:defRPr>
             </a:lvl9pPr>
           </a:lstStyle>
-          <a:p/>
+          <a:p>
+            <a:endParaRPr/>
+          </a:p>
         </p:txBody>
       </p:sp>
       <p:sp>
         <p:nvSpPr>
           <p:cNvPr id="8" name="Google Shape;8;p1"/>
-          <p:cNvSpPr txBox="1"/>
+          <p:cNvSpPr txBox="1">
+            <a:spLocks noGrp="1"/>
+          </p:cNvSpPr>
           <p:nvPr>
-            <p:ph idx="12" type="sldNum"/>
+            <p:ph type="sldNum" idx="12"/>
           </p:nvPr>
         </p:nvSpPr>
         <p:spPr>
@@ -5839,7 +5986,7 @@
           </a:ln>
         </p:spPr>
         <p:txBody>
-          <a:bodyPr anchorCtr="0" anchor="ctr" bIns="91425" lIns="91425" spcFirstLastPara="1" rIns="91425" wrap="square" tIns="91425">
+          <a:bodyPr spcFirstLastPara="1" wrap="square" lIns="91425" tIns="91425" rIns="91425" bIns="91425" anchor="ctr" anchorCtr="0">
             <a:noAutofit/>
           </a:bodyPr>
           <a:lstStyle>
@@ -5953,7 +6100,7 @@
             </a:lvl9pPr>
           </a:lstStyle>
           <a:p>
-            <a:pPr indent="0" lvl="0" marL="0" rtl="0" algn="r">
+            <a:pPr marL="0" lvl="0" indent="0" algn="r" rtl="0">
               <a:spcBef>
                 <a:spcPts val="0"/>
               </a:spcBef>
@@ -5972,7 +6119,7 @@
       </p:sp>
     </p:spTree>
   </p:cSld>
-  <p:clrMap accent1="accent1" accent2="accent2" accent3="accent3" accent4="accent4" accent5="accent5" accent6="accent6" bg1="lt1" bg2="dk2" tx1="dk1" tx2="lt2" folHlink="folHlink" hlink="hlink"/>
+  <p:clrMap bg1="lt1" tx1="dk1" bg2="dk2" tx2="lt2" accent1="accent1" accent2="accent2" accent3="accent3" accent4="accent4" accent5="accent5" accent6="accent6" hlink="hlink" folHlink="folHlink"/>
   <p:sldLayoutIdLst>
     <p:sldLayoutId id="2147483648" r:id="rId1"/>
     <p:sldLayoutId id="2147483649" r:id="rId2"/>
@@ -5986,10 +6133,10 @@
     <p:sldLayoutId id="2147483657" r:id="rId10"/>
     <p:sldLayoutId id="2147483658" r:id="rId11"/>
   </p:sldLayoutIdLst>
-  <p:hf dt="0" ftr="0" hdr="0" sldNum="0"/>
+  <p:hf sldNum="0" hdr="0" ftr="0" dt="0"/>
   <p:txStyles>
     <p:titleStyle>
-      <a:defPPr lvl="0" marR="0" rtl="0" algn="l">
+      <a:defPPr marR="0" lvl="0" algn="l" rtl="0">
         <a:lnSpc>
           <a:spcPct val="100000"/>
         </a:lnSpc>
@@ -6000,7 +6147,7 @@
           <a:spcPts val="0"/>
         </a:spcAft>
       </a:defPPr>
-      <a:lvl1pPr lvl="0" marR="0" rtl="0" algn="l">
+      <a:lvl1pPr marR="0" lvl="0" algn="l" rtl="0">
         <a:lnSpc>
           <a:spcPct val="100000"/>
         </a:lnSpc>
@@ -6014,7 +6161,7 @@
           <a:srgbClr val="000000"/>
         </a:buClr>
         <a:buFont typeface="Arial"/>
-        <a:defRPr b="0" i="0" sz="1400" u="none" cap="none" strike="noStrike">
+        <a:defRPr sz="1400" b="0" i="0" u="none" strike="noStrike" cap="none">
           <a:solidFill>
             <a:srgbClr val="000000"/>
           </a:solidFill>
@@ -6024,7 +6171,7 @@
           <a:sym typeface="Arial"/>
         </a:defRPr>
       </a:lvl1pPr>
-      <a:lvl2pPr lvl="1" marR="0" rtl="0" algn="l">
+      <a:lvl2pPr marR="0" lvl="1" algn="l" rtl="0">
         <a:lnSpc>
           <a:spcPct val="100000"/>
         </a:lnSpc>
@@ -6038,7 +6185,7 @@
           <a:srgbClr val="000000"/>
         </a:buClr>
         <a:buFont typeface="Arial"/>
-        <a:defRPr b="0" i="0" sz="1400" u="none" cap="none" strike="noStrike">
+        <a:defRPr sz="1400" b="0" i="0" u="none" strike="noStrike" cap="none">
           <a:solidFill>
             <a:srgbClr val="000000"/>
           </a:solidFill>
@@ -6048,7 +6195,7 @@
           <a:sym typeface="Arial"/>
         </a:defRPr>
       </a:lvl2pPr>
-      <a:lvl3pPr lvl="2" marR="0" rtl="0" algn="l">
+      <a:lvl3pPr marR="0" lvl="2" algn="l" rtl="0">
         <a:lnSpc>
           <a:spcPct val="100000"/>
         </a:lnSpc>
@@ -6062,7 +6209,7 @@
           <a:srgbClr val="000000"/>
         </a:buClr>
         <a:buFont typeface="Arial"/>
-        <a:defRPr b="0" i="0" sz="1400" u="none" cap="none" strike="noStrike">
+        <a:defRPr sz="1400" b="0" i="0" u="none" strike="noStrike" cap="none">
           <a:solidFill>
             <a:srgbClr val="000000"/>
           </a:solidFill>
@@ -6072,7 +6219,7 @@
           <a:sym typeface="Arial"/>
         </a:defRPr>
       </a:lvl3pPr>
-      <a:lvl4pPr lvl="3" marR="0" rtl="0" algn="l">
+      <a:lvl4pPr marR="0" lvl="3" algn="l" rtl="0">
         <a:lnSpc>
           <a:spcPct val="100000"/>
         </a:lnSpc>
@@ -6086,7 +6233,7 @@
           <a:srgbClr val="000000"/>
         </a:buClr>
         <a:buFont typeface="Arial"/>
-        <a:defRPr b="0" i="0" sz="1400" u="none" cap="none" strike="noStrike">
+        <a:defRPr sz="1400" b="0" i="0" u="none" strike="noStrike" cap="none">
           <a:solidFill>
             <a:srgbClr val="000000"/>
           </a:solidFill>
@@ -6096,7 +6243,7 @@
           <a:sym typeface="Arial"/>
         </a:defRPr>
       </a:lvl4pPr>
-      <a:lvl5pPr lvl="4" marR="0" rtl="0" algn="l">
+      <a:lvl5pPr marR="0" lvl="4" algn="l" rtl="0">
         <a:lnSpc>
           <a:spcPct val="100000"/>
         </a:lnSpc>
@@ -6110,7 +6257,7 @@
           <a:srgbClr val="000000"/>
         </a:buClr>
         <a:buFont typeface="Arial"/>
-        <a:defRPr b="0" i="0" sz="1400" u="none" cap="none" strike="noStrike">
+        <a:defRPr sz="1400" b="0" i="0" u="none" strike="noStrike" cap="none">
           <a:solidFill>
             <a:srgbClr val="000000"/>
           </a:solidFill>
@@ -6120,7 +6267,7 @@
           <a:sym typeface="Arial"/>
         </a:defRPr>
       </a:lvl5pPr>
-      <a:lvl6pPr lvl="5" marR="0" rtl="0" algn="l">
+      <a:lvl6pPr marR="0" lvl="5" algn="l" rtl="0">
         <a:lnSpc>
           <a:spcPct val="100000"/>
         </a:lnSpc>
@@ -6134,7 +6281,7 @@
           <a:srgbClr val="000000"/>
         </a:buClr>
         <a:buFont typeface="Arial"/>
-        <a:defRPr b="0" i="0" sz="1400" u="none" cap="none" strike="noStrike">
+        <a:defRPr sz="1400" b="0" i="0" u="none" strike="noStrike" cap="none">
           <a:solidFill>
             <a:srgbClr val="000000"/>
           </a:solidFill>
@@ -6144,7 +6291,7 @@
           <a:sym typeface="Arial"/>
         </a:defRPr>
       </a:lvl6pPr>
-      <a:lvl7pPr lvl="6" marR="0" rtl="0" algn="l">
+      <a:lvl7pPr marR="0" lvl="6" algn="l" rtl="0">
         <a:lnSpc>
           <a:spcPct val="100000"/>
         </a:lnSpc>
@@ -6158,7 +6305,7 @@
           <a:srgbClr val="000000"/>
         </a:buClr>
         <a:buFont typeface="Arial"/>
-        <a:defRPr b="0" i="0" sz="1400" u="none" cap="none" strike="noStrike">
+        <a:defRPr sz="1400" b="0" i="0" u="none" strike="noStrike" cap="none">
           <a:solidFill>
             <a:srgbClr val="000000"/>
           </a:solidFill>
@@ -6168,7 +6315,7 @@
           <a:sym typeface="Arial"/>
         </a:defRPr>
       </a:lvl7pPr>
-      <a:lvl8pPr lvl="7" marR="0" rtl="0" algn="l">
+      <a:lvl8pPr marR="0" lvl="7" algn="l" rtl="0">
         <a:lnSpc>
           <a:spcPct val="100000"/>
         </a:lnSpc>
@@ -6182,7 +6329,7 @@
           <a:srgbClr val="000000"/>
         </a:buClr>
         <a:buFont typeface="Arial"/>
-        <a:defRPr b="0" i="0" sz="1400" u="none" cap="none" strike="noStrike">
+        <a:defRPr sz="1400" b="0" i="0" u="none" strike="noStrike" cap="none">
           <a:solidFill>
             <a:srgbClr val="000000"/>
           </a:solidFill>
@@ -6192,7 +6339,7 @@
           <a:sym typeface="Arial"/>
         </a:defRPr>
       </a:lvl8pPr>
-      <a:lvl9pPr lvl="8" marR="0" rtl="0" algn="l">
+      <a:lvl9pPr marR="0" lvl="8" algn="l" rtl="0">
         <a:lnSpc>
           <a:spcPct val="100000"/>
         </a:lnSpc>
@@ -6206,7 +6353,7 @@
           <a:srgbClr val="000000"/>
         </a:buClr>
         <a:buFont typeface="Arial"/>
-        <a:defRPr b="0" i="0" sz="1400" u="none" cap="none" strike="noStrike">
+        <a:defRPr sz="1400" b="0" i="0" u="none" strike="noStrike" cap="none">
           <a:solidFill>
             <a:srgbClr val="000000"/>
           </a:solidFill>
@@ -6218,7 +6365,7 @@
       </a:lvl9pPr>
     </p:titleStyle>
     <p:bodyStyle>
-      <a:defPPr lvl="0" marR="0" rtl="0" algn="l">
+      <a:defPPr marR="0" lvl="0" algn="l" rtl="0">
         <a:lnSpc>
           <a:spcPct val="100000"/>
         </a:lnSpc>
@@ -6229,7 +6376,7 @@
           <a:spcPts val="0"/>
         </a:spcAft>
       </a:defPPr>
-      <a:lvl1pPr lvl="0" marR="0" rtl="0" algn="l">
+      <a:lvl1pPr marR="0" lvl="0" algn="l" rtl="0">
         <a:lnSpc>
           <a:spcPct val="100000"/>
         </a:lnSpc>
@@ -6243,7 +6390,7 @@
           <a:srgbClr val="000000"/>
         </a:buClr>
         <a:buFont typeface="Arial"/>
-        <a:defRPr b="0" i="0" sz="1400" u="none" cap="none" strike="noStrike">
+        <a:defRPr sz="1400" b="0" i="0" u="none" strike="noStrike" cap="none">
           <a:solidFill>
             <a:srgbClr val="000000"/>
           </a:solidFill>
@@ -6253,7 +6400,7 @@
           <a:sym typeface="Arial"/>
         </a:defRPr>
       </a:lvl1pPr>
-      <a:lvl2pPr lvl="1" marR="0" rtl="0" algn="l">
+      <a:lvl2pPr marR="0" lvl="1" algn="l" rtl="0">
         <a:lnSpc>
           <a:spcPct val="100000"/>
         </a:lnSpc>
@@ -6267,7 +6414,7 @@
           <a:srgbClr val="000000"/>
         </a:buClr>
         <a:buFont typeface="Arial"/>
-        <a:defRPr b="0" i="0" sz="1400" u="none" cap="none" strike="noStrike">
+        <a:defRPr sz="1400" b="0" i="0" u="none" strike="noStrike" cap="none">
           <a:solidFill>
             <a:srgbClr val="000000"/>
           </a:solidFill>
@@ -6277,7 +6424,7 @@
           <a:sym typeface="Arial"/>
         </a:defRPr>
       </a:lvl2pPr>
-      <a:lvl3pPr lvl="2" marR="0" rtl="0" algn="l">
+      <a:lvl3pPr marR="0" lvl="2" algn="l" rtl="0">
         <a:lnSpc>
           <a:spcPct val="100000"/>
         </a:lnSpc>
@@ -6291,7 +6438,7 @@
           <a:srgbClr val="000000"/>
         </a:buClr>
         <a:buFont typeface="Arial"/>
-        <a:defRPr b="0" i="0" sz="1400" u="none" cap="none" strike="noStrike">
+        <a:defRPr sz="1400" b="0" i="0" u="none" strike="noStrike" cap="none">
           <a:solidFill>
             <a:srgbClr val="000000"/>
           </a:solidFill>
@@ -6301,7 +6448,7 @@
           <a:sym typeface="Arial"/>
         </a:defRPr>
       </a:lvl3pPr>
-      <a:lvl4pPr lvl="3" marR="0" rtl="0" algn="l">
+      <a:lvl4pPr marR="0" lvl="3" algn="l" rtl="0">
         <a:lnSpc>
           <a:spcPct val="100000"/>
         </a:lnSpc>
@@ -6315,7 +6462,7 @@
           <a:srgbClr val="000000"/>
         </a:buClr>
         <a:buFont typeface="Arial"/>
-        <a:defRPr b="0" i="0" sz="1400" u="none" cap="none" strike="noStrike">
+        <a:defRPr sz="1400" b="0" i="0" u="none" strike="noStrike" cap="none">
           <a:solidFill>
             <a:srgbClr val="000000"/>
           </a:solidFill>
@@ -6325,7 +6472,7 @@
           <a:sym typeface="Arial"/>
         </a:defRPr>
       </a:lvl4pPr>
-      <a:lvl5pPr lvl="4" marR="0" rtl="0" algn="l">
+      <a:lvl5pPr marR="0" lvl="4" algn="l" rtl="0">
         <a:lnSpc>
           <a:spcPct val="100000"/>
         </a:lnSpc>
@@ -6339,7 +6486,7 @@
           <a:srgbClr val="000000"/>
         </a:buClr>
         <a:buFont typeface="Arial"/>
-        <a:defRPr b="0" i="0" sz="1400" u="none" cap="none" strike="noStrike">
+        <a:defRPr sz="1400" b="0" i="0" u="none" strike="noStrike" cap="none">
           <a:solidFill>
             <a:srgbClr val="000000"/>
           </a:solidFill>
@@ -6349,7 +6496,7 @@
           <a:sym typeface="Arial"/>
         </a:defRPr>
       </a:lvl5pPr>
-      <a:lvl6pPr lvl="5" marR="0" rtl="0" algn="l">
+      <a:lvl6pPr marR="0" lvl="5" algn="l" rtl="0">
         <a:lnSpc>
           <a:spcPct val="100000"/>
         </a:lnSpc>
@@ -6363,7 +6510,7 @@
           <a:srgbClr val="000000"/>
         </a:buClr>
         <a:buFont typeface="Arial"/>
-        <a:defRPr b="0" i="0" sz="1400" u="none" cap="none" strike="noStrike">
+        <a:defRPr sz="1400" b="0" i="0" u="none" strike="noStrike" cap="none">
           <a:solidFill>
             <a:srgbClr val="000000"/>
           </a:solidFill>
@@ -6373,7 +6520,7 @@
           <a:sym typeface="Arial"/>
         </a:defRPr>
       </a:lvl6pPr>
-      <a:lvl7pPr lvl="6" marR="0" rtl="0" algn="l">
+      <a:lvl7pPr marR="0" lvl="6" algn="l" rtl="0">
         <a:lnSpc>
           <a:spcPct val="100000"/>
         </a:lnSpc>
@@ -6387,7 +6534,7 @@
           <a:srgbClr val="000000"/>
         </a:buClr>
         <a:buFont typeface="Arial"/>
-        <a:defRPr b="0" i="0" sz="1400" u="none" cap="none" strike="noStrike">
+        <a:defRPr sz="1400" b="0" i="0" u="none" strike="noStrike" cap="none">
           <a:solidFill>
             <a:srgbClr val="000000"/>
           </a:solidFill>
@@ -6397,7 +6544,7 @@
           <a:sym typeface="Arial"/>
         </a:defRPr>
       </a:lvl7pPr>
-      <a:lvl8pPr lvl="7" marR="0" rtl="0" algn="l">
+      <a:lvl8pPr marR="0" lvl="7" algn="l" rtl="0">
         <a:lnSpc>
           <a:spcPct val="100000"/>
         </a:lnSpc>
@@ -6411,7 +6558,7 @@
           <a:srgbClr val="000000"/>
         </a:buClr>
         <a:buFont typeface="Arial"/>
-        <a:defRPr b="0" i="0" sz="1400" u="none" cap="none" strike="noStrike">
+        <a:defRPr sz="1400" b="0" i="0" u="none" strike="noStrike" cap="none">
           <a:solidFill>
             <a:srgbClr val="000000"/>
           </a:solidFill>
@@ -6421,7 +6568,7 @@
           <a:sym typeface="Arial"/>
         </a:defRPr>
       </a:lvl8pPr>
-      <a:lvl9pPr lvl="8" marR="0" rtl="0" algn="l">
+      <a:lvl9pPr marR="0" lvl="8" algn="l" rtl="0">
         <a:lnSpc>
           <a:spcPct val="100000"/>
         </a:lnSpc>
@@ -6435,7 +6582,7 @@
           <a:srgbClr val="000000"/>
         </a:buClr>
         <a:buFont typeface="Arial"/>
-        <a:defRPr b="0" i="0" sz="1400" u="none" cap="none" strike="noStrike">
+        <a:defRPr sz="1400" b="0" i="0" u="none" strike="noStrike" cap="none">
           <a:solidFill>
             <a:srgbClr val="000000"/>
           </a:solidFill>
@@ -6447,7 +6594,7 @@
       </a:lvl9pPr>
     </p:bodyStyle>
     <p:otherStyle>
-      <a:defPPr lvl="0" marR="0" rtl="0" algn="l">
+      <a:defPPr marR="0" lvl="0" algn="l" rtl="0">
         <a:lnSpc>
           <a:spcPct val="100000"/>
         </a:lnSpc>
@@ -6458,7 +6605,7 @@
           <a:spcPts val="0"/>
         </a:spcAft>
       </a:defPPr>
-      <a:lvl1pPr lvl="0" marR="0" rtl="0" algn="l">
+      <a:lvl1pPr marR="0" lvl="0" algn="l" rtl="0">
         <a:lnSpc>
           <a:spcPct val="100000"/>
         </a:lnSpc>
@@ -6472,7 +6619,7 @@
           <a:srgbClr val="000000"/>
         </a:buClr>
         <a:buFont typeface="Arial"/>
-        <a:defRPr b="0" i="0" sz="1400" u="none" cap="none" strike="noStrike">
+        <a:defRPr sz="1400" b="0" i="0" u="none" strike="noStrike" cap="none">
           <a:solidFill>
             <a:srgbClr val="000000"/>
           </a:solidFill>
@@ -6482,7 +6629,7 @@
           <a:sym typeface="Arial"/>
         </a:defRPr>
       </a:lvl1pPr>
-      <a:lvl2pPr lvl="1" marR="0" rtl="0" algn="l">
+      <a:lvl2pPr marR="0" lvl="1" algn="l" rtl="0">
         <a:lnSpc>
           <a:spcPct val="100000"/>
         </a:lnSpc>
@@ -6496,7 +6643,7 @@
           <a:srgbClr val="000000"/>
         </a:buClr>
         <a:buFont typeface="Arial"/>
-        <a:defRPr b="0" i="0" sz="1400" u="none" cap="none" strike="noStrike">
+        <a:defRPr sz="1400" b="0" i="0" u="none" strike="noStrike" cap="none">
           <a:solidFill>
             <a:srgbClr val="000000"/>
           </a:solidFill>
@@ -6506,7 +6653,7 @@
           <a:sym typeface="Arial"/>
         </a:defRPr>
       </a:lvl2pPr>
-      <a:lvl3pPr lvl="2" marR="0" rtl="0" algn="l">
+      <a:lvl3pPr marR="0" lvl="2" algn="l" rtl="0">
         <a:lnSpc>
           <a:spcPct val="100000"/>
         </a:lnSpc>
@@ -6520,7 +6667,7 @@
           <a:srgbClr val="000000"/>
         </a:buClr>
         <a:buFont typeface="Arial"/>
-        <a:defRPr b="0" i="0" sz="1400" u="none" cap="none" strike="noStrike">
+        <a:defRPr sz="1400" b="0" i="0" u="none" strike="noStrike" cap="none">
           <a:solidFill>
             <a:srgbClr val="000000"/>
           </a:solidFill>
@@ -6530,7 +6677,7 @@
           <a:sym typeface="Arial"/>
         </a:defRPr>
       </a:lvl3pPr>
-      <a:lvl4pPr lvl="3" marR="0" rtl="0" algn="l">
+      <a:lvl4pPr marR="0" lvl="3" algn="l" rtl="0">
         <a:lnSpc>
           <a:spcPct val="100000"/>
         </a:lnSpc>
@@ -6544,7 +6691,7 @@
           <a:srgbClr val="000000"/>
         </a:buClr>
         <a:buFont typeface="Arial"/>
-        <a:defRPr b="0" i="0" sz="1400" u="none" cap="none" strike="noStrike">
+        <a:defRPr sz="1400" b="0" i="0" u="none" strike="noStrike" cap="none">
           <a:solidFill>
             <a:srgbClr val="000000"/>
           </a:solidFill>
@@ -6554,7 +6701,7 @@
           <a:sym typeface="Arial"/>
         </a:defRPr>
       </a:lvl4pPr>
-      <a:lvl5pPr lvl="4" marR="0" rtl="0" algn="l">
+      <a:lvl5pPr marR="0" lvl="4" algn="l" rtl="0">
         <a:lnSpc>
           <a:spcPct val="100000"/>
         </a:lnSpc>
@@ -6568,7 +6715,7 @@
           <a:srgbClr val="000000"/>
         </a:buClr>
         <a:buFont typeface="Arial"/>
-        <a:defRPr b="0" i="0" sz="1400" u="none" cap="none" strike="noStrike">
+        <a:defRPr sz="1400" b="0" i="0" u="none" strike="noStrike" cap="none">
           <a:solidFill>
             <a:srgbClr val="000000"/>
           </a:solidFill>
@@ -6578,7 +6725,7 @@
           <a:sym typeface="Arial"/>
         </a:defRPr>
       </a:lvl5pPr>
-      <a:lvl6pPr lvl="5" marR="0" rtl="0" algn="l">
+      <a:lvl6pPr marR="0" lvl="5" algn="l" rtl="0">
         <a:lnSpc>
           <a:spcPct val="100000"/>
         </a:lnSpc>
@@ -6592,7 +6739,7 @@
           <a:srgbClr val="000000"/>
         </a:buClr>
         <a:buFont typeface="Arial"/>
-        <a:defRPr b="0" i="0" sz="1400" u="none" cap="none" strike="noStrike">
+        <a:defRPr sz="1400" b="0" i="0" u="none" strike="noStrike" cap="none">
           <a:solidFill>
             <a:srgbClr val="000000"/>
           </a:solidFill>
@@ -6602,7 +6749,7 @@
           <a:sym typeface="Arial"/>
         </a:defRPr>
       </a:lvl6pPr>
-      <a:lvl7pPr lvl="6" marR="0" rtl="0" algn="l">
+      <a:lvl7pPr marR="0" lvl="6" algn="l" rtl="0">
         <a:lnSpc>
           <a:spcPct val="100000"/>
         </a:lnSpc>
@@ -6616,7 +6763,7 @@
           <a:srgbClr val="000000"/>
         </a:buClr>
         <a:buFont typeface="Arial"/>
-        <a:defRPr b="0" i="0" sz="1400" u="none" cap="none" strike="noStrike">
+        <a:defRPr sz="1400" b="0" i="0" u="none" strike="noStrike" cap="none">
           <a:solidFill>
             <a:srgbClr val="000000"/>
           </a:solidFill>
@@ -6626,7 +6773,7 @@
           <a:sym typeface="Arial"/>
         </a:defRPr>
       </a:lvl7pPr>
-      <a:lvl8pPr lvl="7" marR="0" rtl="0" algn="l">
+      <a:lvl8pPr marR="0" lvl="7" algn="l" rtl="0">
         <a:lnSpc>
           <a:spcPct val="100000"/>
         </a:lnSpc>
@@ -6640,7 +6787,7 @@
           <a:srgbClr val="000000"/>
         </a:buClr>
         <a:buFont typeface="Arial"/>
-        <a:defRPr b="0" i="0" sz="1400" u="none" cap="none" strike="noStrike">
+        <a:defRPr sz="1400" b="0" i="0" u="none" strike="noStrike" cap="none">
           <a:solidFill>
             <a:srgbClr val="000000"/>
           </a:solidFill>
@@ -6650,7 +6797,7 @@
           <a:sym typeface="Arial"/>
         </a:defRPr>
       </a:lvl8pPr>
-      <a:lvl9pPr lvl="8" marR="0" rtl="0" algn="l">
+      <a:lvl9pPr marR="0" lvl="8" algn="l" rtl="0">
         <a:lnSpc>
           <a:spcPct val="100000"/>
         </a:lnSpc>
@@ -6664,7 +6811,7 @@
           <a:srgbClr val="000000"/>
         </a:buClr>
         <a:buFont typeface="Arial"/>
-        <a:defRPr b="0" i="0" sz="1400" u="none" cap="none" strike="noStrike">
+        <a:defRPr sz="1400" b="0" i="0" u="none" strike="noStrike" cap="none">
           <a:solidFill>
             <a:srgbClr val="000000"/>
           </a:solidFill>
@@ -6680,11 +6827,11 @@
 </file>
 
 <file path=ppt/slides/slide1.xml><?xml version="1.0" encoding="utf-8"?>
-<p:sld xmlns:a="http://schemas.openxmlformats.org/drawingml/2006/main" xmlns:r="http://schemas.openxmlformats.org/officeDocument/2006/relationships" xmlns:mc="http://schemas.openxmlformats.org/markup-compatibility/2006" xmlns:mv="urn:schemas-microsoft-com:mac:vml" xmlns:p="http://schemas.openxmlformats.org/presentationml/2006/main" xmlns:c="http://schemas.openxmlformats.org/drawingml/2006/chart" xmlns:dgm="http://schemas.openxmlformats.org/drawingml/2006/diagram" xmlns:o="urn:schemas-microsoft-com:office:office" xmlns:v="urn:schemas-microsoft-com:vml" xmlns:pvml="urn:schemas-microsoft-com:office:powerpoint" xmlns:com="http://schemas.openxmlformats.org/drawingml/2006/compatibility" xmlns:p14="http://schemas.microsoft.com/office/powerpoint/2010/main" xmlns:p15="http://schemas.microsoft.com/office/powerpoint/2012/main">
+<p:sld xmlns:a="http://schemas.openxmlformats.org/drawingml/2006/main" xmlns:r="http://schemas.openxmlformats.org/officeDocument/2006/relationships" xmlns:p="http://schemas.openxmlformats.org/presentationml/2006/main">
   <p:cSld>
     <p:spTree>
       <p:nvGrpSpPr>
-        <p:cNvPr id="58" name="Shape 58"/>
+        <p:cNvPr id="1" name="Shape 58"/>
         <p:cNvGrpSpPr/>
         <p:nvPr/>
       </p:nvGrpSpPr>
@@ -6699,7 +6846,9 @@
       <p:sp>
         <p:nvSpPr>
           <p:cNvPr id="59" name="Google Shape;59;p13"/>
-          <p:cNvSpPr txBox="1"/>
+          <p:cNvSpPr txBox="1">
+            <a:spLocks noGrp="1"/>
+          </p:cNvSpPr>
           <p:nvPr>
             <p:ph type="ctrTitle"/>
           </p:nvPr>
@@ -6714,12 +6863,12 @@
           </a:prstGeom>
         </p:spPr>
         <p:txBody>
-          <a:bodyPr anchorCtr="0" anchor="b" bIns="91425" lIns="91425" spcFirstLastPara="1" rIns="91425" wrap="square" tIns="91425">
+          <a:bodyPr spcFirstLastPara="1" wrap="square" lIns="91425" tIns="91425" rIns="91425" bIns="91425" anchor="b" anchorCtr="0">
             <a:noAutofit/>
           </a:bodyPr>
           <a:lstStyle/>
           <a:p>
-            <a:pPr indent="0" lvl="0" marL="0" rtl="0" algn="ctr">
+            <a:pPr marL="0" lvl="0" indent="0" algn="ctr" rtl="0">
               <a:spcBef>
                 <a:spcPts val="0"/>
               </a:spcBef>
@@ -6739,9 +6888,11 @@
       <p:sp>
         <p:nvSpPr>
           <p:cNvPr id="60" name="Google Shape;60;p13"/>
-          <p:cNvSpPr txBox="1"/>
+          <p:cNvSpPr txBox="1">
+            <a:spLocks noGrp="1"/>
+          </p:cNvSpPr>
           <p:nvPr>
-            <p:ph idx="1" type="subTitle"/>
+            <p:ph type="subTitle" idx="1"/>
           </p:nvPr>
         </p:nvSpPr>
         <p:spPr>
@@ -6754,12 +6905,12 @@
           </a:prstGeom>
         </p:spPr>
         <p:txBody>
-          <a:bodyPr anchorCtr="0" anchor="t" bIns="91425" lIns="91425" spcFirstLastPara="1" rIns="91425" wrap="square" tIns="91425">
+          <a:bodyPr spcFirstLastPara="1" wrap="square" lIns="91425" tIns="91425" rIns="91425" bIns="91425" anchor="t" anchorCtr="0">
             <a:noAutofit/>
           </a:bodyPr>
           <a:lstStyle/>
           <a:p>
-            <a:pPr indent="0" lvl="0" marL="0" rtl="0" algn="ctr">
+            <a:pPr marL="0" lvl="0" indent="0" algn="ctr" rtl="0">
               <a:spcBef>
                 <a:spcPts val="0"/>
               </a:spcBef>
@@ -6775,7 +6926,7 @@
             <a:endParaRPr/>
           </a:p>
           <a:p>
-            <a:pPr indent="0" lvl="0" marL="0" rtl="0" algn="ctr">
+            <a:pPr marL="0" lvl="0" indent="0" algn="ctr" rtl="0">
               <a:spcBef>
                 <a:spcPts val="0"/>
               </a:spcBef>
@@ -6801,11 +6952,11 @@
 </file>
 
 <file path=ppt/slides/slide2.xml><?xml version="1.0" encoding="utf-8"?>
-<p:sld xmlns:a="http://schemas.openxmlformats.org/drawingml/2006/main" xmlns:r="http://schemas.openxmlformats.org/officeDocument/2006/relationships" xmlns:mc="http://schemas.openxmlformats.org/markup-compatibility/2006" xmlns:mv="urn:schemas-microsoft-com:mac:vml" xmlns:p="http://schemas.openxmlformats.org/presentationml/2006/main" xmlns:c="http://schemas.openxmlformats.org/drawingml/2006/chart" xmlns:dgm="http://schemas.openxmlformats.org/drawingml/2006/diagram" xmlns:o="urn:schemas-microsoft-com:office:office" xmlns:v="urn:schemas-microsoft-com:vml" xmlns:pvml="urn:schemas-microsoft-com:office:powerpoint" xmlns:com="http://schemas.openxmlformats.org/drawingml/2006/compatibility" xmlns:p14="http://schemas.microsoft.com/office/powerpoint/2010/main" xmlns:p15="http://schemas.microsoft.com/office/powerpoint/2012/main">
+<p:sld xmlns:a="http://schemas.openxmlformats.org/drawingml/2006/main" xmlns:r="http://schemas.openxmlformats.org/officeDocument/2006/relationships" xmlns:p="http://schemas.openxmlformats.org/presentationml/2006/main">
   <p:cSld>
     <p:spTree>
       <p:nvGrpSpPr>
-        <p:cNvPr id="64" name="Shape 64"/>
+        <p:cNvPr id="1" name="Shape 64"/>
         <p:cNvGrpSpPr/>
         <p:nvPr/>
       </p:nvGrpSpPr>
@@ -6820,7 +6971,9 @@
       <p:sp>
         <p:nvSpPr>
           <p:cNvPr id="65" name="Google Shape;65;p14"/>
-          <p:cNvSpPr txBox="1"/>
+          <p:cNvSpPr txBox="1">
+            <a:spLocks noGrp="1"/>
+          </p:cNvSpPr>
           <p:nvPr>
             <p:ph type="title"/>
           </p:nvPr>
@@ -6835,12 +6988,12 @@
           </a:prstGeom>
         </p:spPr>
         <p:txBody>
-          <a:bodyPr anchorCtr="0" anchor="ctr" bIns="91425" lIns="91425" spcFirstLastPara="1" rIns="91425" wrap="square" tIns="91425">
+          <a:bodyPr spcFirstLastPara="1" wrap="square" lIns="91425" tIns="91425" rIns="91425" bIns="91425" anchor="ctr" anchorCtr="0">
             <a:noAutofit/>
           </a:bodyPr>
           <a:lstStyle/>
           <a:p>
-            <a:pPr indent="0" lvl="0" marL="0" rtl="0" algn="ctr">
+            <a:pPr marL="0" lvl="0" indent="0" algn="ctr" rtl="0">
               <a:spcBef>
                 <a:spcPts val="0"/>
               </a:spcBef>
@@ -6894,11 +7047,11 @@
 </file>
 
 <file path=ppt/slides/slide3.xml><?xml version="1.0" encoding="utf-8"?>
-<p:sld xmlns:a="http://schemas.openxmlformats.org/drawingml/2006/main" xmlns:r="http://schemas.openxmlformats.org/officeDocument/2006/relationships" xmlns:mc="http://schemas.openxmlformats.org/markup-compatibility/2006" xmlns:mv="urn:schemas-microsoft-com:mac:vml" xmlns:p="http://schemas.openxmlformats.org/presentationml/2006/main" xmlns:c="http://schemas.openxmlformats.org/drawingml/2006/chart" xmlns:dgm="http://schemas.openxmlformats.org/drawingml/2006/diagram" xmlns:o="urn:schemas-microsoft-com:office:office" xmlns:v="urn:schemas-microsoft-com:vml" xmlns:pvml="urn:schemas-microsoft-com:office:powerpoint" xmlns:com="http://schemas.openxmlformats.org/drawingml/2006/compatibility" xmlns:p14="http://schemas.microsoft.com/office/powerpoint/2010/main" xmlns:p15="http://schemas.microsoft.com/office/powerpoint/2012/main">
+<p:sld xmlns:a="http://schemas.openxmlformats.org/drawingml/2006/main" xmlns:r="http://schemas.openxmlformats.org/officeDocument/2006/relationships" xmlns:p="http://schemas.openxmlformats.org/presentationml/2006/main">
   <p:cSld>
     <p:spTree>
       <p:nvGrpSpPr>
-        <p:cNvPr id="70" name="Shape 70"/>
+        <p:cNvPr id="1" name="Shape 70"/>
         <p:cNvGrpSpPr/>
         <p:nvPr/>
       </p:nvGrpSpPr>
@@ -6913,7 +7066,9 @@
       <p:sp>
         <p:nvSpPr>
           <p:cNvPr id="71" name="Google Shape;71;p15"/>
-          <p:cNvSpPr txBox="1"/>
+          <p:cNvSpPr txBox="1">
+            <a:spLocks noGrp="1"/>
+          </p:cNvSpPr>
           <p:nvPr>
             <p:ph type="title"/>
           </p:nvPr>
@@ -6928,12 +7083,12 @@
           </a:prstGeom>
         </p:spPr>
         <p:txBody>
-          <a:bodyPr anchorCtr="0" anchor="b" bIns="91425" lIns="91425" spcFirstLastPara="1" rIns="91425" wrap="square" tIns="91425">
+          <a:bodyPr spcFirstLastPara="1" wrap="square" lIns="91425" tIns="91425" rIns="91425" bIns="91425" anchor="b" anchorCtr="0">
             <a:noAutofit/>
           </a:bodyPr>
           <a:lstStyle/>
           <a:p>
-            <a:pPr indent="0" lvl="0" marL="0" rtl="0" algn="ctr">
+            <a:pPr marL="0" lvl="0" indent="0" algn="ctr" rtl="0">
               <a:spcBef>
                 <a:spcPts val="0"/>
               </a:spcBef>
@@ -6953,9 +7108,11 @@
       <p:sp>
         <p:nvSpPr>
           <p:cNvPr id="72" name="Google Shape;72;p15"/>
-          <p:cNvSpPr txBox="1"/>
+          <p:cNvSpPr txBox="1">
+            <a:spLocks noGrp="1"/>
+          </p:cNvSpPr>
           <p:nvPr>
-            <p:ph idx="2" type="body"/>
+            <p:ph type="body" idx="2"/>
           </p:nvPr>
         </p:nvSpPr>
         <p:spPr>
@@ -6968,12 +7125,12 @@
           </a:prstGeom>
         </p:spPr>
         <p:txBody>
-          <a:bodyPr anchorCtr="0" anchor="ctr" bIns="91425" lIns="91425" spcFirstLastPara="1" rIns="91425" wrap="square" tIns="91425">
+          <a:bodyPr spcFirstLastPara="1" wrap="square" lIns="91425" tIns="91425" rIns="91425" bIns="91425" anchor="ctr" anchorCtr="0">
             <a:noAutofit/>
           </a:bodyPr>
           <a:lstStyle/>
           <a:p>
-            <a:pPr indent="-342900" lvl="0" marL="457200" rtl="0" algn="l">
+            <a:pPr marL="457200" lvl="0" indent="-342900" algn="l" rtl="0">
               <a:spcBef>
                 <a:spcPts val="0"/>
               </a:spcBef>
@@ -6990,7 +7147,7 @@
             <a:endParaRPr/>
           </a:p>
           <a:p>
-            <a:pPr indent="-342900" lvl="0" marL="457200" rtl="0" algn="l">
+            <a:pPr marL="457200" lvl="0" indent="-342900" algn="l" rtl="0">
               <a:spcBef>
                 <a:spcPts val="1600"/>
               </a:spcBef>
@@ -7007,7 +7164,7 @@
             <a:endParaRPr/>
           </a:p>
           <a:p>
-            <a:pPr indent="-342900" lvl="0" marL="457200" rtl="0" algn="l">
+            <a:pPr marL="457200" lvl="0" indent="-342900" algn="l" rtl="0">
               <a:spcBef>
                 <a:spcPts val="1600"/>
               </a:spcBef>
@@ -7024,7 +7181,7 @@
             <a:endParaRPr/>
           </a:p>
           <a:p>
-            <a:pPr indent="-342900" lvl="0" marL="457200" rtl="0" algn="l">
+            <a:pPr marL="457200" lvl="0" indent="-342900" algn="l" rtl="0">
               <a:spcBef>
                 <a:spcPts val="1600"/>
               </a:spcBef>
@@ -7051,11 +7208,11 @@
 </file>
 
 <file path=ppt/slides/slide4.xml><?xml version="1.0" encoding="utf-8"?>
-<p:sld xmlns:a="http://schemas.openxmlformats.org/drawingml/2006/main" xmlns:r="http://schemas.openxmlformats.org/officeDocument/2006/relationships" xmlns:mc="http://schemas.openxmlformats.org/markup-compatibility/2006" xmlns:mv="urn:schemas-microsoft-com:mac:vml" xmlns:p="http://schemas.openxmlformats.org/presentationml/2006/main" xmlns:c="http://schemas.openxmlformats.org/drawingml/2006/chart" xmlns:dgm="http://schemas.openxmlformats.org/drawingml/2006/diagram" xmlns:o="urn:schemas-microsoft-com:office:office" xmlns:v="urn:schemas-microsoft-com:vml" xmlns:pvml="urn:schemas-microsoft-com:office:powerpoint" xmlns:com="http://schemas.openxmlformats.org/drawingml/2006/compatibility" xmlns:p14="http://schemas.microsoft.com/office/powerpoint/2010/main" xmlns:p15="http://schemas.microsoft.com/office/powerpoint/2012/main">
+<p:sld xmlns:a="http://schemas.openxmlformats.org/drawingml/2006/main" xmlns:r="http://schemas.openxmlformats.org/officeDocument/2006/relationships" xmlns:p="http://schemas.openxmlformats.org/presentationml/2006/main">
   <p:cSld>
     <p:spTree>
       <p:nvGrpSpPr>
-        <p:cNvPr id="76" name="Shape 76"/>
+        <p:cNvPr id="1" name="Shape 76"/>
         <p:cNvGrpSpPr/>
         <p:nvPr/>
       </p:nvGrpSpPr>
@@ -7070,7 +7227,9 @@
       <p:sp>
         <p:nvSpPr>
           <p:cNvPr id="77" name="Google Shape;77;p16"/>
-          <p:cNvSpPr txBox="1"/>
+          <p:cNvSpPr txBox="1">
+            <a:spLocks noGrp="1"/>
+          </p:cNvSpPr>
           <p:nvPr>
             <p:ph type="title"/>
           </p:nvPr>
@@ -7085,12 +7244,12 @@
           </a:prstGeom>
         </p:spPr>
         <p:txBody>
-          <a:bodyPr anchorCtr="0" anchor="t" bIns="91425" lIns="91425" spcFirstLastPara="1" rIns="91425" wrap="square" tIns="91425">
+          <a:bodyPr spcFirstLastPara="1" wrap="square" lIns="91425" tIns="91425" rIns="91425" bIns="91425" anchor="t" anchorCtr="0">
             <a:noAutofit/>
           </a:bodyPr>
           <a:lstStyle/>
           <a:p>
-            <a:pPr indent="0" lvl="0" marL="0" rtl="0" algn="l">
+            <a:pPr marL="0" lvl="0" indent="0" algn="l" rtl="0">
               <a:spcBef>
                 <a:spcPts val="0"/>
               </a:spcBef>
@@ -7200,11 +7359,11 @@
 </file>
 
 <file path=ppt/slides/slide5.xml><?xml version="1.0" encoding="utf-8"?>
-<p:sld xmlns:a="http://schemas.openxmlformats.org/drawingml/2006/main" xmlns:r="http://schemas.openxmlformats.org/officeDocument/2006/relationships" xmlns:mc="http://schemas.openxmlformats.org/markup-compatibility/2006" xmlns:mv="urn:schemas-microsoft-com:mac:vml" xmlns:p="http://schemas.openxmlformats.org/presentationml/2006/main" xmlns:c="http://schemas.openxmlformats.org/drawingml/2006/chart" xmlns:dgm="http://schemas.openxmlformats.org/drawingml/2006/diagram" xmlns:o="urn:schemas-microsoft-com:office:office" xmlns:v="urn:schemas-microsoft-com:vml" xmlns:pvml="urn:schemas-microsoft-com:office:powerpoint" xmlns:com="http://schemas.openxmlformats.org/drawingml/2006/compatibility" xmlns:p14="http://schemas.microsoft.com/office/powerpoint/2010/main" xmlns:p15="http://schemas.microsoft.com/office/powerpoint/2012/main">
+<p:sld xmlns:a="http://schemas.openxmlformats.org/drawingml/2006/main" xmlns:r="http://schemas.openxmlformats.org/officeDocument/2006/relationships" xmlns:p="http://schemas.openxmlformats.org/presentationml/2006/main">
   <p:cSld>
     <p:spTree>
       <p:nvGrpSpPr>
-        <p:cNvPr id="84" name="Shape 84"/>
+        <p:cNvPr id="1" name="Shape 84"/>
         <p:cNvGrpSpPr/>
         <p:nvPr/>
       </p:nvGrpSpPr>
@@ -7219,7 +7378,9 @@
       <p:sp>
         <p:nvSpPr>
           <p:cNvPr id="85" name="Google Shape;85;p17"/>
-          <p:cNvSpPr txBox="1"/>
+          <p:cNvSpPr txBox="1">
+            <a:spLocks noGrp="1"/>
+          </p:cNvSpPr>
           <p:nvPr>
             <p:ph type="title"/>
           </p:nvPr>
@@ -7234,12 +7395,12 @@
           </a:prstGeom>
         </p:spPr>
         <p:txBody>
-          <a:bodyPr anchorCtr="0" anchor="ctr" bIns="91425" lIns="91425" spcFirstLastPara="1" rIns="91425" wrap="square" tIns="91425">
+          <a:bodyPr spcFirstLastPara="1" wrap="square" lIns="91425" tIns="91425" rIns="91425" bIns="91425" anchor="ctr" anchorCtr="0">
             <a:noAutofit/>
           </a:bodyPr>
           <a:lstStyle/>
           <a:p>
-            <a:pPr indent="0" lvl="0" marL="0" rtl="0" algn="ctr">
+            <a:pPr marL="0" lvl="0" indent="0" algn="ctr" rtl="0">
               <a:spcBef>
                 <a:spcPts val="0"/>
               </a:spcBef>
@@ -7265,11 +7426,11 @@
 </file>
 
 <file path=ppt/slides/slide6.xml><?xml version="1.0" encoding="utf-8"?>
-<p:sld xmlns:a="http://schemas.openxmlformats.org/drawingml/2006/main" xmlns:r="http://schemas.openxmlformats.org/officeDocument/2006/relationships" xmlns:mc="http://schemas.openxmlformats.org/markup-compatibility/2006" xmlns:mv="urn:schemas-microsoft-com:mac:vml" xmlns:p="http://schemas.openxmlformats.org/presentationml/2006/main" xmlns:c="http://schemas.openxmlformats.org/drawingml/2006/chart" xmlns:dgm="http://schemas.openxmlformats.org/drawingml/2006/diagram" xmlns:o="urn:schemas-microsoft-com:office:office" xmlns:v="urn:schemas-microsoft-com:vml" xmlns:pvml="urn:schemas-microsoft-com:office:powerpoint" xmlns:com="http://schemas.openxmlformats.org/drawingml/2006/compatibility" xmlns:p14="http://schemas.microsoft.com/office/powerpoint/2010/main" xmlns:p15="http://schemas.microsoft.com/office/powerpoint/2012/main">
+<p:sld xmlns:a="http://schemas.openxmlformats.org/drawingml/2006/main" xmlns:r="http://schemas.openxmlformats.org/officeDocument/2006/relationships" xmlns:p="http://schemas.openxmlformats.org/presentationml/2006/main">
   <p:cSld>
     <p:spTree>
       <p:nvGrpSpPr>
-        <p:cNvPr id="89" name="Shape 89"/>
+        <p:cNvPr id="1" name="Shape 89"/>
         <p:cNvGrpSpPr/>
         <p:nvPr/>
       </p:nvGrpSpPr>
@@ -7284,9 +7445,11 @@
       <p:sp>
         <p:nvSpPr>
           <p:cNvPr id="90" name="Google Shape;90;p18"/>
-          <p:cNvSpPr txBox="1"/>
+          <p:cNvSpPr txBox="1">
+            <a:spLocks noGrp="1"/>
+          </p:cNvSpPr>
           <p:nvPr>
-            <p:ph idx="1" type="body"/>
+            <p:ph type="body" idx="1"/>
           </p:nvPr>
         </p:nvSpPr>
         <p:spPr>
@@ -7299,12 +7462,12 @@
           </a:prstGeom>
         </p:spPr>
         <p:txBody>
-          <a:bodyPr anchorCtr="0" anchor="t" bIns="91425" lIns="91425" spcFirstLastPara="1" rIns="91425" wrap="square" tIns="91425">
+          <a:bodyPr spcFirstLastPara="1" wrap="square" lIns="91425" tIns="91425" rIns="91425" bIns="91425" anchor="t" anchorCtr="0">
             <a:noAutofit/>
           </a:bodyPr>
           <a:lstStyle/>
           <a:p>
-            <a:pPr indent="-330200" lvl="0" marL="457200" rtl="0" algn="l">
+            <a:pPr marL="457200" lvl="0" indent="-330200" algn="l" rtl="0">
               <a:spcBef>
                 <a:spcPts val="0"/>
               </a:spcBef>
@@ -7321,7 +7484,7 @@
             <a:endParaRPr sz="1600"/>
           </a:p>
           <a:p>
-            <a:pPr indent="-330200" lvl="0" marL="457200" rtl="0" algn="l">
+            <a:pPr marL="457200" lvl="0" indent="-330200" algn="l" rtl="0">
               <a:spcBef>
                 <a:spcPts val="0"/>
               </a:spcBef>
@@ -7338,7 +7501,7 @@
             <a:endParaRPr sz="1600"/>
           </a:p>
           <a:p>
-            <a:pPr indent="-330200" lvl="0" marL="457200" rtl="0" algn="l">
+            <a:pPr marL="457200" lvl="0" indent="-330200" algn="l" rtl="0">
               <a:spcBef>
                 <a:spcPts val="0"/>
               </a:spcBef>
@@ -7355,7 +7518,7 @@
             <a:endParaRPr sz="1600"/>
           </a:p>
           <a:p>
-            <a:pPr indent="-330200" lvl="1" marL="914400" rtl="0" algn="l">
+            <a:pPr marL="914400" lvl="1" indent="-330200" algn="l" rtl="0">
               <a:spcBef>
                 <a:spcPts val="0"/>
               </a:spcBef>
@@ -7372,7 +7535,7 @@
             <a:endParaRPr sz="1600"/>
           </a:p>
           <a:p>
-            <a:pPr indent="-330200" lvl="1" marL="914400" rtl="0" algn="l">
+            <a:pPr marL="914400" lvl="1" indent="-330200" algn="l" rtl="0">
               <a:spcBef>
                 <a:spcPts val="0"/>
               </a:spcBef>
@@ -7389,7 +7552,7 @@
             <a:endParaRPr sz="1600"/>
           </a:p>
           <a:p>
-            <a:pPr indent="-330200" lvl="1" marL="914400" rtl="0" algn="l">
+            <a:pPr marL="914400" lvl="1" indent="-330200" algn="l" rtl="0">
               <a:spcBef>
                 <a:spcPts val="0"/>
               </a:spcBef>
@@ -7406,7 +7569,7 @@
             <a:endParaRPr sz="1600"/>
           </a:p>
           <a:p>
-            <a:pPr indent="-330200" lvl="1" marL="914400" rtl="0" algn="l">
+            <a:pPr marL="914400" lvl="1" indent="-330200" algn="l" rtl="0">
               <a:spcBef>
                 <a:spcPts val="0"/>
               </a:spcBef>
@@ -7423,7 +7586,7 @@
             <a:endParaRPr sz="1600"/>
           </a:p>
           <a:p>
-            <a:pPr indent="-330200" lvl="0" marL="457200" rtl="0" algn="l">
+            <a:pPr marL="457200" lvl="0" indent="-330200" algn="l" rtl="0">
               <a:spcBef>
                 <a:spcPts val="0"/>
               </a:spcBef>
@@ -7440,7 +7603,7 @@
             <a:endParaRPr sz="1600"/>
           </a:p>
           <a:p>
-            <a:pPr indent="-330200" lvl="1" marL="914400" rtl="0" algn="l">
+            <a:pPr marL="914400" lvl="1" indent="-330200" algn="l" rtl="0">
               <a:spcBef>
                 <a:spcPts val="0"/>
               </a:spcBef>
@@ -7457,7 +7620,7 @@
             <a:endParaRPr sz="1600"/>
           </a:p>
           <a:p>
-            <a:pPr indent="-330200" lvl="1" marL="914400" rtl="0" algn="l">
+            <a:pPr marL="914400" lvl="1" indent="-330200" algn="l" rtl="0">
               <a:spcBef>
                 <a:spcPts val="0"/>
               </a:spcBef>
@@ -7474,7 +7637,7 @@
             <a:endParaRPr sz="1600"/>
           </a:p>
           <a:p>
-            <a:pPr indent="-330200" lvl="1" marL="914400" rtl="0" algn="l">
+            <a:pPr marL="914400" lvl="1" indent="-330200" algn="l" rtl="0">
               <a:spcBef>
                 <a:spcPts val="0"/>
               </a:spcBef>
@@ -7491,7 +7654,7 @@
             <a:endParaRPr sz="1600"/>
           </a:p>
           <a:p>
-            <a:pPr indent="-330200" lvl="1" marL="914400" rtl="0" algn="l">
+            <a:pPr marL="914400" lvl="1" indent="-330200" algn="l" rtl="0">
               <a:spcBef>
                 <a:spcPts val="0"/>
               </a:spcBef>
@@ -7512,7 +7675,9 @@
       <p:sp>
         <p:nvSpPr>
           <p:cNvPr id="91" name="Google Shape;91;p18"/>
-          <p:cNvSpPr txBox="1"/>
+          <p:cNvSpPr txBox="1">
+            <a:spLocks noGrp="1"/>
+          </p:cNvSpPr>
           <p:nvPr>
             <p:ph type="title"/>
           </p:nvPr>
@@ -7527,12 +7692,12 @@
           </a:prstGeom>
         </p:spPr>
         <p:txBody>
-          <a:bodyPr anchorCtr="0" anchor="t" bIns="91425" lIns="91425" spcFirstLastPara="1" rIns="91425" wrap="square" tIns="91425">
+          <a:bodyPr spcFirstLastPara="1" wrap="square" lIns="91425" tIns="91425" rIns="91425" bIns="91425" anchor="t" anchorCtr="0">
             <a:noAutofit/>
           </a:bodyPr>
           <a:lstStyle/>
           <a:p>
-            <a:pPr indent="0" lvl="0" marL="0" rtl="0" algn="l">
+            <a:pPr marL="0" lvl="0" indent="0" algn="l" rtl="0">
               <a:spcBef>
                 <a:spcPts val="0"/>
               </a:spcBef>
@@ -7558,11 +7723,11 @@
 </file>
 
 <file path=ppt/slides/slide7.xml><?xml version="1.0" encoding="utf-8"?>
-<p:sld xmlns:a="http://schemas.openxmlformats.org/drawingml/2006/main" xmlns:r="http://schemas.openxmlformats.org/officeDocument/2006/relationships" xmlns:mc="http://schemas.openxmlformats.org/markup-compatibility/2006" xmlns:mv="urn:schemas-microsoft-com:mac:vml" xmlns:p="http://schemas.openxmlformats.org/presentationml/2006/main" xmlns:c="http://schemas.openxmlformats.org/drawingml/2006/chart" xmlns:dgm="http://schemas.openxmlformats.org/drawingml/2006/diagram" xmlns:o="urn:schemas-microsoft-com:office:office" xmlns:v="urn:schemas-microsoft-com:vml" xmlns:pvml="urn:schemas-microsoft-com:office:powerpoint" xmlns:com="http://schemas.openxmlformats.org/drawingml/2006/compatibility" xmlns:p14="http://schemas.microsoft.com/office/powerpoint/2010/main" xmlns:p15="http://schemas.microsoft.com/office/powerpoint/2012/main">
+<p:sld xmlns:a="http://schemas.openxmlformats.org/drawingml/2006/main" xmlns:r="http://schemas.openxmlformats.org/officeDocument/2006/relationships" xmlns:p="http://schemas.openxmlformats.org/presentationml/2006/main">
   <p:cSld>
     <p:spTree>
       <p:nvGrpSpPr>
-        <p:cNvPr id="95" name="Shape 95"/>
+        <p:cNvPr id="1" name="Shape 95"/>
         <p:cNvGrpSpPr/>
         <p:nvPr/>
       </p:nvGrpSpPr>
@@ -7577,9 +7742,11 @@
       <p:sp>
         <p:nvSpPr>
           <p:cNvPr id="96" name="Google Shape;96;p19"/>
-          <p:cNvSpPr txBox="1"/>
+          <p:cNvSpPr txBox="1">
+            <a:spLocks noGrp="1"/>
+          </p:cNvSpPr>
           <p:nvPr>
-            <p:ph idx="1" type="body"/>
+            <p:ph type="body" idx="1"/>
           </p:nvPr>
         </p:nvSpPr>
         <p:spPr>
@@ -7595,12 +7762,12 @@
           </a:solidFill>
         </p:spPr>
         <p:txBody>
-          <a:bodyPr anchorCtr="0" anchor="ctr" bIns="91425" lIns="91425" spcFirstLastPara="1" rIns="91425" wrap="square" tIns="91425">
+          <a:bodyPr spcFirstLastPara="1" wrap="square" lIns="91425" tIns="91425" rIns="91425" bIns="91425" anchor="ctr" anchorCtr="0">
             <a:noAutofit/>
           </a:bodyPr>
           <a:lstStyle/>
           <a:p>
-            <a:pPr indent="0" lvl="0" marL="0" rtl="0" algn="l">
+            <a:pPr marL="0" lvl="0" indent="0" algn="l" rtl="0">
               <a:spcBef>
                 <a:spcPts val="0"/>
               </a:spcBef>
@@ -7654,11 +7821,11 @@
 </file>
 
 <file path=ppt/slides/slide8.xml><?xml version="1.0" encoding="utf-8"?>
-<p:sld xmlns:a="http://schemas.openxmlformats.org/drawingml/2006/main" xmlns:r="http://schemas.openxmlformats.org/officeDocument/2006/relationships" xmlns:mc="http://schemas.openxmlformats.org/markup-compatibility/2006" xmlns:mv="urn:schemas-microsoft-com:mac:vml" xmlns:p="http://schemas.openxmlformats.org/presentationml/2006/main" xmlns:c="http://schemas.openxmlformats.org/drawingml/2006/chart" xmlns:dgm="http://schemas.openxmlformats.org/drawingml/2006/diagram" xmlns:o="urn:schemas-microsoft-com:office:office" xmlns:v="urn:schemas-microsoft-com:vml" xmlns:pvml="urn:schemas-microsoft-com:office:powerpoint" xmlns:com="http://schemas.openxmlformats.org/drawingml/2006/compatibility" xmlns:p14="http://schemas.microsoft.com/office/powerpoint/2010/main" xmlns:p15="http://schemas.microsoft.com/office/powerpoint/2012/main">
+<p:sld xmlns:a="http://schemas.openxmlformats.org/drawingml/2006/main" xmlns:r="http://schemas.openxmlformats.org/officeDocument/2006/relationships" xmlns:p="http://schemas.openxmlformats.org/presentationml/2006/main">
   <p:cSld>
     <p:spTree>
       <p:nvGrpSpPr>
-        <p:cNvPr id="101" name="Shape 101"/>
+        <p:cNvPr id="1" name="Shape 101"/>
         <p:cNvGrpSpPr/>
         <p:nvPr/>
       </p:nvGrpSpPr>
@@ -7673,7 +7840,9 @@
       <p:sp>
         <p:nvSpPr>
           <p:cNvPr id="102" name="Google Shape;102;p20"/>
-          <p:cNvSpPr txBox="1"/>
+          <p:cNvSpPr txBox="1">
+            <a:spLocks noGrp="1"/>
+          </p:cNvSpPr>
           <p:nvPr>
             <p:ph type="title"/>
           </p:nvPr>
@@ -7688,12 +7857,12 @@
           </a:prstGeom>
         </p:spPr>
         <p:txBody>
-          <a:bodyPr anchorCtr="0" anchor="t" bIns="91425" lIns="91425" spcFirstLastPara="1" rIns="91425" wrap="square" tIns="91425">
+          <a:bodyPr spcFirstLastPara="1" wrap="square" lIns="91425" tIns="91425" rIns="91425" bIns="91425" anchor="t" anchorCtr="0">
             <a:noAutofit/>
           </a:bodyPr>
           <a:lstStyle/>
           <a:p>
-            <a:pPr indent="0" lvl="0" marL="0" rtl="0" algn="l">
+            <a:pPr marL="0" lvl="0" indent="0" algn="l" rtl="0">
               <a:spcBef>
                 <a:spcPts val="0"/>
               </a:spcBef>
@@ -7713,9 +7882,11 @@
       <p:sp>
         <p:nvSpPr>
           <p:cNvPr id="103" name="Google Shape;103;p20"/>
-          <p:cNvSpPr txBox="1"/>
+          <p:cNvSpPr txBox="1">
+            <a:spLocks noGrp="1"/>
+          </p:cNvSpPr>
           <p:nvPr>
-            <p:ph idx="1" type="body"/>
+            <p:ph type="body" idx="1"/>
           </p:nvPr>
         </p:nvSpPr>
         <p:spPr>
@@ -7728,12 +7899,12 @@
           </a:prstGeom>
         </p:spPr>
         <p:txBody>
-          <a:bodyPr anchorCtr="0" anchor="t" bIns="91425" lIns="91425" spcFirstLastPara="1" rIns="91425" wrap="square" tIns="91425">
+          <a:bodyPr spcFirstLastPara="1" wrap="square" lIns="91425" tIns="91425" rIns="91425" bIns="91425" anchor="t" anchorCtr="0">
             <a:noAutofit/>
           </a:bodyPr>
           <a:lstStyle/>
           <a:p>
-            <a:pPr indent="0" lvl="0" marL="0" rtl="0" algn="l">
+            <a:pPr marL="0" lvl="0" indent="0" algn="l" rtl="0">
               <a:spcBef>
                 <a:spcPts val="0"/>
               </a:spcBef>
@@ -7743,10 +7914,10 @@
               <a:buNone/>
             </a:pPr>
             <a:r>
-              <a:rPr lang="en"/>
-              <a:t>Please refer all questions to Alex Clark</a:t>
+              <a:rPr lang="en-US" dirty="0"/>
+              <a:t> </a:t>
             </a:r>
-            <a:endParaRPr/>
+            <a:endParaRPr dirty="0"/>
           </a:p>
         </p:txBody>
       </p:sp>
@@ -7759,7 +7930,288 @@
 </file>
 
 <file path=ppt/theme/theme1.xml><?xml version="1.0" encoding="utf-8"?>
-<a:theme xmlns:a="http://schemas.openxmlformats.org/drawingml/2006/main" xmlns:r="http://schemas.openxmlformats.org/officeDocument/2006/relationships">
+<a:theme xmlns:a="http://schemas.openxmlformats.org/drawingml/2006/main" name="Slate">
+  <a:themeElements>
+    <a:clrScheme name="Slate">
+      <a:dk1>
+        <a:srgbClr val="FFFFFF"/>
+      </a:dk1>
+      <a:lt1>
+        <a:srgbClr val="37474F"/>
+      </a:lt1>
+      <a:dk2>
+        <a:srgbClr val="9E9E9E"/>
+      </a:dk2>
+      <a:lt2>
+        <a:srgbClr val="E0E0E0"/>
+      </a:lt2>
+      <a:accent1>
+        <a:srgbClr val="616161"/>
+      </a:accent1>
+      <a:accent2>
+        <a:srgbClr val="78909C"/>
+      </a:accent2>
+      <a:accent3>
+        <a:srgbClr val="CACACA"/>
+      </a:accent3>
+      <a:accent4>
+        <a:srgbClr val="64FFDA"/>
+      </a:accent4>
+      <a:accent5>
+        <a:srgbClr val="FFD966"/>
+      </a:accent5>
+      <a:accent6>
+        <a:srgbClr val="F5F5F5"/>
+      </a:accent6>
+      <a:hlink>
+        <a:srgbClr val="FFD966"/>
+      </a:hlink>
+      <a:folHlink>
+        <a:srgbClr val="FFD966"/>
+      </a:folHlink>
+    </a:clrScheme>
+    <a:fontScheme name="Office">
+      <a:majorFont>
+        <a:latin typeface="Arial"/>
+        <a:ea typeface=""/>
+        <a:cs typeface=""/>
+        <a:font script="Jpan" typeface="ＭＳ Ｐゴシック"/>
+        <a:font script="Hang" typeface="맑은 고딕"/>
+        <a:font script="Hans" typeface="宋体"/>
+        <a:font script="Hant" typeface="新細明體"/>
+        <a:font script="Arab" typeface="Times New Roman"/>
+        <a:font script="Hebr" typeface="Times New Roman"/>
+        <a:font script="Thai" typeface="Angsana New"/>
+        <a:font script="Ethi" typeface="Nyala"/>
+        <a:font script="Beng" typeface="Vrinda"/>
+        <a:font script="Gujr" typeface="Shruti"/>
+        <a:font script="Khmr" typeface="MoolBoran"/>
+        <a:font script="Knda" typeface="Tunga"/>
+        <a:font script="Guru" typeface="Raavi"/>
+        <a:font script="Cans" typeface="Euphemia"/>
+        <a:font script="Cher" typeface="Plantagenet Cherokee"/>
+        <a:font script="Yiii" typeface="Microsoft Yi Baiti"/>
+        <a:font script="Tibt" typeface="Microsoft Himalaya"/>
+        <a:font script="Thaa" typeface="MV Boli"/>
+        <a:font script="Deva" typeface="Mangal"/>
+        <a:font script="Telu" typeface="Gautami"/>
+        <a:font script="Taml" typeface="Latha"/>
+        <a:font script="Syrc" typeface="Estrangelo Edessa"/>
+        <a:font script="Orya" typeface="Kalinga"/>
+        <a:font script="Mlym" typeface="Kartika"/>
+        <a:font script="Laoo" typeface="DokChampa"/>
+        <a:font script="Sinh" typeface="Iskoola Pota"/>
+        <a:font script="Mong" typeface="Mongolian Baiti"/>
+        <a:font script="Viet" typeface="Times New Roman"/>
+        <a:font script="Uigh" typeface="Microsoft Uighur"/>
+        <a:font script="Geor" typeface="Sylfaen"/>
+      </a:majorFont>
+      <a:minorFont>
+        <a:latin typeface="Arial"/>
+        <a:ea typeface=""/>
+        <a:cs typeface=""/>
+        <a:font script="Jpan" typeface="ＭＳ Ｐゴシック"/>
+        <a:font script="Hang" typeface="맑은 고딕"/>
+        <a:font script="Hans" typeface="宋体"/>
+        <a:font script="Hant" typeface="新細明體"/>
+        <a:font script="Arab" typeface="Arial"/>
+        <a:font script="Hebr" typeface="Arial"/>
+        <a:font script="Thai" typeface="Cordia New"/>
+        <a:font script="Ethi" typeface="Nyala"/>
+        <a:font script="Beng" typeface="Vrinda"/>
+        <a:font script="Gujr" typeface="Shruti"/>
+        <a:font script="Khmr" typeface="DaunPenh"/>
+        <a:font script="Knda" typeface="Tunga"/>
+        <a:font script="Guru" typeface="Raavi"/>
+        <a:font script="Cans" typeface="Euphemia"/>
+        <a:font script="Cher" typeface="Plantagenet Cherokee"/>
+        <a:font script="Yiii" typeface="Microsoft Yi Baiti"/>
+        <a:font script="Tibt" typeface="Microsoft Himalaya"/>
+        <a:font script="Thaa" typeface="MV Boli"/>
+        <a:font script="Deva" typeface="Mangal"/>
+        <a:font script="Telu" typeface="Gautami"/>
+        <a:font script="Taml" typeface="Latha"/>
+        <a:font script="Syrc" typeface="Estrangelo Edessa"/>
+        <a:font script="Orya" typeface="Kalinga"/>
+        <a:font script="Mlym" typeface="Kartika"/>
+        <a:font script="Laoo" typeface="DokChampa"/>
+        <a:font script="Sinh" typeface="Iskoola Pota"/>
+        <a:font script="Mong" typeface="Mongolian Baiti"/>
+        <a:font script="Viet" typeface="Arial"/>
+        <a:font script="Uigh" typeface="Microsoft Uighur"/>
+        <a:font script="Geor" typeface="Sylfaen"/>
+      </a:minorFont>
+    </a:fontScheme>
+    <a:fmtScheme name="Office">
+      <a:fillStyleLst>
+        <a:solidFill>
+          <a:schemeClr val="phClr"/>
+        </a:solidFill>
+        <a:gradFill rotWithShape="1">
+          <a:gsLst>
+            <a:gs pos="0">
+              <a:schemeClr val="phClr">
+                <a:tint val="50000"/>
+                <a:satMod val="300000"/>
+              </a:schemeClr>
+            </a:gs>
+            <a:gs pos="35000">
+              <a:schemeClr val="phClr">
+                <a:tint val="37000"/>
+                <a:satMod val="300000"/>
+              </a:schemeClr>
+            </a:gs>
+            <a:gs pos="100000">
+              <a:schemeClr val="phClr">
+                <a:tint val="15000"/>
+                <a:satMod val="350000"/>
+              </a:schemeClr>
+            </a:gs>
+          </a:gsLst>
+          <a:lin ang="16200000" scaled="1"/>
+        </a:gradFill>
+        <a:gradFill rotWithShape="1">
+          <a:gsLst>
+            <a:gs pos="0">
+              <a:schemeClr val="phClr">
+                <a:tint val="100000"/>
+                <a:shade val="100000"/>
+                <a:satMod val="130000"/>
+              </a:schemeClr>
+            </a:gs>
+            <a:gs pos="100000">
+              <a:schemeClr val="phClr">
+                <a:tint val="50000"/>
+                <a:shade val="100000"/>
+                <a:satMod val="350000"/>
+              </a:schemeClr>
+            </a:gs>
+          </a:gsLst>
+          <a:lin ang="16200000" scaled="0"/>
+        </a:gradFill>
+      </a:fillStyleLst>
+      <a:lnStyleLst>
+        <a:ln w="9525" cap="flat" cmpd="sng" algn="ctr">
+          <a:solidFill>
+            <a:schemeClr val="phClr">
+              <a:shade val="95000"/>
+              <a:satMod val="105000"/>
+            </a:schemeClr>
+          </a:solidFill>
+          <a:prstDash val="solid"/>
+        </a:ln>
+        <a:ln w="25400" cap="flat" cmpd="sng" algn="ctr">
+          <a:solidFill>
+            <a:schemeClr val="phClr"/>
+          </a:solidFill>
+          <a:prstDash val="solid"/>
+        </a:ln>
+        <a:ln w="38100" cap="flat" cmpd="sng" algn="ctr">
+          <a:solidFill>
+            <a:schemeClr val="phClr"/>
+          </a:solidFill>
+          <a:prstDash val="solid"/>
+        </a:ln>
+      </a:lnStyleLst>
+      <a:effectStyleLst>
+        <a:effectStyle>
+          <a:effectLst>
+            <a:outerShdw blurRad="40000" dist="20000" dir="5400000" rotWithShape="0">
+              <a:srgbClr val="000000">
+                <a:alpha val="38000"/>
+              </a:srgbClr>
+            </a:outerShdw>
+          </a:effectLst>
+        </a:effectStyle>
+        <a:effectStyle>
+          <a:effectLst>
+            <a:outerShdw blurRad="40000" dist="23000" dir="5400000" rotWithShape="0">
+              <a:srgbClr val="000000">
+                <a:alpha val="35000"/>
+              </a:srgbClr>
+            </a:outerShdw>
+          </a:effectLst>
+        </a:effectStyle>
+        <a:effectStyle>
+          <a:effectLst>
+            <a:outerShdw blurRad="40000" dist="23000" dir="5400000" rotWithShape="0">
+              <a:srgbClr val="000000">
+                <a:alpha val="35000"/>
+              </a:srgbClr>
+            </a:outerShdw>
+          </a:effectLst>
+          <a:scene3d>
+            <a:camera prst="orthographicFront">
+              <a:rot lat="0" lon="0" rev="0"/>
+            </a:camera>
+            <a:lightRig rig="threePt" dir="t">
+              <a:rot lat="0" lon="0" rev="1200000"/>
+            </a:lightRig>
+          </a:scene3d>
+          <a:sp3d>
+            <a:bevelT w="63500" h="25400"/>
+          </a:sp3d>
+        </a:effectStyle>
+      </a:effectStyleLst>
+      <a:bgFillStyleLst>
+        <a:solidFill>
+          <a:schemeClr val="phClr"/>
+        </a:solidFill>
+        <a:gradFill rotWithShape="1">
+          <a:gsLst>
+            <a:gs pos="0">
+              <a:schemeClr val="phClr">
+                <a:tint val="40000"/>
+                <a:satMod val="350000"/>
+              </a:schemeClr>
+            </a:gs>
+            <a:gs pos="40000">
+              <a:schemeClr val="phClr">
+                <a:tint val="45000"/>
+                <a:shade val="99000"/>
+                <a:satMod val="350000"/>
+              </a:schemeClr>
+            </a:gs>
+            <a:gs pos="100000">
+              <a:schemeClr val="phClr">
+                <a:shade val="20000"/>
+                <a:satMod val="255000"/>
+              </a:schemeClr>
+            </a:gs>
+          </a:gsLst>
+          <a:path path="circle">
+            <a:fillToRect l="50000" t="-80000" r="50000" b="180000"/>
+          </a:path>
+        </a:gradFill>
+        <a:gradFill rotWithShape="1">
+          <a:gsLst>
+            <a:gs pos="0">
+              <a:schemeClr val="phClr">
+                <a:tint val="80000"/>
+                <a:satMod val="300000"/>
+              </a:schemeClr>
+            </a:gs>
+            <a:gs pos="100000">
+              <a:schemeClr val="phClr">
+                <a:shade val="30000"/>
+                <a:satMod val="200000"/>
+              </a:schemeClr>
+            </a:gs>
+          </a:gsLst>
+          <a:path path="circle">
+            <a:fillToRect l="50000" t="50000" r="50000" b="50000"/>
+          </a:path>
+        </a:gradFill>
+      </a:bgFillStyleLst>
+    </a:fmtScheme>
+  </a:themeElements>
+  <a:objectDefaults/>
+  <a:extraClrSchemeLst/>
+</a:theme>
+</file>
+
+<file path=ppt/theme/theme2.xml><?xml version="1.0" encoding="utf-8"?>
+<a:theme xmlns:a="http://schemas.openxmlformats.org/drawingml/2006/main">
   <a:themeElements>
     <a:clrScheme name="Default">
       <a:dk1>
@@ -8034,284 +8486,7 @@
       </a:bgFillStyleLst>
     </a:fmtScheme>
   </a:themeElements>
-</a:theme>
-</file>
-
-<file path=ppt/theme/theme2.xml><?xml version="1.0" encoding="utf-8"?>
-<a:theme xmlns:a="http://schemas.openxmlformats.org/drawingml/2006/main" xmlns:r="http://schemas.openxmlformats.org/officeDocument/2006/relationships" name="Slate">
-  <a:themeElements>
-    <a:clrScheme name="Slate">
-      <a:dk1>
-        <a:srgbClr val="FFFFFF"/>
-      </a:dk1>
-      <a:lt1>
-        <a:srgbClr val="37474F"/>
-      </a:lt1>
-      <a:dk2>
-        <a:srgbClr val="9E9E9E"/>
-      </a:dk2>
-      <a:lt2>
-        <a:srgbClr val="E0E0E0"/>
-      </a:lt2>
-      <a:accent1>
-        <a:srgbClr val="616161"/>
-      </a:accent1>
-      <a:accent2>
-        <a:srgbClr val="78909C"/>
-      </a:accent2>
-      <a:accent3>
-        <a:srgbClr val="CACACA"/>
-      </a:accent3>
-      <a:accent4>
-        <a:srgbClr val="64FFDA"/>
-      </a:accent4>
-      <a:accent5>
-        <a:srgbClr val="FFD966"/>
-      </a:accent5>
-      <a:accent6>
-        <a:srgbClr val="F5F5F5"/>
-      </a:accent6>
-      <a:hlink>
-        <a:srgbClr val="FFD966"/>
-      </a:hlink>
-      <a:folHlink>
-        <a:srgbClr val="FFD966"/>
-      </a:folHlink>
-    </a:clrScheme>
-    <a:fontScheme name="Office">
-      <a:majorFont>
-        <a:latin typeface="Arial"/>
-        <a:ea typeface=""/>
-        <a:cs typeface=""/>
-        <a:font script="Jpan" typeface="ＭＳ Ｐゴシック"/>
-        <a:font script="Hang" typeface="맑은 고딕"/>
-        <a:font script="Hans" typeface="宋体"/>
-        <a:font script="Hant" typeface="新細明體"/>
-        <a:font script="Arab" typeface="Times New Roman"/>
-        <a:font script="Hebr" typeface="Times New Roman"/>
-        <a:font script="Thai" typeface="Angsana New"/>
-        <a:font script="Ethi" typeface="Nyala"/>
-        <a:font script="Beng" typeface="Vrinda"/>
-        <a:font script="Gujr" typeface="Shruti"/>
-        <a:font script="Khmr" typeface="MoolBoran"/>
-        <a:font script="Knda" typeface="Tunga"/>
-        <a:font script="Guru" typeface="Raavi"/>
-        <a:font script="Cans" typeface="Euphemia"/>
-        <a:font script="Cher" typeface="Plantagenet Cherokee"/>
-        <a:font script="Yiii" typeface="Microsoft Yi Baiti"/>
-        <a:font script="Tibt" typeface="Microsoft Himalaya"/>
-        <a:font script="Thaa" typeface="MV Boli"/>
-        <a:font script="Deva" typeface="Mangal"/>
-        <a:font script="Telu" typeface="Gautami"/>
-        <a:font script="Taml" typeface="Latha"/>
-        <a:font script="Syrc" typeface="Estrangelo Edessa"/>
-        <a:font script="Orya" typeface="Kalinga"/>
-        <a:font script="Mlym" typeface="Kartika"/>
-        <a:font script="Laoo" typeface="DokChampa"/>
-        <a:font script="Sinh" typeface="Iskoola Pota"/>
-        <a:font script="Mong" typeface="Mongolian Baiti"/>
-        <a:font script="Viet" typeface="Times New Roman"/>
-        <a:font script="Uigh" typeface="Microsoft Uighur"/>
-        <a:font script="Geor" typeface="Sylfaen"/>
-      </a:majorFont>
-      <a:minorFont>
-        <a:latin typeface="Arial"/>
-        <a:ea typeface=""/>
-        <a:cs typeface=""/>
-        <a:font script="Jpan" typeface="ＭＳ Ｐゴシック"/>
-        <a:font script="Hang" typeface="맑은 고딕"/>
-        <a:font script="Hans" typeface="宋体"/>
-        <a:font script="Hant" typeface="新細明體"/>
-        <a:font script="Arab" typeface="Arial"/>
-        <a:font script="Hebr" typeface="Arial"/>
-        <a:font script="Thai" typeface="Cordia New"/>
-        <a:font script="Ethi" typeface="Nyala"/>
-        <a:font script="Beng" typeface="Vrinda"/>
-        <a:font script="Gujr" typeface="Shruti"/>
-        <a:font script="Khmr" typeface="DaunPenh"/>
-        <a:font script="Knda" typeface="Tunga"/>
-        <a:font script="Guru" typeface="Raavi"/>
-        <a:font script="Cans" typeface="Euphemia"/>
-        <a:font script="Cher" typeface="Plantagenet Cherokee"/>
-        <a:font script="Yiii" typeface="Microsoft Yi Baiti"/>
-        <a:font script="Tibt" typeface="Microsoft Himalaya"/>
-        <a:font script="Thaa" typeface="MV Boli"/>
-        <a:font script="Deva" typeface="Mangal"/>
-        <a:font script="Telu" typeface="Gautami"/>
-        <a:font script="Taml" typeface="Latha"/>
-        <a:font script="Syrc" typeface="Estrangelo Edessa"/>
-        <a:font script="Orya" typeface="Kalinga"/>
-        <a:font script="Mlym" typeface="Kartika"/>
-        <a:font script="Laoo" typeface="DokChampa"/>
-        <a:font script="Sinh" typeface="Iskoola Pota"/>
-        <a:font script="Mong" typeface="Mongolian Baiti"/>
-        <a:font script="Viet" typeface="Arial"/>
-        <a:font script="Uigh" typeface="Microsoft Uighur"/>
-        <a:font script="Geor" typeface="Sylfaen"/>
-      </a:minorFont>
-    </a:fontScheme>
-    <a:fmtScheme name="Office">
-      <a:fillStyleLst>
-        <a:solidFill>
-          <a:schemeClr val="phClr"/>
-        </a:solidFill>
-        <a:gradFill rotWithShape="1">
-          <a:gsLst>
-            <a:gs pos="0">
-              <a:schemeClr val="phClr">
-                <a:tint val="50000"/>
-                <a:satMod val="300000"/>
-              </a:schemeClr>
-            </a:gs>
-            <a:gs pos="35000">
-              <a:schemeClr val="phClr">
-                <a:tint val="37000"/>
-                <a:satMod val="300000"/>
-              </a:schemeClr>
-            </a:gs>
-            <a:gs pos="100000">
-              <a:schemeClr val="phClr">
-                <a:tint val="15000"/>
-                <a:satMod val="350000"/>
-              </a:schemeClr>
-            </a:gs>
-          </a:gsLst>
-          <a:lin ang="16200000" scaled="1"/>
-        </a:gradFill>
-        <a:gradFill rotWithShape="1">
-          <a:gsLst>
-            <a:gs pos="0">
-              <a:schemeClr val="phClr">
-                <a:tint val="100000"/>
-                <a:shade val="100000"/>
-                <a:satMod val="130000"/>
-              </a:schemeClr>
-            </a:gs>
-            <a:gs pos="100000">
-              <a:schemeClr val="phClr">
-                <a:tint val="50000"/>
-                <a:shade val="100000"/>
-                <a:satMod val="350000"/>
-              </a:schemeClr>
-            </a:gs>
-          </a:gsLst>
-          <a:lin ang="16200000" scaled="0"/>
-        </a:gradFill>
-      </a:fillStyleLst>
-      <a:lnStyleLst>
-        <a:ln w="9525" cap="flat" cmpd="sng" algn="ctr">
-          <a:solidFill>
-            <a:schemeClr val="phClr">
-              <a:shade val="95000"/>
-              <a:satMod val="105000"/>
-            </a:schemeClr>
-          </a:solidFill>
-          <a:prstDash val="solid"/>
-        </a:ln>
-        <a:ln w="25400" cap="flat" cmpd="sng" algn="ctr">
-          <a:solidFill>
-            <a:schemeClr val="phClr"/>
-          </a:solidFill>
-          <a:prstDash val="solid"/>
-        </a:ln>
-        <a:ln w="38100" cap="flat" cmpd="sng" algn="ctr">
-          <a:solidFill>
-            <a:schemeClr val="phClr"/>
-          </a:solidFill>
-          <a:prstDash val="solid"/>
-        </a:ln>
-      </a:lnStyleLst>
-      <a:effectStyleLst>
-        <a:effectStyle>
-          <a:effectLst>
-            <a:outerShdw blurRad="40000" dist="20000" dir="5400000" rotWithShape="0">
-              <a:srgbClr val="000000">
-                <a:alpha val="38000"/>
-              </a:srgbClr>
-            </a:outerShdw>
-          </a:effectLst>
-        </a:effectStyle>
-        <a:effectStyle>
-          <a:effectLst>
-            <a:outerShdw blurRad="40000" dist="23000" dir="5400000" rotWithShape="0">
-              <a:srgbClr val="000000">
-                <a:alpha val="35000"/>
-              </a:srgbClr>
-            </a:outerShdw>
-          </a:effectLst>
-        </a:effectStyle>
-        <a:effectStyle>
-          <a:effectLst>
-            <a:outerShdw blurRad="40000" dist="23000" dir="5400000" rotWithShape="0">
-              <a:srgbClr val="000000">
-                <a:alpha val="35000"/>
-              </a:srgbClr>
-            </a:outerShdw>
-          </a:effectLst>
-          <a:scene3d>
-            <a:camera prst="orthographicFront">
-              <a:rot lat="0" lon="0" rev="0"/>
-            </a:camera>
-            <a:lightRig rig="threePt" dir="t">
-              <a:rot lat="0" lon="0" rev="1200000"/>
-            </a:lightRig>
-          </a:scene3d>
-          <a:sp3d>
-            <a:bevelT w="63500" h="25400"/>
-          </a:sp3d>
-        </a:effectStyle>
-      </a:effectStyleLst>
-      <a:bgFillStyleLst>
-        <a:solidFill>
-          <a:schemeClr val="phClr"/>
-        </a:solidFill>
-        <a:gradFill rotWithShape="1">
-          <a:gsLst>
-            <a:gs pos="0">
-              <a:schemeClr val="phClr">
-                <a:tint val="40000"/>
-                <a:satMod val="350000"/>
-              </a:schemeClr>
-            </a:gs>
-            <a:gs pos="40000">
-              <a:schemeClr val="phClr">
-                <a:tint val="45000"/>
-                <a:shade val="99000"/>
-                <a:satMod val="350000"/>
-              </a:schemeClr>
-            </a:gs>
-            <a:gs pos="100000">
-              <a:schemeClr val="phClr">
-                <a:shade val="20000"/>
-                <a:satMod val="255000"/>
-              </a:schemeClr>
-            </a:gs>
-          </a:gsLst>
-          <a:path path="circle">
-            <a:fillToRect l="50000" t="-80000" r="50000" b="180000"/>
-          </a:path>
-        </a:gradFill>
-        <a:gradFill rotWithShape="1">
-          <a:gsLst>
-            <a:gs pos="0">
-              <a:schemeClr val="phClr">
-                <a:tint val="80000"/>
-                <a:satMod val="300000"/>
-              </a:schemeClr>
-            </a:gs>
-            <a:gs pos="100000">
-              <a:schemeClr val="phClr">
-                <a:shade val="30000"/>
-                <a:satMod val="200000"/>
-              </a:schemeClr>
-            </a:gs>
-          </a:gsLst>
-          <a:path path="circle">
-            <a:fillToRect l="50000" t="50000" r="50000" b="50000"/>
-          </a:path>
-        </a:gradFill>
-      </a:bgFillStyleLst>
-    </a:fmtScheme>
-  </a:themeElements>
+  <a:objectDefaults/>
+  <a:extraClrSchemeLst/>
 </a:theme>
 </file>
</xml_diff>